<commit_message>
Finalized Rstudio for class project. Added notes along data to show importance of steps and offer background as to why someone would care as well as background info on the proejct to provide context.
</commit_message>
<xml_diff>
--- a/BIOL6220Final.pptx
+++ b/BIOL6220Final.pptx
@@ -266,7 +266,7 @@
           <a:p>
             <a:fld id="{E0E4562E-BC32-B843-9BB2-A9CE5A5D38F1}" type="datetimeFigureOut">
               <a:rPr lang="en-US" smtClean="0"/>
-              <a:t>12/5/22</a:t>
+              <a:t>12/6/22</a:t>
             </a:fld>
             <a:endParaRPr lang="en-US"/>
           </a:p>
@@ -464,7 +464,7 @@
           <a:p>
             <a:fld id="{E0E4562E-BC32-B843-9BB2-A9CE5A5D38F1}" type="datetimeFigureOut">
               <a:rPr lang="en-US" smtClean="0"/>
-              <a:t>12/5/22</a:t>
+              <a:t>12/6/22</a:t>
             </a:fld>
             <a:endParaRPr lang="en-US"/>
           </a:p>
@@ -672,7 +672,7 @@
           <a:p>
             <a:fld id="{E0E4562E-BC32-B843-9BB2-A9CE5A5D38F1}" type="datetimeFigureOut">
               <a:rPr lang="en-US" smtClean="0"/>
-              <a:t>12/5/22</a:t>
+              <a:t>12/6/22</a:t>
             </a:fld>
             <a:endParaRPr lang="en-US"/>
           </a:p>
@@ -870,7 +870,7 @@
           <a:p>
             <a:fld id="{E0E4562E-BC32-B843-9BB2-A9CE5A5D38F1}" type="datetimeFigureOut">
               <a:rPr lang="en-US" smtClean="0"/>
-              <a:t>12/5/22</a:t>
+              <a:t>12/6/22</a:t>
             </a:fld>
             <a:endParaRPr lang="en-US"/>
           </a:p>
@@ -1145,7 +1145,7 @@
           <a:p>
             <a:fld id="{E0E4562E-BC32-B843-9BB2-A9CE5A5D38F1}" type="datetimeFigureOut">
               <a:rPr lang="en-US" smtClean="0"/>
-              <a:t>12/5/22</a:t>
+              <a:t>12/6/22</a:t>
             </a:fld>
             <a:endParaRPr lang="en-US"/>
           </a:p>
@@ -1410,7 +1410,7 @@
           <a:p>
             <a:fld id="{E0E4562E-BC32-B843-9BB2-A9CE5A5D38F1}" type="datetimeFigureOut">
               <a:rPr lang="en-US" smtClean="0"/>
-              <a:t>12/5/22</a:t>
+              <a:t>12/6/22</a:t>
             </a:fld>
             <a:endParaRPr lang="en-US"/>
           </a:p>
@@ -1822,7 +1822,7 @@
           <a:p>
             <a:fld id="{E0E4562E-BC32-B843-9BB2-A9CE5A5D38F1}" type="datetimeFigureOut">
               <a:rPr lang="en-US" smtClean="0"/>
-              <a:t>12/5/22</a:t>
+              <a:t>12/6/22</a:t>
             </a:fld>
             <a:endParaRPr lang="en-US"/>
           </a:p>
@@ -1963,7 +1963,7 @@
           <a:p>
             <a:fld id="{E0E4562E-BC32-B843-9BB2-A9CE5A5D38F1}" type="datetimeFigureOut">
               <a:rPr lang="en-US" smtClean="0"/>
-              <a:t>12/5/22</a:t>
+              <a:t>12/6/22</a:t>
             </a:fld>
             <a:endParaRPr lang="en-US"/>
           </a:p>
@@ -2076,7 +2076,7 @@
           <a:p>
             <a:fld id="{E0E4562E-BC32-B843-9BB2-A9CE5A5D38F1}" type="datetimeFigureOut">
               <a:rPr lang="en-US" smtClean="0"/>
-              <a:t>12/5/22</a:t>
+              <a:t>12/6/22</a:t>
             </a:fld>
             <a:endParaRPr lang="en-US"/>
           </a:p>
@@ -2387,7 +2387,7 @@
           <a:p>
             <a:fld id="{E0E4562E-BC32-B843-9BB2-A9CE5A5D38F1}" type="datetimeFigureOut">
               <a:rPr lang="en-US" smtClean="0"/>
-              <a:t>12/5/22</a:t>
+              <a:t>12/6/22</a:t>
             </a:fld>
             <a:endParaRPr lang="en-US"/>
           </a:p>
@@ -2675,7 +2675,7 @@
           <a:p>
             <a:fld id="{E0E4562E-BC32-B843-9BB2-A9CE5A5D38F1}" type="datetimeFigureOut">
               <a:rPr lang="en-US" smtClean="0"/>
-              <a:t>12/5/22</a:t>
+              <a:t>12/6/22</a:t>
             </a:fld>
             <a:endParaRPr lang="en-US"/>
           </a:p>
@@ -2916,7 +2916,7 @@
           <a:p>
             <a:fld id="{E0E4562E-BC32-B843-9BB2-A9CE5A5D38F1}" type="datetimeFigureOut">
               <a:rPr lang="en-US" smtClean="0"/>
-              <a:t>12/5/22</a:t>
+              <a:t>12/6/22</a:t>
             </a:fld>
             <a:endParaRPr lang="en-US"/>
           </a:p>
@@ -3479,21 +3479,21 @@
             <p:ph idx="1"/>
           </p:nvPr>
         </p:nvSpPr>
-        <p:spPr/>
-        <p:txBody>
-          <a:bodyPr/>
+        <p:spPr>
+          <a:xfrm>
+            <a:off x="838200" y="1825624"/>
+            <a:ext cx="10515600" cy="5032375"/>
+          </a:xfrm>
+        </p:spPr>
+        <p:txBody>
+          <a:bodyPr>
+            <a:normAutofit/>
+          </a:bodyPr>
           <a:lstStyle/>
           <a:p>
             <a:r>
               <a:rPr lang="en-US" dirty="0"/>
               <a:t>Consists of an 8 x 3 design of 150-gallon tanks with 18 plants each</a:t>
-            </a:r>
-          </a:p>
-          <a:p>
-            <a:pPr lvl="1"/>
-            <a:r>
-              <a:rPr lang="en-US" dirty="0"/>
-              <a:t>Apart from control</a:t>
             </a:r>
           </a:p>
           <a:p>
@@ -3519,15 +3519,36 @@
                 <a:effectLst/>
                 <a:ea typeface="Calibri" panose="020F0502020204030204" pitchFamily="34" charset="0"/>
               </a:rPr>
-              <a:t>treated wastewater amended with additional N and P</a:t>
+              <a:t>treated wastewater amended with additional </a:t>
+            </a:r>
+            <a:r>
+              <a:rPr lang="en-US" dirty="0">
+                <a:ea typeface="Calibri" panose="020F0502020204030204" pitchFamily="34" charset="0"/>
+              </a:rPr>
+              <a:t>nitrogen and phosphorus</a:t>
+            </a:r>
+            <a:endParaRPr lang="en-US" dirty="0">
+              <a:effectLst/>
+              <a:ea typeface="Calibri" panose="020F0502020204030204" pitchFamily="34" charset="0"/>
+            </a:endParaRPr>
+          </a:p>
+          <a:p>
+            <a:r>
+              <a:rPr lang="en-US" dirty="0"/>
+              <a:t>Project goal: Remediate N and P from</a:t>
             </a:r>
             <a:r>
               <a:rPr lang="en-US" dirty="0">
                 <a:effectLst/>
               </a:rPr>
-              <a:t> </a:t>
-            </a:r>
-            <a:endParaRPr lang="en-US" dirty="0"/>
+              <a:t> FTW tanks </a:t>
+            </a:r>
+          </a:p>
+          <a:p>
+            <a:r>
+              <a:rPr lang="en-US" dirty="0"/>
+              <a:t>Project Objective: To observe whether remediation is additive, synergistic, or antagonistic </a:t>
+            </a:r>
           </a:p>
         </p:txBody>
       </p:sp>

</xml_diff>

<commit_message>
Finalized powerpoint with presenter notes and got it ready to present.
</commit_message>
<xml_diff>
--- a/BIOL6220Final.pptx
+++ b/BIOL6220Final.pptx
@@ -4,15 +4,20 @@
   <p:sldMasterIdLst>
     <p:sldMasterId id="2147483648" r:id="rId1"/>
   </p:sldMasterIdLst>
+  <p:notesMasterIdLst>
+    <p:notesMasterId r:id="rId12"/>
+  </p:notesMasterIdLst>
   <p:sldIdLst>
     <p:sldId id="256" r:id="rId2"/>
     <p:sldId id="261" r:id="rId3"/>
     <p:sldId id="257" r:id="rId4"/>
-    <p:sldId id="258" r:id="rId5"/>
-    <p:sldId id="259" r:id="rId6"/>
-    <p:sldId id="260" r:id="rId7"/>
+    <p:sldId id="265" r:id="rId5"/>
+    <p:sldId id="258" r:id="rId6"/>
+    <p:sldId id="259" r:id="rId7"/>
     <p:sldId id="262" r:id="rId8"/>
-    <p:sldId id="263" r:id="rId9"/>
+    <p:sldId id="260" r:id="rId9"/>
+    <p:sldId id="264" r:id="rId10"/>
+    <p:sldId id="263" r:id="rId11"/>
   </p:sldIdLst>
   <p:sldSz cx="12192000" cy="6858000"/>
   <p:notesSz cx="6858000" cy="9144000"/>
@@ -119,6 +124,986 @@
 </p:presentation>
 </file>
 
+<file path=ppt/notesMasters/notesMaster1.xml><?xml version="1.0" encoding="utf-8"?>
+<p:notesMaster xmlns:a="http://schemas.openxmlformats.org/drawingml/2006/main" xmlns:r="http://schemas.openxmlformats.org/officeDocument/2006/relationships" xmlns:p="http://schemas.openxmlformats.org/presentationml/2006/main">
+  <p:cSld>
+    <p:bg>
+      <p:bgRef idx="1001">
+        <a:schemeClr val="bg1"/>
+      </p:bgRef>
+    </p:bg>
+    <p:spTree>
+      <p:nvGrpSpPr>
+        <p:cNvPr id="1" name=""/>
+        <p:cNvGrpSpPr/>
+        <p:nvPr/>
+      </p:nvGrpSpPr>
+      <p:grpSpPr>
+        <a:xfrm>
+          <a:off x="0" y="0"/>
+          <a:ext cx="0" cy="0"/>
+          <a:chOff x="0" y="0"/>
+          <a:chExt cx="0" cy="0"/>
+        </a:xfrm>
+      </p:grpSpPr>
+      <p:sp>
+        <p:nvSpPr>
+          <p:cNvPr id="2" name="Header Placeholder 1"/>
+          <p:cNvSpPr>
+            <a:spLocks noGrp="1"/>
+          </p:cNvSpPr>
+          <p:nvPr>
+            <p:ph type="hdr" sz="quarter"/>
+          </p:nvPr>
+        </p:nvSpPr>
+        <p:spPr>
+          <a:xfrm>
+            <a:off x="0" y="0"/>
+            <a:ext cx="2971800" cy="458788"/>
+          </a:xfrm>
+          <a:prstGeom prst="rect">
+            <a:avLst/>
+          </a:prstGeom>
+        </p:spPr>
+        <p:txBody>
+          <a:bodyPr vert="horz" lIns="91440" tIns="45720" rIns="91440" bIns="45720" rtlCol="0"/>
+          <a:lstStyle>
+            <a:lvl1pPr algn="l">
+              <a:defRPr sz="1200"/>
+            </a:lvl1pPr>
+          </a:lstStyle>
+          <a:p>
+            <a:endParaRPr lang="en-US"/>
+          </a:p>
+        </p:txBody>
+      </p:sp>
+      <p:sp>
+        <p:nvSpPr>
+          <p:cNvPr id="3" name="Date Placeholder 2"/>
+          <p:cNvSpPr>
+            <a:spLocks noGrp="1"/>
+          </p:cNvSpPr>
+          <p:nvPr>
+            <p:ph type="dt" idx="1"/>
+          </p:nvPr>
+        </p:nvSpPr>
+        <p:spPr>
+          <a:xfrm>
+            <a:off x="3884613" y="0"/>
+            <a:ext cx="2971800" cy="458788"/>
+          </a:xfrm>
+          <a:prstGeom prst="rect">
+            <a:avLst/>
+          </a:prstGeom>
+        </p:spPr>
+        <p:txBody>
+          <a:bodyPr vert="horz" lIns="91440" tIns="45720" rIns="91440" bIns="45720" rtlCol="0"/>
+          <a:lstStyle>
+            <a:lvl1pPr algn="r">
+              <a:defRPr sz="1200"/>
+            </a:lvl1pPr>
+          </a:lstStyle>
+          <a:p>
+            <a:fld id="{BEE62F78-650C-7A45-A1DA-2DD4730E5E27}" type="datetimeFigureOut">
+              <a:rPr lang="en-US" smtClean="0"/>
+              <a:t>12/7/22</a:t>
+            </a:fld>
+            <a:endParaRPr lang="en-US"/>
+          </a:p>
+        </p:txBody>
+      </p:sp>
+      <p:sp>
+        <p:nvSpPr>
+          <p:cNvPr id="4" name="Slide Image Placeholder 3"/>
+          <p:cNvSpPr>
+            <a:spLocks noGrp="1" noRot="1" noChangeAspect="1"/>
+          </p:cNvSpPr>
+          <p:nvPr>
+            <p:ph type="sldImg" idx="2"/>
+          </p:nvPr>
+        </p:nvSpPr>
+        <p:spPr>
+          <a:xfrm>
+            <a:off x="685800" y="1143000"/>
+            <a:ext cx="5486400" cy="3086100"/>
+          </a:xfrm>
+          <a:prstGeom prst="rect">
+            <a:avLst/>
+          </a:prstGeom>
+          <a:noFill/>
+          <a:ln w="12700">
+            <a:solidFill>
+              <a:prstClr val="black"/>
+            </a:solidFill>
+          </a:ln>
+        </p:spPr>
+        <p:txBody>
+          <a:bodyPr vert="horz" lIns="91440" tIns="45720" rIns="91440" bIns="45720" rtlCol="0" anchor="ctr"/>
+          <a:lstStyle/>
+          <a:p>
+            <a:endParaRPr lang="en-US"/>
+          </a:p>
+        </p:txBody>
+      </p:sp>
+      <p:sp>
+        <p:nvSpPr>
+          <p:cNvPr id="5" name="Notes Placeholder 4"/>
+          <p:cNvSpPr>
+            <a:spLocks noGrp="1"/>
+          </p:cNvSpPr>
+          <p:nvPr>
+            <p:ph type="body" sz="quarter" idx="3"/>
+          </p:nvPr>
+        </p:nvSpPr>
+        <p:spPr>
+          <a:xfrm>
+            <a:off x="685800" y="4400550"/>
+            <a:ext cx="5486400" cy="3600450"/>
+          </a:xfrm>
+          <a:prstGeom prst="rect">
+            <a:avLst/>
+          </a:prstGeom>
+        </p:spPr>
+        <p:txBody>
+          <a:bodyPr vert="horz" lIns="91440" tIns="45720" rIns="91440" bIns="45720" rtlCol="0"/>
+          <a:lstStyle/>
+          <a:p>
+            <a:pPr lvl="0"/>
+            <a:r>
+              <a:rPr lang="en-US"/>
+              <a:t>Click to edit Master text styles</a:t>
+            </a:r>
+          </a:p>
+          <a:p>
+            <a:pPr lvl="1"/>
+            <a:r>
+              <a:rPr lang="en-US"/>
+              <a:t>Second level</a:t>
+            </a:r>
+          </a:p>
+          <a:p>
+            <a:pPr lvl="2"/>
+            <a:r>
+              <a:rPr lang="en-US"/>
+              <a:t>Third level</a:t>
+            </a:r>
+          </a:p>
+          <a:p>
+            <a:pPr lvl="3"/>
+            <a:r>
+              <a:rPr lang="en-US"/>
+              <a:t>Fourth level</a:t>
+            </a:r>
+          </a:p>
+          <a:p>
+            <a:pPr lvl="4"/>
+            <a:r>
+              <a:rPr lang="en-US"/>
+              <a:t>Fifth level</a:t>
+            </a:r>
+          </a:p>
+        </p:txBody>
+      </p:sp>
+      <p:sp>
+        <p:nvSpPr>
+          <p:cNvPr id="6" name="Footer Placeholder 5"/>
+          <p:cNvSpPr>
+            <a:spLocks noGrp="1"/>
+          </p:cNvSpPr>
+          <p:nvPr>
+            <p:ph type="ftr" sz="quarter" idx="4"/>
+          </p:nvPr>
+        </p:nvSpPr>
+        <p:spPr>
+          <a:xfrm>
+            <a:off x="0" y="8685213"/>
+            <a:ext cx="2971800" cy="458787"/>
+          </a:xfrm>
+          <a:prstGeom prst="rect">
+            <a:avLst/>
+          </a:prstGeom>
+        </p:spPr>
+        <p:txBody>
+          <a:bodyPr vert="horz" lIns="91440" tIns="45720" rIns="91440" bIns="45720" rtlCol="0" anchor="b"/>
+          <a:lstStyle>
+            <a:lvl1pPr algn="l">
+              <a:defRPr sz="1200"/>
+            </a:lvl1pPr>
+          </a:lstStyle>
+          <a:p>
+            <a:endParaRPr lang="en-US"/>
+          </a:p>
+        </p:txBody>
+      </p:sp>
+      <p:sp>
+        <p:nvSpPr>
+          <p:cNvPr id="7" name="Slide Number Placeholder 6"/>
+          <p:cNvSpPr>
+            <a:spLocks noGrp="1"/>
+          </p:cNvSpPr>
+          <p:nvPr>
+            <p:ph type="sldNum" sz="quarter" idx="5"/>
+          </p:nvPr>
+        </p:nvSpPr>
+        <p:spPr>
+          <a:xfrm>
+            <a:off x="3884613" y="8685213"/>
+            <a:ext cx="2971800" cy="458787"/>
+          </a:xfrm>
+          <a:prstGeom prst="rect">
+            <a:avLst/>
+          </a:prstGeom>
+        </p:spPr>
+        <p:txBody>
+          <a:bodyPr vert="horz" lIns="91440" tIns="45720" rIns="91440" bIns="45720" rtlCol="0" anchor="b"/>
+          <a:lstStyle>
+            <a:lvl1pPr algn="r">
+              <a:defRPr sz="1200"/>
+            </a:lvl1pPr>
+          </a:lstStyle>
+          <a:p>
+            <a:fld id="{B98E28CC-C23C-194C-BD01-979D3612A888}" type="slidenum">
+              <a:rPr lang="en-US" smtClean="0"/>
+              <a:t>‹#›</a:t>
+            </a:fld>
+            <a:endParaRPr lang="en-US"/>
+          </a:p>
+        </p:txBody>
+      </p:sp>
+    </p:spTree>
+    <p:extLst>
+      <p:ext uri="{BB962C8B-B14F-4D97-AF65-F5344CB8AC3E}">
+        <p14:creationId xmlns:p14="http://schemas.microsoft.com/office/powerpoint/2010/main" val="2232027831"/>
+      </p:ext>
+    </p:extLst>
+  </p:cSld>
+  <p:clrMap bg1="lt1" tx1="dk1" bg2="lt2" tx2="dk2" accent1="accent1" accent2="accent2" accent3="accent3" accent4="accent4" accent5="accent5" accent6="accent6" hlink="hlink" folHlink="folHlink"/>
+  <p:notesStyle>
+    <a:lvl1pPr marL="0" algn="l" defTabSz="914400" rtl="0" eaLnBrk="1" latinLnBrk="0" hangingPunct="1">
+      <a:defRPr sz="1200" kern="1200">
+        <a:solidFill>
+          <a:schemeClr val="tx1"/>
+        </a:solidFill>
+        <a:latin typeface="+mn-lt"/>
+        <a:ea typeface="+mn-ea"/>
+        <a:cs typeface="+mn-cs"/>
+      </a:defRPr>
+    </a:lvl1pPr>
+    <a:lvl2pPr marL="457200" algn="l" defTabSz="914400" rtl="0" eaLnBrk="1" latinLnBrk="0" hangingPunct="1">
+      <a:defRPr sz="1200" kern="1200">
+        <a:solidFill>
+          <a:schemeClr val="tx1"/>
+        </a:solidFill>
+        <a:latin typeface="+mn-lt"/>
+        <a:ea typeface="+mn-ea"/>
+        <a:cs typeface="+mn-cs"/>
+      </a:defRPr>
+    </a:lvl2pPr>
+    <a:lvl3pPr marL="914400" algn="l" defTabSz="914400" rtl="0" eaLnBrk="1" latinLnBrk="0" hangingPunct="1">
+      <a:defRPr sz="1200" kern="1200">
+        <a:solidFill>
+          <a:schemeClr val="tx1"/>
+        </a:solidFill>
+        <a:latin typeface="+mn-lt"/>
+        <a:ea typeface="+mn-ea"/>
+        <a:cs typeface="+mn-cs"/>
+      </a:defRPr>
+    </a:lvl3pPr>
+    <a:lvl4pPr marL="1371600" algn="l" defTabSz="914400" rtl="0" eaLnBrk="1" latinLnBrk="0" hangingPunct="1">
+      <a:defRPr sz="1200" kern="1200">
+        <a:solidFill>
+          <a:schemeClr val="tx1"/>
+        </a:solidFill>
+        <a:latin typeface="+mn-lt"/>
+        <a:ea typeface="+mn-ea"/>
+        <a:cs typeface="+mn-cs"/>
+      </a:defRPr>
+    </a:lvl4pPr>
+    <a:lvl5pPr marL="1828800" algn="l" defTabSz="914400" rtl="0" eaLnBrk="1" latinLnBrk="0" hangingPunct="1">
+      <a:defRPr sz="1200" kern="1200">
+        <a:solidFill>
+          <a:schemeClr val="tx1"/>
+        </a:solidFill>
+        <a:latin typeface="+mn-lt"/>
+        <a:ea typeface="+mn-ea"/>
+        <a:cs typeface="+mn-cs"/>
+      </a:defRPr>
+    </a:lvl5pPr>
+    <a:lvl6pPr marL="2286000" algn="l" defTabSz="914400" rtl="0" eaLnBrk="1" latinLnBrk="0" hangingPunct="1">
+      <a:defRPr sz="1200" kern="1200">
+        <a:solidFill>
+          <a:schemeClr val="tx1"/>
+        </a:solidFill>
+        <a:latin typeface="+mn-lt"/>
+        <a:ea typeface="+mn-ea"/>
+        <a:cs typeface="+mn-cs"/>
+      </a:defRPr>
+    </a:lvl6pPr>
+    <a:lvl7pPr marL="2743200" algn="l" defTabSz="914400" rtl="0" eaLnBrk="1" latinLnBrk="0" hangingPunct="1">
+      <a:defRPr sz="1200" kern="1200">
+        <a:solidFill>
+          <a:schemeClr val="tx1"/>
+        </a:solidFill>
+        <a:latin typeface="+mn-lt"/>
+        <a:ea typeface="+mn-ea"/>
+        <a:cs typeface="+mn-cs"/>
+      </a:defRPr>
+    </a:lvl7pPr>
+    <a:lvl8pPr marL="3200400" algn="l" defTabSz="914400" rtl="0" eaLnBrk="1" latinLnBrk="0" hangingPunct="1">
+      <a:defRPr sz="1200" kern="1200">
+        <a:solidFill>
+          <a:schemeClr val="tx1"/>
+        </a:solidFill>
+        <a:latin typeface="+mn-lt"/>
+        <a:ea typeface="+mn-ea"/>
+        <a:cs typeface="+mn-cs"/>
+      </a:defRPr>
+    </a:lvl8pPr>
+    <a:lvl9pPr marL="3657600" algn="l" defTabSz="914400" rtl="0" eaLnBrk="1" latinLnBrk="0" hangingPunct="1">
+      <a:defRPr sz="1200" kern="1200">
+        <a:solidFill>
+          <a:schemeClr val="tx1"/>
+        </a:solidFill>
+        <a:latin typeface="+mn-lt"/>
+        <a:ea typeface="+mn-ea"/>
+        <a:cs typeface="+mn-cs"/>
+      </a:defRPr>
+    </a:lvl9pPr>
+  </p:notesStyle>
+</p:notesMaster>
+</file>
+
+<file path=ppt/notesSlides/notesSlide1.xml><?xml version="1.0" encoding="utf-8"?>
+<p:notes xmlns:a="http://schemas.openxmlformats.org/drawingml/2006/main" xmlns:r="http://schemas.openxmlformats.org/officeDocument/2006/relationships" xmlns:p="http://schemas.openxmlformats.org/presentationml/2006/main">
+  <p:cSld>
+    <p:spTree>
+      <p:nvGrpSpPr>
+        <p:cNvPr id="1" name=""/>
+        <p:cNvGrpSpPr/>
+        <p:nvPr/>
+      </p:nvGrpSpPr>
+      <p:grpSpPr>
+        <a:xfrm>
+          <a:off x="0" y="0"/>
+          <a:ext cx="0" cy="0"/>
+          <a:chOff x="0" y="0"/>
+          <a:chExt cx="0" cy="0"/>
+        </a:xfrm>
+      </p:grpSpPr>
+      <p:sp>
+        <p:nvSpPr>
+          <p:cNvPr id="2" name="Slide Image Placeholder 1"/>
+          <p:cNvSpPr>
+            <a:spLocks noGrp="1" noRot="1" noChangeAspect="1"/>
+          </p:cNvSpPr>
+          <p:nvPr>
+            <p:ph type="sldImg"/>
+          </p:nvPr>
+        </p:nvSpPr>
+        <p:spPr/>
+      </p:sp>
+      <p:sp>
+        <p:nvSpPr>
+          <p:cNvPr id="3" name="Notes Placeholder 2"/>
+          <p:cNvSpPr>
+            <a:spLocks noGrp="1"/>
+          </p:cNvSpPr>
+          <p:nvPr>
+            <p:ph type="body" idx="1"/>
+          </p:nvPr>
+        </p:nvSpPr>
+        <p:spPr/>
+        <p:txBody>
+          <a:bodyPr/>
+          <a:lstStyle/>
+          <a:p>
+            <a:r>
+              <a:rPr lang="en-US" dirty="0"/>
+              <a:t>The </a:t>
+            </a:r>
+            <a:r>
+              <a:rPr lang="en-US" dirty="0" err="1"/>
+              <a:t>guc.Aseries</a:t>
+            </a:r>
+            <a:r>
+              <a:rPr lang="en-US" dirty="0"/>
+              <a:t> was brought in again using a pairwise test to compare homogeneity amongst the species. The </a:t>
+            </a:r>
+            <a:r>
+              <a:rPr lang="en-US" dirty="0" err="1"/>
+              <a:t>xlabel</a:t>
+            </a:r>
+            <a:r>
+              <a:rPr lang="en-US" dirty="0"/>
+              <a:t> was the plant species with the y label being the shoot length for this graph and the root length for the graph below. The function </a:t>
+            </a:r>
+            <a:r>
+              <a:rPr lang="en-US" dirty="0" err="1"/>
+              <a:t>ggbetweenstats</a:t>
+            </a:r>
+            <a:r>
+              <a:rPr lang="en-US" dirty="0"/>
+              <a:t>() was used for its ability to create publication ready plots with </a:t>
+            </a:r>
+            <a:r>
+              <a:rPr lang="en-US" dirty="0" err="1"/>
+              <a:t>relavent</a:t>
+            </a:r>
+            <a:r>
+              <a:rPr lang="en-US" dirty="0"/>
+              <a:t> statistical analysis. In this case it was used to create a violin plot, which has the advantage over a traditional box plot by giving an more accurate accurate view on the distribution of the data points. From the graph we can see that each of the species is statistically significant from one another. From the confidence interval given we can say with 95% confidence that the mean of the data set is between 0.62 and 1.00 for this specific measure of plant species against shoot length. The r value can tell us that 71% of the points along the graph can be explained and that their is a positive correlation amongst the datapoints for the graph.</a:t>
+            </a:r>
+          </a:p>
+        </p:txBody>
+      </p:sp>
+      <p:sp>
+        <p:nvSpPr>
+          <p:cNvPr id="4" name="Slide Number Placeholder 3"/>
+          <p:cNvSpPr>
+            <a:spLocks noGrp="1"/>
+          </p:cNvSpPr>
+          <p:nvPr>
+            <p:ph type="sldNum" sz="quarter" idx="5"/>
+          </p:nvPr>
+        </p:nvSpPr>
+        <p:spPr/>
+        <p:txBody>
+          <a:bodyPr/>
+          <a:lstStyle/>
+          <a:p>
+            <a:fld id="{B98E28CC-C23C-194C-BD01-979D3612A888}" type="slidenum">
+              <a:rPr lang="en-US" smtClean="0"/>
+              <a:t>5</a:t>
+            </a:fld>
+            <a:endParaRPr lang="en-US"/>
+          </a:p>
+        </p:txBody>
+      </p:sp>
+    </p:spTree>
+    <p:extLst>
+      <p:ext uri="{BB962C8B-B14F-4D97-AF65-F5344CB8AC3E}">
+        <p14:creationId xmlns:p14="http://schemas.microsoft.com/office/powerpoint/2010/main" val="3497279431"/>
+      </p:ext>
+    </p:extLst>
+  </p:cSld>
+  <p:clrMapOvr>
+    <a:masterClrMapping/>
+  </p:clrMapOvr>
+</p:notes>
+</file>
+
+<file path=ppt/notesSlides/notesSlide2.xml><?xml version="1.0" encoding="utf-8"?>
+<p:notes xmlns:a="http://schemas.openxmlformats.org/drawingml/2006/main" xmlns:r="http://schemas.openxmlformats.org/officeDocument/2006/relationships" xmlns:p="http://schemas.openxmlformats.org/presentationml/2006/main">
+  <p:cSld>
+    <p:spTree>
+      <p:nvGrpSpPr>
+        <p:cNvPr id="1" name=""/>
+        <p:cNvGrpSpPr/>
+        <p:nvPr/>
+      </p:nvGrpSpPr>
+      <p:grpSpPr>
+        <a:xfrm>
+          <a:off x="0" y="0"/>
+          <a:ext cx="0" cy="0"/>
+          <a:chOff x="0" y="0"/>
+          <a:chExt cx="0" cy="0"/>
+        </a:xfrm>
+      </p:grpSpPr>
+      <p:sp>
+        <p:nvSpPr>
+          <p:cNvPr id="2" name="Slide Image Placeholder 1"/>
+          <p:cNvSpPr>
+            <a:spLocks noGrp="1" noRot="1" noChangeAspect="1"/>
+          </p:cNvSpPr>
+          <p:nvPr>
+            <p:ph type="sldImg"/>
+          </p:nvPr>
+        </p:nvSpPr>
+        <p:spPr/>
+      </p:sp>
+      <p:sp>
+        <p:nvSpPr>
+          <p:cNvPr id="3" name="Notes Placeholder 2"/>
+          <p:cNvSpPr>
+            <a:spLocks noGrp="1"/>
+          </p:cNvSpPr>
+          <p:nvPr>
+            <p:ph type="body" idx="1"/>
+          </p:nvPr>
+        </p:nvSpPr>
+        <p:spPr/>
+        <p:txBody>
+          <a:bodyPr/>
+          <a:lstStyle/>
+          <a:p>
+            <a:r>
+              <a:rPr lang="en-US" dirty="0"/>
+              <a:t>Plot of roots by shoots to show association between them. One may expect the longer the roots the longer the shoots as that is an indicator of good plant growth and health. Initially where we name the different data was to associate the data based upon what shows up in the csv file. This is the point of the "which" command in where we are saying that everything that has this word or value associated, bring it over. The </a:t>
+            </a:r>
+            <a:r>
+              <a:rPr lang="en-US" dirty="0" err="1"/>
+              <a:t>lm</a:t>
+            </a:r>
+            <a:r>
+              <a:rPr lang="en-US" dirty="0"/>
+              <a:t>() command was used to create a linear regression of the grouped data. This way we can predict future data based on what we have currently. </a:t>
+            </a:r>
+            <a:r>
+              <a:rPr lang="en-US" dirty="0" err="1"/>
+              <a:t>abline</a:t>
+            </a:r>
+            <a:r>
+              <a:rPr lang="en-US" dirty="0"/>
+              <a:t> was used to give a line of best fit for the data. This line of best fit estimates the straight line through the data that minimized the distance between it and all the other points within the graph. col= was used </a:t>
+            </a:r>
+            <a:r>
+              <a:rPr lang="en-US" dirty="0" err="1"/>
+              <a:t>ti</a:t>
+            </a:r>
+            <a:r>
+              <a:rPr lang="en-US" dirty="0"/>
+              <a:t> associate the line with the color previously given to the data with </a:t>
+            </a:r>
+            <a:r>
+              <a:rPr lang="en-US" dirty="0" err="1"/>
+              <a:t>lty</a:t>
+            </a:r>
+            <a:r>
+              <a:rPr lang="en-US" dirty="0"/>
+              <a:t>= being used to maximize difference between the lines as to not confuse them.</a:t>
+            </a:r>
+          </a:p>
+        </p:txBody>
+      </p:sp>
+      <p:sp>
+        <p:nvSpPr>
+          <p:cNvPr id="4" name="Slide Number Placeholder 3"/>
+          <p:cNvSpPr>
+            <a:spLocks noGrp="1"/>
+          </p:cNvSpPr>
+          <p:nvPr>
+            <p:ph type="sldNum" sz="quarter" idx="5"/>
+          </p:nvPr>
+        </p:nvSpPr>
+        <p:spPr/>
+        <p:txBody>
+          <a:bodyPr/>
+          <a:lstStyle/>
+          <a:p>
+            <a:fld id="{B98E28CC-C23C-194C-BD01-979D3612A888}" type="slidenum">
+              <a:rPr lang="en-US" smtClean="0"/>
+              <a:t>6</a:t>
+            </a:fld>
+            <a:endParaRPr lang="en-US"/>
+          </a:p>
+        </p:txBody>
+      </p:sp>
+    </p:spTree>
+    <p:extLst>
+      <p:ext uri="{BB962C8B-B14F-4D97-AF65-F5344CB8AC3E}">
+        <p14:creationId xmlns:p14="http://schemas.microsoft.com/office/powerpoint/2010/main" val="3576742304"/>
+      </p:ext>
+    </p:extLst>
+  </p:cSld>
+  <p:clrMapOvr>
+    <a:masterClrMapping/>
+  </p:clrMapOvr>
+</p:notes>
+</file>
+
+<file path=ppt/notesSlides/notesSlide3.xml><?xml version="1.0" encoding="utf-8"?>
+<p:notes xmlns:a="http://schemas.openxmlformats.org/drawingml/2006/main" xmlns:r="http://schemas.openxmlformats.org/officeDocument/2006/relationships" xmlns:p="http://schemas.openxmlformats.org/presentationml/2006/main">
+  <p:cSld>
+    <p:spTree>
+      <p:nvGrpSpPr>
+        <p:cNvPr id="1" name=""/>
+        <p:cNvGrpSpPr/>
+        <p:nvPr/>
+      </p:nvGrpSpPr>
+      <p:grpSpPr>
+        <a:xfrm>
+          <a:off x="0" y="0"/>
+          <a:ext cx="0" cy="0"/>
+          <a:chOff x="0" y="0"/>
+          <a:chExt cx="0" cy="0"/>
+        </a:xfrm>
+      </p:grpSpPr>
+      <p:sp>
+        <p:nvSpPr>
+          <p:cNvPr id="2" name="Slide Image Placeholder 1"/>
+          <p:cNvSpPr>
+            <a:spLocks noGrp="1" noRot="1" noChangeAspect="1"/>
+          </p:cNvSpPr>
+          <p:nvPr>
+            <p:ph type="sldImg"/>
+          </p:nvPr>
+        </p:nvSpPr>
+        <p:spPr/>
+      </p:sp>
+      <p:sp>
+        <p:nvSpPr>
+          <p:cNvPr id="3" name="Notes Placeholder 2"/>
+          <p:cNvSpPr>
+            <a:spLocks noGrp="1"/>
+          </p:cNvSpPr>
+          <p:nvPr>
+            <p:ph type="body" idx="1"/>
+          </p:nvPr>
+        </p:nvSpPr>
+        <p:spPr/>
+        <p:txBody>
+          <a:bodyPr/>
+          <a:lstStyle/>
+          <a:p>
+            <a:r>
+              <a:rPr lang="en-US" dirty="0" err="1"/>
+              <a:t>ggplot</a:t>
+            </a:r>
+            <a:r>
+              <a:rPr lang="en-US" dirty="0"/>
+              <a:t> was ran again for a comparison of the overall growth of the roots and the shoots of all species within each tank. For the tanks with multiple plant species the plant species were singled out for individual analysis of their performance in the tanks. </a:t>
+            </a:r>
+            <a:r>
+              <a:rPr lang="en-US" dirty="0" err="1"/>
+              <a:t>geom_point</a:t>
+            </a:r>
+            <a:r>
+              <a:rPr lang="en-US" dirty="0"/>
+              <a:t>() draws the points defined by the x and y variables previously defined and can give them specifics on how they are presented on the graph. Within </a:t>
+            </a:r>
+            <a:r>
+              <a:rPr lang="en-US" dirty="0" err="1"/>
+              <a:t>geom</a:t>
+            </a:r>
+            <a:r>
+              <a:rPr lang="en-US" dirty="0"/>
+              <a:t> point we can give the points color (color=), tell it how big to make the points (linewidth=), </a:t>
+            </a:r>
+            <a:r>
+              <a:rPr lang="en-US" dirty="0" err="1"/>
+              <a:t>annd</a:t>
+            </a:r>
+            <a:r>
+              <a:rPr lang="en-US" dirty="0"/>
+              <a:t> the opacity of the points on a scale from 0-1 (alpha=). Within the </a:t>
+            </a:r>
+            <a:r>
+              <a:rPr lang="en-US" dirty="0" err="1"/>
+              <a:t>ggpubr</a:t>
+            </a:r>
+            <a:r>
+              <a:rPr lang="en-US" dirty="0"/>
+              <a:t> library we get the </a:t>
+            </a:r>
+            <a:r>
+              <a:rPr lang="en-US" dirty="0" err="1"/>
+              <a:t>ggarrange</a:t>
+            </a:r>
+            <a:r>
+              <a:rPr lang="en-US" dirty="0"/>
+              <a:t> function which allows for the graphs to be placed within a single page to be displayed at the same time. </a:t>
+            </a:r>
+            <a:r>
+              <a:rPr lang="en-US" dirty="0" err="1"/>
+              <a:t>rremove</a:t>
+            </a:r>
+            <a:r>
+              <a:rPr lang="en-US" dirty="0"/>
+              <a:t> allowed for the removal of the x labels that would have </a:t>
+            </a:r>
+            <a:r>
+              <a:rPr lang="en-US" dirty="0" err="1"/>
+              <a:t>otheriwse</a:t>
+            </a:r>
+            <a:r>
+              <a:rPr lang="en-US" dirty="0"/>
+              <a:t> been to jumbled to read. The label function gives a name to each graph (tank 1 is "a", tank 2 is "b" and tank 3 is "c") on the page while the </a:t>
+            </a:r>
+            <a:r>
+              <a:rPr lang="en-US" dirty="0" err="1"/>
+              <a:t>ncola</a:t>
+            </a:r>
+            <a:r>
+              <a:rPr lang="en-US" dirty="0"/>
+              <a:t> and </a:t>
+            </a:r>
+            <a:r>
+              <a:rPr lang="en-US" dirty="0" err="1"/>
+              <a:t>nrow</a:t>
+            </a:r>
+            <a:r>
+              <a:rPr lang="en-US" dirty="0"/>
+              <a:t> lays out the grid of how the graphs show up. In this case it is a 2x2 pattern. </a:t>
+            </a:r>
+          </a:p>
+        </p:txBody>
+      </p:sp>
+      <p:sp>
+        <p:nvSpPr>
+          <p:cNvPr id="4" name="Slide Number Placeholder 3"/>
+          <p:cNvSpPr>
+            <a:spLocks noGrp="1"/>
+          </p:cNvSpPr>
+          <p:nvPr>
+            <p:ph type="sldNum" sz="quarter" idx="5"/>
+          </p:nvPr>
+        </p:nvSpPr>
+        <p:spPr/>
+        <p:txBody>
+          <a:bodyPr/>
+          <a:lstStyle/>
+          <a:p>
+            <a:fld id="{B98E28CC-C23C-194C-BD01-979D3612A888}" type="slidenum">
+              <a:rPr lang="en-US" smtClean="0"/>
+              <a:t>7</a:t>
+            </a:fld>
+            <a:endParaRPr lang="en-US"/>
+          </a:p>
+        </p:txBody>
+      </p:sp>
+    </p:spTree>
+    <p:extLst>
+      <p:ext uri="{BB962C8B-B14F-4D97-AF65-F5344CB8AC3E}">
+        <p14:creationId xmlns:p14="http://schemas.microsoft.com/office/powerpoint/2010/main" val="2838190014"/>
+      </p:ext>
+    </p:extLst>
+  </p:cSld>
+  <p:clrMapOvr>
+    <a:masterClrMapping/>
+  </p:clrMapOvr>
+</p:notes>
+</file>
+
+<file path=ppt/notesSlides/notesSlide4.xml><?xml version="1.0" encoding="utf-8"?>
+<p:notes xmlns:a="http://schemas.openxmlformats.org/drawingml/2006/main" xmlns:r="http://schemas.openxmlformats.org/officeDocument/2006/relationships" xmlns:p="http://schemas.openxmlformats.org/presentationml/2006/main">
+  <p:cSld>
+    <p:spTree>
+      <p:nvGrpSpPr>
+        <p:cNvPr id="1" name=""/>
+        <p:cNvGrpSpPr/>
+        <p:nvPr/>
+      </p:nvGrpSpPr>
+      <p:grpSpPr>
+        <a:xfrm>
+          <a:off x="0" y="0"/>
+          <a:ext cx="0" cy="0"/>
+          <a:chOff x="0" y="0"/>
+          <a:chExt cx="0" cy="0"/>
+        </a:xfrm>
+      </p:grpSpPr>
+      <p:sp>
+        <p:nvSpPr>
+          <p:cNvPr id="2" name="Slide Image Placeholder 1"/>
+          <p:cNvSpPr>
+            <a:spLocks noGrp="1" noRot="1" noChangeAspect="1"/>
+          </p:cNvSpPr>
+          <p:nvPr>
+            <p:ph type="sldImg"/>
+          </p:nvPr>
+        </p:nvSpPr>
+        <p:spPr/>
+      </p:sp>
+      <p:sp>
+        <p:nvSpPr>
+          <p:cNvPr id="3" name="Notes Placeholder 2"/>
+          <p:cNvSpPr>
+            <a:spLocks noGrp="1"/>
+          </p:cNvSpPr>
+          <p:nvPr>
+            <p:ph type="body" idx="1"/>
+          </p:nvPr>
+        </p:nvSpPr>
+        <p:spPr/>
+        <p:txBody>
+          <a:bodyPr/>
+          <a:lstStyle/>
+          <a:p>
+            <a:r>
+              <a:rPr lang="en-US" dirty="0" err="1"/>
+              <a:t>Anova</a:t>
+            </a:r>
+            <a:r>
+              <a:rPr lang="en-US" dirty="0"/>
+              <a:t> was the next form of data to calculate. This is useful for testing three or more variables at a time, which in this case we have three plant species so this is perfect. This is similar to a two sample t-test, but with ANOVA we are likely to have fewer type 1 errors than the t-test. Within the </a:t>
+            </a:r>
+            <a:r>
+              <a:rPr lang="en-US" dirty="0" err="1"/>
+              <a:t>anova</a:t>
+            </a:r>
+            <a:r>
+              <a:rPr lang="en-US" dirty="0"/>
+              <a:t> shoot length was tested by species to see if the data is statistically significant from one another. Based on the p-value the data does come back as statistically significant but with ANOVA, it cannot give specifics as to which set of data it is, which is why a Tukey test was run next to compare datasets. </a:t>
+            </a:r>
+          </a:p>
+        </p:txBody>
+      </p:sp>
+      <p:sp>
+        <p:nvSpPr>
+          <p:cNvPr id="4" name="Slide Number Placeholder 3"/>
+          <p:cNvSpPr>
+            <a:spLocks noGrp="1"/>
+          </p:cNvSpPr>
+          <p:nvPr>
+            <p:ph type="sldNum" sz="quarter" idx="5"/>
+          </p:nvPr>
+        </p:nvSpPr>
+        <p:spPr/>
+        <p:txBody>
+          <a:bodyPr/>
+          <a:lstStyle/>
+          <a:p>
+            <a:fld id="{B98E28CC-C23C-194C-BD01-979D3612A888}" type="slidenum">
+              <a:rPr lang="en-US" smtClean="0"/>
+              <a:t>8</a:t>
+            </a:fld>
+            <a:endParaRPr lang="en-US"/>
+          </a:p>
+        </p:txBody>
+      </p:sp>
+    </p:spTree>
+    <p:extLst>
+      <p:ext uri="{BB962C8B-B14F-4D97-AF65-F5344CB8AC3E}">
+        <p14:creationId xmlns:p14="http://schemas.microsoft.com/office/powerpoint/2010/main" val="3997660605"/>
+      </p:ext>
+    </p:extLst>
+  </p:cSld>
+  <p:clrMapOvr>
+    <a:masterClrMapping/>
+  </p:clrMapOvr>
+</p:notes>
+</file>
+
+<file path=ppt/notesSlides/notesSlide5.xml><?xml version="1.0" encoding="utf-8"?>
+<p:notes xmlns:a="http://schemas.openxmlformats.org/drawingml/2006/main" xmlns:r="http://schemas.openxmlformats.org/officeDocument/2006/relationships" xmlns:p="http://schemas.openxmlformats.org/presentationml/2006/main">
+  <p:cSld>
+    <p:spTree>
+      <p:nvGrpSpPr>
+        <p:cNvPr id="1" name=""/>
+        <p:cNvGrpSpPr/>
+        <p:nvPr/>
+      </p:nvGrpSpPr>
+      <p:grpSpPr>
+        <a:xfrm>
+          <a:off x="0" y="0"/>
+          <a:ext cx="0" cy="0"/>
+          <a:chOff x="0" y="0"/>
+          <a:chExt cx="0" cy="0"/>
+        </a:xfrm>
+      </p:grpSpPr>
+      <p:sp>
+        <p:nvSpPr>
+          <p:cNvPr id="2" name="Slide Image Placeholder 1"/>
+          <p:cNvSpPr>
+            <a:spLocks noGrp="1" noRot="1" noChangeAspect="1"/>
+          </p:cNvSpPr>
+          <p:nvPr>
+            <p:ph type="sldImg"/>
+          </p:nvPr>
+        </p:nvSpPr>
+        <p:spPr/>
+      </p:sp>
+      <p:sp>
+        <p:nvSpPr>
+          <p:cNvPr id="3" name="Notes Placeholder 2"/>
+          <p:cNvSpPr>
+            <a:spLocks noGrp="1"/>
+          </p:cNvSpPr>
+          <p:nvPr>
+            <p:ph type="body" idx="1"/>
+          </p:nvPr>
+        </p:nvSpPr>
+        <p:spPr/>
+        <p:txBody>
+          <a:bodyPr/>
+          <a:lstStyle/>
+          <a:p>
+            <a:pPr marL="0" marR="0" lvl="0" indent="0" algn="l" defTabSz="914400" rtl="0" eaLnBrk="1" fontAlgn="auto" latinLnBrk="0" hangingPunct="1">
+              <a:lnSpc>
+                <a:spcPct val="100000"/>
+              </a:lnSpc>
+              <a:spcBef>
+                <a:spcPts val="0"/>
+              </a:spcBef>
+              <a:spcAft>
+                <a:spcPts val="0"/>
+              </a:spcAft>
+              <a:buClrTx/>
+              <a:buSzTx/>
+              <a:buFontTx/>
+              <a:buNone/>
+              <a:tabLst/>
+              <a:defRPr/>
+            </a:pPr>
+            <a:r>
+              <a:rPr lang="en-US" dirty="0"/>
+              <a:t>ANOVA was used again to test the association between plants within the same treatment and eventually further down the file between tanks. Within the ANOVA function using </a:t>
+            </a:r>
+            <a:r>
+              <a:rPr lang="en-US" dirty="0" err="1"/>
+              <a:t>aov</a:t>
+            </a:r>
+            <a:r>
+              <a:rPr lang="en-US" dirty="0"/>
+              <a:t>() you can set up </a:t>
+            </a:r>
+            <a:r>
+              <a:rPr lang="en-US" dirty="0" err="1"/>
+              <a:t>specfic</a:t>
+            </a:r>
+            <a:r>
+              <a:rPr lang="en-US" dirty="0"/>
+              <a:t> columns within the </a:t>
+            </a:r>
+            <a:r>
+              <a:rPr lang="en-US" dirty="0" err="1"/>
+              <a:t>dataframe</a:t>
+            </a:r>
+            <a:r>
+              <a:rPr lang="en-US" dirty="0"/>
+              <a:t> as seen here by gucplant$A1.s ~ gucplantA2.s. Within these ANOVA tests, specifically this one here, the p-value is 0.533 but the f-value can be considered small at 0.412. This shows that the data within this specific ANOVA is not statistically different from one another. </a:t>
+            </a:r>
+          </a:p>
+          <a:p>
+            <a:endParaRPr lang="en-US" dirty="0"/>
+          </a:p>
+        </p:txBody>
+      </p:sp>
+      <p:sp>
+        <p:nvSpPr>
+          <p:cNvPr id="4" name="Slide Number Placeholder 3"/>
+          <p:cNvSpPr>
+            <a:spLocks noGrp="1"/>
+          </p:cNvSpPr>
+          <p:nvPr>
+            <p:ph type="sldNum" sz="quarter" idx="5"/>
+          </p:nvPr>
+        </p:nvSpPr>
+        <p:spPr/>
+        <p:txBody>
+          <a:bodyPr/>
+          <a:lstStyle/>
+          <a:p>
+            <a:fld id="{B98E28CC-C23C-194C-BD01-979D3612A888}" type="slidenum">
+              <a:rPr lang="en-US" smtClean="0"/>
+              <a:t>9</a:t>
+            </a:fld>
+            <a:endParaRPr lang="en-US"/>
+          </a:p>
+        </p:txBody>
+      </p:sp>
+    </p:spTree>
+    <p:extLst>
+      <p:ext uri="{BB962C8B-B14F-4D97-AF65-F5344CB8AC3E}">
+        <p14:creationId xmlns:p14="http://schemas.microsoft.com/office/powerpoint/2010/main" val="2461550617"/>
+      </p:ext>
+    </p:extLst>
+  </p:cSld>
+  <p:clrMapOvr>
+    <a:masterClrMapping/>
+  </p:clrMapOvr>
+</p:notes>
+</file>
+
 <file path=ppt/slideLayouts/slideLayout1.xml><?xml version="1.0" encoding="utf-8"?>
 <p:sldLayout xmlns:a="http://schemas.openxmlformats.org/drawingml/2006/main" xmlns:r="http://schemas.openxmlformats.org/officeDocument/2006/relationships" xmlns:p="http://schemas.openxmlformats.org/presentationml/2006/main" type="title" preserve="1">
   <p:cSld name="Title Slide">
@@ -266,7 +1251,7 @@
           <a:p>
             <a:fld id="{E0E4562E-BC32-B843-9BB2-A9CE5A5D38F1}" type="datetimeFigureOut">
               <a:rPr lang="en-US" smtClean="0"/>
-              <a:t>12/6/22</a:t>
+              <a:t>12/7/22</a:t>
             </a:fld>
             <a:endParaRPr lang="en-US"/>
           </a:p>
@@ -464,7 +1449,7 @@
           <a:p>
             <a:fld id="{E0E4562E-BC32-B843-9BB2-A9CE5A5D38F1}" type="datetimeFigureOut">
               <a:rPr lang="en-US" smtClean="0"/>
-              <a:t>12/6/22</a:t>
+              <a:t>12/7/22</a:t>
             </a:fld>
             <a:endParaRPr lang="en-US"/>
           </a:p>
@@ -672,7 +1657,7 @@
           <a:p>
             <a:fld id="{E0E4562E-BC32-B843-9BB2-A9CE5A5D38F1}" type="datetimeFigureOut">
               <a:rPr lang="en-US" smtClean="0"/>
-              <a:t>12/6/22</a:t>
+              <a:t>12/7/22</a:t>
             </a:fld>
             <a:endParaRPr lang="en-US"/>
           </a:p>
@@ -870,7 +1855,7 @@
           <a:p>
             <a:fld id="{E0E4562E-BC32-B843-9BB2-A9CE5A5D38F1}" type="datetimeFigureOut">
               <a:rPr lang="en-US" smtClean="0"/>
-              <a:t>12/6/22</a:t>
+              <a:t>12/7/22</a:t>
             </a:fld>
             <a:endParaRPr lang="en-US"/>
           </a:p>
@@ -1145,7 +2130,7 @@
           <a:p>
             <a:fld id="{E0E4562E-BC32-B843-9BB2-A9CE5A5D38F1}" type="datetimeFigureOut">
               <a:rPr lang="en-US" smtClean="0"/>
-              <a:t>12/6/22</a:t>
+              <a:t>12/7/22</a:t>
             </a:fld>
             <a:endParaRPr lang="en-US"/>
           </a:p>
@@ -1410,7 +2395,7 @@
           <a:p>
             <a:fld id="{E0E4562E-BC32-B843-9BB2-A9CE5A5D38F1}" type="datetimeFigureOut">
               <a:rPr lang="en-US" smtClean="0"/>
-              <a:t>12/6/22</a:t>
+              <a:t>12/7/22</a:t>
             </a:fld>
             <a:endParaRPr lang="en-US"/>
           </a:p>
@@ -1822,7 +2807,7 @@
           <a:p>
             <a:fld id="{E0E4562E-BC32-B843-9BB2-A9CE5A5D38F1}" type="datetimeFigureOut">
               <a:rPr lang="en-US" smtClean="0"/>
-              <a:t>12/6/22</a:t>
+              <a:t>12/7/22</a:t>
             </a:fld>
             <a:endParaRPr lang="en-US"/>
           </a:p>
@@ -1963,7 +2948,7 @@
           <a:p>
             <a:fld id="{E0E4562E-BC32-B843-9BB2-A9CE5A5D38F1}" type="datetimeFigureOut">
               <a:rPr lang="en-US" smtClean="0"/>
-              <a:t>12/6/22</a:t>
+              <a:t>12/7/22</a:t>
             </a:fld>
             <a:endParaRPr lang="en-US"/>
           </a:p>
@@ -2076,7 +3061,7 @@
           <a:p>
             <a:fld id="{E0E4562E-BC32-B843-9BB2-A9CE5A5D38F1}" type="datetimeFigureOut">
               <a:rPr lang="en-US" smtClean="0"/>
-              <a:t>12/6/22</a:t>
+              <a:t>12/7/22</a:t>
             </a:fld>
             <a:endParaRPr lang="en-US"/>
           </a:p>
@@ -2387,7 +3372,7 @@
           <a:p>
             <a:fld id="{E0E4562E-BC32-B843-9BB2-A9CE5A5D38F1}" type="datetimeFigureOut">
               <a:rPr lang="en-US" smtClean="0"/>
-              <a:t>12/6/22</a:t>
+              <a:t>12/7/22</a:t>
             </a:fld>
             <a:endParaRPr lang="en-US"/>
           </a:p>
@@ -2675,7 +3660,7 @@
           <a:p>
             <a:fld id="{E0E4562E-BC32-B843-9BB2-A9CE5A5D38F1}" type="datetimeFigureOut">
               <a:rPr lang="en-US" smtClean="0"/>
-              <a:t>12/6/22</a:t>
+              <a:t>12/7/22</a:t>
             </a:fld>
             <a:endParaRPr lang="en-US"/>
           </a:p>
@@ -2916,7 +3901,7 @@
           <a:p>
             <a:fld id="{E0E4562E-BC32-B843-9BB2-A9CE5A5D38F1}" type="datetimeFigureOut">
               <a:rPr lang="en-US" smtClean="0"/>
-              <a:t>12/6/22</a:t>
+              <a:t>12/7/22</a:t>
             </a:fld>
             <a:endParaRPr lang="en-US"/>
           </a:p>
@@ -3349,42 +4334,56 @@
             <p:ph type="ctrTitle"/>
           </p:nvPr>
         </p:nvSpPr>
-        <p:spPr/>
+        <p:spPr>
+          <a:xfrm>
+            <a:off x="0" y="1122363"/>
+            <a:ext cx="12192000" cy="2387600"/>
+          </a:xfrm>
+        </p:spPr>
+        <p:txBody>
+          <a:bodyPr>
+            <a:noAutofit/>
+          </a:bodyPr>
+          <a:lstStyle/>
+          <a:p>
+            <a:r>
+              <a:rPr lang="en-US" sz="4400" dirty="0"/>
+              <a:t>Nitrogen and Phosphorus Remediation in Mesocosm Floating Treatment Wetlands receiving Municipal and Aquacultural Wastewater</a:t>
+            </a:r>
+          </a:p>
+        </p:txBody>
+      </p:sp>
+      <p:sp>
+        <p:nvSpPr>
+          <p:cNvPr id="3" name="Subtitle 2">
+            <a:extLst>
+              <a:ext uri="{FF2B5EF4-FFF2-40B4-BE49-F238E27FC236}">
+                <a16:creationId xmlns:a16="http://schemas.microsoft.com/office/drawing/2014/main" id="{4800C15A-7B7A-7176-0DDE-93602A78D773}"/>
+              </a:ext>
+            </a:extLst>
+          </p:cNvPr>
+          <p:cNvSpPr>
+            <a:spLocks noGrp="1"/>
+          </p:cNvSpPr>
+          <p:nvPr>
+            <p:ph type="subTitle" idx="1"/>
+          </p:nvPr>
+        </p:nvSpPr>
+        <p:spPr>
+          <a:xfrm>
+            <a:off x="1524000" y="3602037"/>
+            <a:ext cx="9144000" cy="2387599"/>
+          </a:xfrm>
+        </p:spPr>
         <p:txBody>
           <a:bodyPr/>
           <a:lstStyle/>
           <a:p>
             <a:r>
-              <a:rPr lang="en-US"/>
-              <a:t>BIOL 6220: Practical </a:t>
-            </a:r>
-            <a:r>
-              <a:rPr lang="en-US" dirty="0"/>
-              <a:t>Computing Final Project</a:t>
-            </a:r>
-          </a:p>
-        </p:txBody>
-      </p:sp>
-      <p:sp>
-        <p:nvSpPr>
-          <p:cNvPr id="3" name="Subtitle 2">
-            <a:extLst>
-              <a:ext uri="{FF2B5EF4-FFF2-40B4-BE49-F238E27FC236}">
-                <a16:creationId xmlns:a16="http://schemas.microsoft.com/office/drawing/2014/main" id="{4800C15A-7B7A-7176-0DDE-93602A78D773}"/>
-              </a:ext>
-            </a:extLst>
-          </p:cNvPr>
-          <p:cNvSpPr>
-            <a:spLocks noGrp="1"/>
-          </p:cNvSpPr>
-          <p:nvPr>
-            <p:ph type="subTitle" idx="1"/>
-          </p:nvPr>
-        </p:nvSpPr>
-        <p:spPr/>
-        <p:txBody>
-          <a:bodyPr/>
-          <a:lstStyle/>
+              <a:rPr lang="en-US" dirty="0"/>
+              <a:t>BIOL 6220: Final Project</a:t>
+            </a:r>
+          </a:p>
           <a:p>
             <a:r>
               <a:rPr lang="en-US" dirty="0"/>
@@ -3409,6 +4408,104 @@
     <p:extLst>
       <p:ext uri="{BB962C8B-B14F-4D97-AF65-F5344CB8AC3E}">
         <p14:creationId xmlns:p14="http://schemas.microsoft.com/office/powerpoint/2010/main" val="3421104245"/>
+      </p:ext>
+    </p:extLst>
+  </p:cSld>
+  <p:clrMapOvr>
+    <a:masterClrMapping/>
+  </p:clrMapOvr>
+</p:sld>
+</file>
+
+<file path=ppt/slides/slide10.xml><?xml version="1.0" encoding="utf-8"?>
+<p:sld xmlns:a="http://schemas.openxmlformats.org/drawingml/2006/main" xmlns:r="http://schemas.openxmlformats.org/officeDocument/2006/relationships" xmlns:p="http://schemas.openxmlformats.org/presentationml/2006/main">
+  <p:cSld>
+    <p:spTree>
+      <p:nvGrpSpPr>
+        <p:cNvPr id="1" name=""/>
+        <p:cNvGrpSpPr/>
+        <p:nvPr/>
+      </p:nvGrpSpPr>
+      <p:grpSpPr>
+        <a:xfrm>
+          <a:off x="0" y="0"/>
+          <a:ext cx="0" cy="0"/>
+          <a:chOff x="0" y="0"/>
+          <a:chExt cx="0" cy="0"/>
+        </a:xfrm>
+      </p:grpSpPr>
+      <p:sp>
+        <p:nvSpPr>
+          <p:cNvPr id="5" name="Title 4">
+            <a:extLst>
+              <a:ext uri="{FF2B5EF4-FFF2-40B4-BE49-F238E27FC236}">
+                <a16:creationId xmlns:a16="http://schemas.microsoft.com/office/drawing/2014/main" id="{50A7574D-FDBF-54E7-E6C2-D08112416EC1}"/>
+              </a:ext>
+            </a:extLst>
+          </p:cNvPr>
+          <p:cNvSpPr>
+            <a:spLocks noGrp="1"/>
+          </p:cNvSpPr>
+          <p:nvPr>
+            <p:ph type="title"/>
+          </p:nvPr>
+        </p:nvSpPr>
+        <p:spPr/>
+        <p:txBody>
+          <a:bodyPr/>
+          <a:lstStyle/>
+          <a:p>
+            <a:r>
+              <a:rPr lang="en-US" dirty="0" err="1"/>
+              <a:t>Github</a:t>
+            </a:r>
+            <a:r>
+              <a:rPr lang="en-US" dirty="0"/>
+              <a:t>	</a:t>
+            </a:r>
+          </a:p>
+        </p:txBody>
+      </p:sp>
+      <p:sp>
+        <p:nvSpPr>
+          <p:cNvPr id="6" name="Content Placeholder 5">
+            <a:extLst>
+              <a:ext uri="{FF2B5EF4-FFF2-40B4-BE49-F238E27FC236}">
+                <a16:creationId xmlns:a16="http://schemas.microsoft.com/office/drawing/2014/main" id="{BCB277B0-7826-417A-7867-81B19EE2099D}"/>
+              </a:ext>
+            </a:extLst>
+          </p:cNvPr>
+          <p:cNvSpPr>
+            <a:spLocks noGrp="1"/>
+          </p:cNvSpPr>
+          <p:nvPr>
+            <p:ph idx="1"/>
+          </p:nvPr>
+        </p:nvSpPr>
+        <p:spPr/>
+        <p:txBody>
+          <a:bodyPr/>
+          <a:lstStyle/>
+          <a:p>
+            <a:r>
+              <a:rPr lang="en-US" dirty="0"/>
+              <a:t>https://</a:t>
+            </a:r>
+            <a:r>
+              <a:rPr lang="en-US" dirty="0" err="1"/>
+              <a:t>github.com</a:t>
+            </a:r>
+            <a:r>
+              <a:rPr lang="en-US" dirty="0"/>
+              <a:t>/Matt9120/PracComp2022</a:t>
+            </a:r>
+          </a:p>
+        </p:txBody>
+      </p:sp>
+    </p:spTree>
+    <p:extLst>
+      <p:ext uri="{BB962C8B-B14F-4D97-AF65-F5344CB8AC3E}">
+        <p14:creationId xmlns:p14="http://schemas.microsoft.com/office/powerpoint/2010/main" val="2176917926"/>
       </p:ext>
     </p:extLst>
   </p:cSld>
@@ -4167,6 +5264,123 @@
       </p:grpSpPr>
       <p:sp>
         <p:nvSpPr>
+          <p:cNvPr id="2" name="Title 1">
+            <a:extLst>
+              <a:ext uri="{FF2B5EF4-FFF2-40B4-BE49-F238E27FC236}">
+                <a16:creationId xmlns:a16="http://schemas.microsoft.com/office/drawing/2014/main" id="{917AEC26-9745-8DC6-88B0-9BCFDDCDEFBC}"/>
+              </a:ext>
+            </a:extLst>
+          </p:cNvPr>
+          <p:cNvSpPr>
+            <a:spLocks noGrp="1"/>
+          </p:cNvSpPr>
+          <p:nvPr>
+            <p:ph type="title"/>
+          </p:nvPr>
+        </p:nvSpPr>
+        <p:spPr/>
+        <p:txBody>
+          <a:bodyPr/>
+          <a:lstStyle/>
+          <a:p>
+            <a:r>
+              <a:rPr lang="en-US" dirty="0"/>
+              <a:t>The Data</a:t>
+            </a:r>
+          </a:p>
+        </p:txBody>
+      </p:sp>
+      <p:pic>
+        <p:nvPicPr>
+          <p:cNvPr id="5" name="Content Placeholder 4" descr="Table&#10;&#10;Description automatically generated">
+            <a:extLst>
+              <a:ext uri="{FF2B5EF4-FFF2-40B4-BE49-F238E27FC236}">
+                <a16:creationId xmlns:a16="http://schemas.microsoft.com/office/drawing/2014/main" id="{0F1F21CD-5B09-5573-F3F3-9E95565ED6A4}"/>
+              </a:ext>
+            </a:extLst>
+          </p:cNvPr>
+          <p:cNvPicPr>
+            <a:picLocks noGrp="1" noChangeAspect="1"/>
+          </p:cNvPicPr>
+          <p:nvPr>
+            <p:ph idx="1"/>
+          </p:nvPr>
+        </p:nvPicPr>
+        <p:blipFill>
+          <a:blip r:embed="rId2"/>
+          <a:stretch>
+            <a:fillRect/>
+          </a:stretch>
+        </p:blipFill>
+        <p:spPr>
+          <a:xfrm>
+            <a:off x="0" y="1825625"/>
+            <a:ext cx="6096000" cy="4351338"/>
+          </a:xfrm>
+        </p:spPr>
+      </p:pic>
+      <p:pic>
+        <p:nvPicPr>
+          <p:cNvPr id="7" name="Picture 6" descr="Table&#10;&#10;Description automatically generated">
+            <a:extLst>
+              <a:ext uri="{FF2B5EF4-FFF2-40B4-BE49-F238E27FC236}">
+                <a16:creationId xmlns:a16="http://schemas.microsoft.com/office/drawing/2014/main" id="{3942310C-0E25-EFEF-D8EC-D458EAB310F3}"/>
+              </a:ext>
+            </a:extLst>
+          </p:cNvPr>
+          <p:cNvPicPr>
+            <a:picLocks noChangeAspect="1"/>
+          </p:cNvPicPr>
+          <p:nvPr/>
+        </p:nvPicPr>
+        <p:blipFill>
+          <a:blip r:embed="rId3"/>
+          <a:stretch>
+            <a:fillRect/>
+          </a:stretch>
+        </p:blipFill>
+        <p:spPr>
+          <a:xfrm>
+            <a:off x="6096000" y="1825625"/>
+            <a:ext cx="6096000" cy="4341813"/>
+          </a:xfrm>
+          <a:prstGeom prst="rect">
+            <a:avLst/>
+          </a:prstGeom>
+        </p:spPr>
+      </p:pic>
+    </p:spTree>
+    <p:extLst>
+      <p:ext uri="{BB962C8B-B14F-4D97-AF65-F5344CB8AC3E}">
+        <p14:creationId xmlns:p14="http://schemas.microsoft.com/office/powerpoint/2010/main" val="3991520904"/>
+      </p:ext>
+    </p:extLst>
+  </p:cSld>
+  <p:clrMapOvr>
+    <a:masterClrMapping/>
+  </p:clrMapOvr>
+</p:sld>
+</file>
+
+<file path=ppt/slides/slide5.xml><?xml version="1.0" encoding="utf-8"?>
+<p:sld xmlns:a="http://schemas.openxmlformats.org/drawingml/2006/main" xmlns:r="http://schemas.openxmlformats.org/officeDocument/2006/relationships" xmlns:p="http://schemas.openxmlformats.org/presentationml/2006/main">
+  <p:cSld>
+    <p:spTree>
+      <p:nvGrpSpPr>
+        <p:cNvPr id="1" name=""/>
+        <p:cNvGrpSpPr/>
+        <p:nvPr/>
+      </p:nvGrpSpPr>
+      <p:grpSpPr>
+        <a:xfrm>
+          <a:off x="0" y="0"/>
+          <a:ext cx="0" cy="0"/>
+          <a:chOff x="0" y="0"/>
+          <a:chExt cx="0" cy="0"/>
+        </a:xfrm>
+      </p:grpSpPr>
+      <p:sp>
+        <p:nvSpPr>
           <p:cNvPr id="4" name="Title 3">
             <a:extLst>
               <a:ext uri="{FF2B5EF4-FFF2-40B4-BE49-F238E27FC236}">
@@ -4332,7 +5546,7 @@
           <p:nvPr/>
         </p:nvPicPr>
         <p:blipFill>
-          <a:blip r:embed="rId2"/>
+          <a:blip r:embed="rId3"/>
           <a:stretch>
             <a:fillRect/>
           </a:stretch>
@@ -4360,7 +5574,7 @@
 </p:sld>
 </file>
 
-<file path=ppt/slides/slide5.xml><?xml version="1.0" encoding="utf-8"?>
+<file path=ppt/slides/slide6.xml><?xml version="1.0" encoding="utf-8"?>
 <p:sld xmlns:a="http://schemas.openxmlformats.org/drawingml/2006/main" xmlns:r="http://schemas.openxmlformats.org/officeDocument/2006/relationships" xmlns:p="http://schemas.openxmlformats.org/presentationml/2006/main">
   <p:cSld>
     <p:spTree>
@@ -4435,7 +5649,7 @@
           <a:p>
             <a:r>
               <a:rPr lang="en-US" dirty="0"/>
-              <a:t>‘’’{r}</a:t>
+              <a:t>```{r}</a:t>
             </a:r>
           </a:p>
           <a:p>
@@ -4822,7 +6036,7 @@
           <a:p>
             <a:r>
               <a:rPr lang="en-US" dirty="0"/>
-              <a:t>‘’’</a:t>
+              <a:t>```</a:t>
             </a:r>
           </a:p>
         </p:txBody>
@@ -4842,7 +6056,7 @@
           <p:nvPr/>
         </p:nvPicPr>
         <p:blipFill>
-          <a:blip r:embed="rId2"/>
+          <a:blip r:embed="rId3"/>
           <a:stretch>
             <a:fillRect/>
           </a:stretch>
@@ -4870,94 +6084,6 @@
 </p:sld>
 </file>
 
-<file path=ppt/slides/slide6.xml><?xml version="1.0" encoding="utf-8"?>
-<p:sld xmlns:a="http://schemas.openxmlformats.org/drawingml/2006/main" xmlns:r="http://schemas.openxmlformats.org/officeDocument/2006/relationships" xmlns:p="http://schemas.openxmlformats.org/presentationml/2006/main">
-  <p:cSld>
-    <p:spTree>
-      <p:nvGrpSpPr>
-        <p:cNvPr id="1" name=""/>
-        <p:cNvGrpSpPr/>
-        <p:nvPr/>
-      </p:nvGrpSpPr>
-      <p:grpSpPr>
-        <a:xfrm>
-          <a:off x="0" y="0"/>
-          <a:ext cx="0" cy="0"/>
-          <a:chOff x="0" y="0"/>
-          <a:chExt cx="0" cy="0"/>
-        </a:xfrm>
-      </p:grpSpPr>
-      <p:sp>
-        <p:nvSpPr>
-          <p:cNvPr id="2" name="Title 1">
-            <a:extLst>
-              <a:ext uri="{FF2B5EF4-FFF2-40B4-BE49-F238E27FC236}">
-                <a16:creationId xmlns:a16="http://schemas.microsoft.com/office/drawing/2014/main" id="{CA908265-E2AB-83B1-1AF1-324598CF695B}"/>
-              </a:ext>
-            </a:extLst>
-          </p:cNvPr>
-          <p:cNvSpPr>
-            <a:spLocks noGrp="1"/>
-          </p:cNvSpPr>
-          <p:nvPr>
-            <p:ph type="title"/>
-          </p:nvPr>
-        </p:nvSpPr>
-        <p:spPr/>
-        <p:txBody>
-          <a:bodyPr/>
-          <a:lstStyle/>
-          <a:p>
-            <a:r>
-              <a:rPr lang="en-US" dirty="0"/>
-              <a:t>ANOVA and Tukey</a:t>
-            </a:r>
-          </a:p>
-        </p:txBody>
-      </p:sp>
-      <p:pic>
-        <p:nvPicPr>
-          <p:cNvPr id="5" name="Picture 4" descr="Graphical user interface, text, application, Teams&#10;&#10;Description automatically generated">
-            <a:extLst>
-              <a:ext uri="{FF2B5EF4-FFF2-40B4-BE49-F238E27FC236}">
-                <a16:creationId xmlns:a16="http://schemas.microsoft.com/office/drawing/2014/main" id="{A0875081-B961-4E7F-920D-52EA408F2422}"/>
-              </a:ext>
-            </a:extLst>
-          </p:cNvPr>
-          <p:cNvPicPr>
-            <a:picLocks noChangeAspect="1"/>
-          </p:cNvPicPr>
-          <p:nvPr/>
-        </p:nvPicPr>
-        <p:blipFill>
-          <a:blip r:embed="rId2"/>
-          <a:stretch>
-            <a:fillRect/>
-          </a:stretch>
-        </p:blipFill>
-        <p:spPr>
-          <a:xfrm>
-            <a:off x="366712" y="1440469"/>
-            <a:ext cx="11458575" cy="4731489"/>
-          </a:xfrm>
-          <a:prstGeom prst="rect">
-            <a:avLst/>
-          </a:prstGeom>
-        </p:spPr>
-      </p:pic>
-    </p:spTree>
-    <p:extLst>
-      <p:ext uri="{BB962C8B-B14F-4D97-AF65-F5344CB8AC3E}">
-        <p14:creationId xmlns:p14="http://schemas.microsoft.com/office/powerpoint/2010/main" val="695825339"/>
-      </p:ext>
-    </p:extLst>
-  </p:cSld>
-  <p:clrMapOvr>
-    <a:masterClrMapping/>
-  </p:clrMapOvr>
-</p:sld>
-</file>
-
 <file path=ppt/slides/slide7.xml><?xml version="1.0" encoding="utf-8"?>
 <p:sld xmlns:a="http://schemas.openxmlformats.org/drawingml/2006/main" xmlns:r="http://schemas.openxmlformats.org/officeDocument/2006/relationships" xmlns:p="http://schemas.openxmlformats.org/presentationml/2006/main">
   <p:cSld>
@@ -5033,7 +6159,7 @@
           <a:p>
             <a:r>
               <a:rPr lang="en-US" dirty="0"/>
-              <a:t>‘’’{r}</a:t>
+              <a:t>```{r}</a:t>
             </a:r>
           </a:p>
           <a:p>
@@ -5378,7 +6504,7 @@
           <a:p>
             <a:r>
               <a:rPr lang="en-US" dirty="0"/>
-              <a:t>‘’’</a:t>
+              <a:t>```</a:t>
             </a:r>
           </a:p>
         </p:txBody>
@@ -5398,7 +6524,7 @@
           <p:nvPr/>
         </p:nvPicPr>
         <p:blipFill>
-          <a:blip r:embed="rId2"/>
+          <a:blip r:embed="rId3"/>
           <a:stretch>
             <a:fillRect/>
           </a:stretch>
@@ -5445,10 +6571,10 @@
       </p:grpSpPr>
       <p:sp>
         <p:nvSpPr>
-          <p:cNvPr id="5" name="Title 4">
-            <a:extLst>
-              <a:ext uri="{FF2B5EF4-FFF2-40B4-BE49-F238E27FC236}">
-                <a16:creationId xmlns:a16="http://schemas.microsoft.com/office/drawing/2014/main" id="{50A7574D-FDBF-54E7-E6C2-D08112416EC1}"/>
+          <p:cNvPr id="2" name="Title 1">
+            <a:extLst>
+              <a:ext uri="{FF2B5EF4-FFF2-40B4-BE49-F238E27FC236}">
+                <a16:creationId xmlns:a16="http://schemas.microsoft.com/office/drawing/2014/main" id="{CA908265-E2AB-83B1-1AF1-324598CF695B}"/>
               </a:ext>
             </a:extLst>
           </p:cNvPr>
@@ -5459,62 +6585,151 @@
             <p:ph type="title"/>
           </p:nvPr>
         </p:nvSpPr>
-        <p:spPr/>
+        <p:spPr>
+          <a:xfrm>
+            <a:off x="838199" y="114906"/>
+            <a:ext cx="10515600" cy="1325563"/>
+          </a:xfrm>
+        </p:spPr>
         <p:txBody>
           <a:bodyPr/>
           <a:lstStyle/>
           <a:p>
             <a:r>
-              <a:rPr lang="en-US" dirty="0" err="1"/>
-              <a:t>Github</a:t>
-            </a:r>
-            <a:r>
-              <a:rPr lang="en-US" dirty="0"/>
-              <a:t>	</a:t>
-            </a:r>
-          </a:p>
-        </p:txBody>
-      </p:sp>
-      <p:sp>
-        <p:nvSpPr>
-          <p:cNvPr id="6" name="Content Placeholder 5">
-            <a:extLst>
-              <a:ext uri="{FF2B5EF4-FFF2-40B4-BE49-F238E27FC236}">
-                <a16:creationId xmlns:a16="http://schemas.microsoft.com/office/drawing/2014/main" id="{BCB277B0-7826-417A-7867-81B19EE2099D}"/>
-              </a:ext>
-            </a:extLst>
-          </p:cNvPr>
-          <p:cNvSpPr>
-            <a:spLocks noGrp="1"/>
-          </p:cNvSpPr>
-          <p:nvPr>
-            <p:ph idx="1"/>
-          </p:nvPr>
-        </p:nvSpPr>
-        <p:spPr/>
-        <p:txBody>
-          <a:bodyPr/>
-          <a:lstStyle/>
-          <a:p>
-            <a:r>
-              <a:rPr lang="en-US" dirty="0"/>
-              <a:t>https://</a:t>
-            </a:r>
-            <a:r>
-              <a:rPr lang="en-US" dirty="0" err="1"/>
-              <a:t>github.com</a:t>
-            </a:r>
-            <a:r>
-              <a:rPr lang="en-US" dirty="0"/>
-              <a:t>/Matt9120/PracComp2022</a:t>
-            </a:r>
-          </a:p>
-        </p:txBody>
-      </p:sp>
+              <a:rPr lang="en-US" dirty="0"/>
+              <a:t>ANOVA and Tukey for Species x Species</a:t>
+            </a:r>
+          </a:p>
+        </p:txBody>
+      </p:sp>
+      <p:pic>
+        <p:nvPicPr>
+          <p:cNvPr id="5" name="Picture 4" descr="Graphical user interface, text, application, Teams&#10;&#10;Description automatically generated">
+            <a:extLst>
+              <a:ext uri="{FF2B5EF4-FFF2-40B4-BE49-F238E27FC236}">
+                <a16:creationId xmlns:a16="http://schemas.microsoft.com/office/drawing/2014/main" id="{A0875081-B961-4E7F-920D-52EA408F2422}"/>
+              </a:ext>
+            </a:extLst>
+          </p:cNvPr>
+          <p:cNvPicPr>
+            <a:picLocks noChangeAspect="1"/>
+          </p:cNvPicPr>
+          <p:nvPr/>
+        </p:nvPicPr>
+        <p:blipFill>
+          <a:blip r:embed="rId3"/>
+          <a:stretch>
+            <a:fillRect/>
+          </a:stretch>
+        </p:blipFill>
+        <p:spPr>
+          <a:xfrm>
+            <a:off x="366712" y="1440469"/>
+            <a:ext cx="11458575" cy="2785541"/>
+          </a:xfrm>
+          <a:prstGeom prst="rect">
+            <a:avLst/>
+          </a:prstGeom>
+        </p:spPr>
+      </p:pic>
     </p:spTree>
     <p:extLst>
       <p:ext uri="{BB962C8B-B14F-4D97-AF65-F5344CB8AC3E}">
-        <p14:creationId xmlns:p14="http://schemas.microsoft.com/office/powerpoint/2010/main" val="2176917926"/>
+        <p14:creationId xmlns:p14="http://schemas.microsoft.com/office/powerpoint/2010/main" val="695825339"/>
+      </p:ext>
+    </p:extLst>
+  </p:cSld>
+  <p:clrMapOvr>
+    <a:masterClrMapping/>
+  </p:clrMapOvr>
+</p:sld>
+</file>
+
+<file path=ppt/slides/slide9.xml><?xml version="1.0" encoding="utf-8"?>
+<p:sld xmlns:a="http://schemas.openxmlformats.org/drawingml/2006/main" xmlns:r="http://schemas.openxmlformats.org/officeDocument/2006/relationships" xmlns:p="http://schemas.openxmlformats.org/presentationml/2006/main">
+  <p:cSld>
+    <p:spTree>
+      <p:nvGrpSpPr>
+        <p:cNvPr id="1" name=""/>
+        <p:cNvGrpSpPr/>
+        <p:nvPr/>
+      </p:nvGrpSpPr>
+      <p:grpSpPr>
+        <a:xfrm>
+          <a:off x="0" y="0"/>
+          <a:ext cx="0" cy="0"/>
+          <a:chOff x="0" y="0"/>
+          <a:chExt cx="0" cy="0"/>
+        </a:xfrm>
+      </p:grpSpPr>
+      <p:sp>
+        <p:nvSpPr>
+          <p:cNvPr id="2" name="Title 1">
+            <a:extLst>
+              <a:ext uri="{FF2B5EF4-FFF2-40B4-BE49-F238E27FC236}">
+                <a16:creationId xmlns:a16="http://schemas.microsoft.com/office/drawing/2014/main" id="{BB7DC69B-8002-02A5-F653-B4CF4FCFD76B}"/>
+              </a:ext>
+            </a:extLst>
+          </p:cNvPr>
+          <p:cNvSpPr>
+            <a:spLocks noGrp="1"/>
+          </p:cNvSpPr>
+          <p:nvPr>
+            <p:ph type="title"/>
+          </p:nvPr>
+        </p:nvSpPr>
+        <p:spPr/>
+        <p:txBody>
+          <a:bodyPr/>
+          <a:lstStyle/>
+          <a:p>
+            <a:r>
+              <a:rPr lang="en-US" dirty="0" err="1"/>
+              <a:t>Anova</a:t>
+            </a:r>
+            <a:r>
+              <a:rPr lang="en-US" dirty="0"/>
+              <a:t> for Tank x Tank </a:t>
+            </a:r>
+          </a:p>
+        </p:txBody>
+      </p:sp>
+      <p:pic>
+        <p:nvPicPr>
+          <p:cNvPr id="4" name="Content Placeholder 3" descr="Graphical user interface, text, application, Teams&#10;&#10;Description automatically generated">
+            <a:extLst>
+              <a:ext uri="{FF2B5EF4-FFF2-40B4-BE49-F238E27FC236}">
+                <a16:creationId xmlns:a16="http://schemas.microsoft.com/office/drawing/2014/main" id="{81642784-6BC3-D778-EF69-A7293BD957A1}"/>
+              </a:ext>
+            </a:extLst>
+          </p:cNvPr>
+          <p:cNvPicPr>
+            <a:picLocks noGrp="1" noChangeAspect="1"/>
+          </p:cNvPicPr>
+          <p:nvPr>
+            <p:ph idx="1"/>
+          </p:nvPr>
+        </p:nvPicPr>
+        <p:blipFill>
+          <a:blip r:embed="rId3"/>
+          <a:stretch>
+            <a:fillRect/>
+          </a:stretch>
+        </p:blipFill>
+        <p:spPr>
+          <a:xfrm>
+            <a:off x="838200" y="2015452"/>
+            <a:ext cx="10515600" cy="3971683"/>
+          </a:xfrm>
+          <a:prstGeom prst="rect">
+            <a:avLst/>
+          </a:prstGeom>
+        </p:spPr>
+      </p:pic>
+    </p:spTree>
+    <p:extLst>
+      <p:ext uri="{BB962C8B-B14F-4D97-AF65-F5344CB8AC3E}">
+        <p14:creationId xmlns:p14="http://schemas.microsoft.com/office/powerpoint/2010/main" val="2202482488"/>
       </p:ext>
     </p:extLst>
   </p:cSld>
@@ -5817,4 +7032,299 @@
     </a:ext>
   </a:extLst>
 </a:theme>
+</file>
+
+<file path=ppt/theme/theme2.xml><?xml version="1.0" encoding="utf-8"?>
+<a:theme xmlns:a="http://schemas.openxmlformats.org/drawingml/2006/main" name="Office Theme">
+  <a:themeElements>
+    <a:clrScheme name="Office">
+      <a:dk1>
+        <a:sysClr val="windowText" lastClr="000000"/>
+      </a:dk1>
+      <a:lt1>
+        <a:sysClr val="window" lastClr="FFFFFF"/>
+      </a:lt1>
+      <a:dk2>
+        <a:srgbClr val="44546A"/>
+      </a:dk2>
+      <a:lt2>
+        <a:srgbClr val="E7E6E6"/>
+      </a:lt2>
+      <a:accent1>
+        <a:srgbClr val="4472C4"/>
+      </a:accent1>
+      <a:accent2>
+        <a:srgbClr val="ED7D31"/>
+      </a:accent2>
+      <a:accent3>
+        <a:srgbClr val="A5A5A5"/>
+      </a:accent3>
+      <a:accent4>
+        <a:srgbClr val="FFC000"/>
+      </a:accent4>
+      <a:accent5>
+        <a:srgbClr val="5B9BD5"/>
+      </a:accent5>
+      <a:accent6>
+        <a:srgbClr val="70AD47"/>
+      </a:accent6>
+      <a:hlink>
+        <a:srgbClr val="0563C1"/>
+      </a:hlink>
+      <a:folHlink>
+        <a:srgbClr val="954F72"/>
+      </a:folHlink>
+    </a:clrScheme>
+    <a:fontScheme name="Office">
+      <a:majorFont>
+        <a:latin typeface="Calibri Light" panose="020F0302020204030204"/>
+        <a:ea typeface=""/>
+        <a:cs typeface=""/>
+        <a:font script="Jpan" typeface="游ゴシック Light"/>
+        <a:font script="Hang" typeface="맑은 고딕"/>
+        <a:font script="Hans" typeface="等线 Light"/>
+        <a:font script="Hant" typeface="新細明體"/>
+        <a:font script="Arab" typeface="Times New Roman"/>
+        <a:font script="Hebr" typeface="Times New Roman"/>
+        <a:font script="Thai" typeface="Angsana New"/>
+        <a:font script="Ethi" typeface="Nyala"/>
+        <a:font script="Beng" typeface="Vrinda"/>
+        <a:font script="Gujr" typeface="Shruti"/>
+        <a:font script="Khmr" typeface="MoolBoran"/>
+        <a:font script="Knda" typeface="Tunga"/>
+        <a:font script="Guru" typeface="Raavi"/>
+        <a:font script="Cans" typeface="Euphemia"/>
+        <a:font script="Cher" typeface="Plantagenet Cherokee"/>
+        <a:font script="Yiii" typeface="Microsoft Yi Baiti"/>
+        <a:font script="Tibt" typeface="Microsoft Himalaya"/>
+        <a:font script="Thaa" typeface="MV Boli"/>
+        <a:font script="Deva" typeface="Mangal"/>
+        <a:font script="Telu" typeface="Gautami"/>
+        <a:font script="Taml" typeface="Latha"/>
+        <a:font script="Syrc" typeface="Estrangelo Edessa"/>
+        <a:font script="Orya" typeface="Kalinga"/>
+        <a:font script="Mlym" typeface="Kartika"/>
+        <a:font script="Laoo" typeface="DokChampa"/>
+        <a:font script="Sinh" typeface="Iskoola Pota"/>
+        <a:font script="Mong" typeface="Mongolian Baiti"/>
+        <a:font script="Viet" typeface="Times New Roman"/>
+        <a:font script="Uigh" typeface="Microsoft Uighur"/>
+        <a:font script="Geor" typeface="Sylfaen"/>
+        <a:font script="Armn" typeface="Arial"/>
+        <a:font script="Bugi" typeface="Leelawadee UI"/>
+        <a:font script="Bopo" typeface="Microsoft JhengHei"/>
+        <a:font script="Java" typeface="Javanese Text"/>
+        <a:font script="Lisu" typeface="Segoe UI"/>
+        <a:font script="Mymr" typeface="Myanmar Text"/>
+        <a:font script="Nkoo" typeface="Ebrima"/>
+        <a:font script="Olck" typeface="Nirmala UI"/>
+        <a:font script="Osma" typeface="Ebrima"/>
+        <a:font script="Phag" typeface="Phagspa"/>
+        <a:font script="Syrn" typeface="Estrangelo Edessa"/>
+        <a:font script="Syrj" typeface="Estrangelo Edessa"/>
+        <a:font script="Syre" typeface="Estrangelo Edessa"/>
+        <a:font script="Sora" typeface="Nirmala UI"/>
+        <a:font script="Tale" typeface="Microsoft Tai Le"/>
+        <a:font script="Talu" typeface="Microsoft New Tai Lue"/>
+        <a:font script="Tfng" typeface="Ebrima"/>
+      </a:majorFont>
+      <a:minorFont>
+        <a:latin typeface="Calibri" panose="020F0502020204030204"/>
+        <a:ea typeface=""/>
+        <a:cs typeface=""/>
+        <a:font script="Jpan" typeface="游ゴシック"/>
+        <a:font script="Hang" typeface="맑은 고딕"/>
+        <a:font script="Hans" typeface="等线"/>
+        <a:font script="Hant" typeface="新細明體"/>
+        <a:font script="Arab" typeface="Arial"/>
+        <a:font script="Hebr" typeface="Arial"/>
+        <a:font script="Thai" typeface="Cordia New"/>
+        <a:font script="Ethi" typeface="Nyala"/>
+        <a:font script="Beng" typeface="Vrinda"/>
+        <a:font script="Gujr" typeface="Shruti"/>
+        <a:font script="Khmr" typeface="DaunPenh"/>
+        <a:font script="Knda" typeface="Tunga"/>
+        <a:font script="Guru" typeface="Raavi"/>
+        <a:font script="Cans" typeface="Euphemia"/>
+        <a:font script="Cher" typeface="Plantagenet Cherokee"/>
+        <a:font script="Yiii" typeface="Microsoft Yi Baiti"/>
+        <a:font script="Tibt" typeface="Microsoft Himalaya"/>
+        <a:font script="Thaa" typeface="MV Boli"/>
+        <a:font script="Deva" typeface="Mangal"/>
+        <a:font script="Telu" typeface="Gautami"/>
+        <a:font script="Taml" typeface="Latha"/>
+        <a:font script="Syrc" typeface="Estrangelo Edessa"/>
+        <a:font script="Orya" typeface="Kalinga"/>
+        <a:font script="Mlym" typeface="Kartika"/>
+        <a:font script="Laoo" typeface="DokChampa"/>
+        <a:font script="Sinh" typeface="Iskoola Pota"/>
+        <a:font script="Mong" typeface="Mongolian Baiti"/>
+        <a:font script="Viet" typeface="Arial"/>
+        <a:font script="Uigh" typeface="Microsoft Uighur"/>
+        <a:font script="Geor" typeface="Sylfaen"/>
+        <a:font script="Armn" typeface="Arial"/>
+        <a:font script="Bugi" typeface="Leelawadee UI"/>
+        <a:font script="Bopo" typeface="Microsoft JhengHei"/>
+        <a:font script="Java" typeface="Javanese Text"/>
+        <a:font script="Lisu" typeface="Segoe UI"/>
+        <a:font script="Mymr" typeface="Myanmar Text"/>
+        <a:font script="Nkoo" typeface="Ebrima"/>
+        <a:font script="Olck" typeface="Nirmala UI"/>
+        <a:font script="Osma" typeface="Ebrima"/>
+        <a:font script="Phag" typeface="Phagspa"/>
+        <a:font script="Syrn" typeface="Estrangelo Edessa"/>
+        <a:font script="Syrj" typeface="Estrangelo Edessa"/>
+        <a:font script="Syre" typeface="Estrangelo Edessa"/>
+        <a:font script="Sora" typeface="Nirmala UI"/>
+        <a:font script="Tale" typeface="Microsoft Tai Le"/>
+        <a:font script="Talu" typeface="Microsoft New Tai Lue"/>
+        <a:font script="Tfng" typeface="Ebrima"/>
+      </a:minorFont>
+    </a:fontScheme>
+    <a:fmtScheme name="Office">
+      <a:fillStyleLst>
+        <a:solidFill>
+          <a:schemeClr val="phClr"/>
+        </a:solidFill>
+        <a:gradFill rotWithShape="1">
+          <a:gsLst>
+            <a:gs pos="0">
+              <a:schemeClr val="phClr">
+                <a:lumMod val="110000"/>
+                <a:satMod val="105000"/>
+                <a:tint val="67000"/>
+              </a:schemeClr>
+            </a:gs>
+            <a:gs pos="50000">
+              <a:schemeClr val="phClr">
+                <a:lumMod val="105000"/>
+                <a:satMod val="103000"/>
+                <a:tint val="73000"/>
+              </a:schemeClr>
+            </a:gs>
+            <a:gs pos="100000">
+              <a:schemeClr val="phClr">
+                <a:lumMod val="105000"/>
+                <a:satMod val="109000"/>
+                <a:tint val="81000"/>
+              </a:schemeClr>
+            </a:gs>
+          </a:gsLst>
+          <a:lin ang="5400000" scaled="0"/>
+        </a:gradFill>
+        <a:gradFill rotWithShape="1">
+          <a:gsLst>
+            <a:gs pos="0">
+              <a:schemeClr val="phClr">
+                <a:satMod val="103000"/>
+                <a:lumMod val="102000"/>
+                <a:tint val="94000"/>
+              </a:schemeClr>
+            </a:gs>
+            <a:gs pos="50000">
+              <a:schemeClr val="phClr">
+                <a:satMod val="110000"/>
+                <a:lumMod val="100000"/>
+                <a:shade val="100000"/>
+              </a:schemeClr>
+            </a:gs>
+            <a:gs pos="100000">
+              <a:schemeClr val="phClr">
+                <a:lumMod val="99000"/>
+                <a:satMod val="120000"/>
+                <a:shade val="78000"/>
+              </a:schemeClr>
+            </a:gs>
+          </a:gsLst>
+          <a:lin ang="5400000" scaled="0"/>
+        </a:gradFill>
+      </a:fillStyleLst>
+      <a:lnStyleLst>
+        <a:ln w="6350" cap="flat" cmpd="sng" algn="ctr">
+          <a:solidFill>
+            <a:schemeClr val="phClr"/>
+          </a:solidFill>
+          <a:prstDash val="solid"/>
+          <a:miter lim="800000"/>
+        </a:ln>
+        <a:ln w="12700" cap="flat" cmpd="sng" algn="ctr">
+          <a:solidFill>
+            <a:schemeClr val="phClr"/>
+          </a:solidFill>
+          <a:prstDash val="solid"/>
+          <a:miter lim="800000"/>
+        </a:ln>
+        <a:ln w="19050" cap="flat" cmpd="sng" algn="ctr">
+          <a:solidFill>
+            <a:schemeClr val="phClr"/>
+          </a:solidFill>
+          <a:prstDash val="solid"/>
+          <a:miter lim="800000"/>
+        </a:ln>
+      </a:lnStyleLst>
+      <a:effectStyleLst>
+        <a:effectStyle>
+          <a:effectLst/>
+        </a:effectStyle>
+        <a:effectStyle>
+          <a:effectLst/>
+        </a:effectStyle>
+        <a:effectStyle>
+          <a:effectLst>
+            <a:outerShdw blurRad="57150" dist="19050" dir="5400000" algn="ctr" rotWithShape="0">
+              <a:srgbClr val="000000">
+                <a:alpha val="63000"/>
+              </a:srgbClr>
+            </a:outerShdw>
+          </a:effectLst>
+        </a:effectStyle>
+      </a:effectStyleLst>
+      <a:bgFillStyleLst>
+        <a:solidFill>
+          <a:schemeClr val="phClr"/>
+        </a:solidFill>
+        <a:solidFill>
+          <a:schemeClr val="phClr">
+            <a:tint val="95000"/>
+            <a:satMod val="170000"/>
+          </a:schemeClr>
+        </a:solidFill>
+        <a:gradFill rotWithShape="1">
+          <a:gsLst>
+            <a:gs pos="0">
+              <a:schemeClr val="phClr">
+                <a:tint val="93000"/>
+                <a:satMod val="150000"/>
+                <a:shade val="98000"/>
+                <a:lumMod val="102000"/>
+              </a:schemeClr>
+            </a:gs>
+            <a:gs pos="50000">
+              <a:schemeClr val="phClr">
+                <a:tint val="98000"/>
+                <a:satMod val="130000"/>
+                <a:shade val="90000"/>
+                <a:lumMod val="103000"/>
+              </a:schemeClr>
+            </a:gs>
+            <a:gs pos="100000">
+              <a:schemeClr val="phClr">
+                <a:shade val="63000"/>
+                <a:satMod val="120000"/>
+              </a:schemeClr>
+            </a:gs>
+          </a:gsLst>
+          <a:lin ang="5400000" scaled="0"/>
+        </a:gradFill>
+      </a:bgFillStyleLst>
+    </a:fmtScheme>
+  </a:themeElements>
+  <a:objectDefaults/>
+  <a:extraClrSchemeLst/>
+  <a:extLst>
+    <a:ext uri="{05A4C25C-085E-4340-85A3-A5531E510DB2}">
+      <thm15:themeFamily xmlns:thm15="http://schemas.microsoft.com/office/thememl/2012/main" name="Office Theme" id="{62F939B6-93AF-4DB8-9C6B-D6C7DFDC589F}" vid="{4A3C46E8-61CC-4603-A589-7422A47A8E4A}"/>
+    </a:ext>
+  </a:extLst>
+</a:theme>
 </file>
</xml_diff>

<commit_message>
Last second updates to the powerpoint
</commit_message>
<xml_diff>
--- a/BIOL6220Final.pptx
+++ b/BIOL6220Final.pptx
@@ -5,7 +5,7 @@
     <p:sldMasterId id="2147483648" r:id="rId1"/>
   </p:sldMasterIdLst>
   <p:notesMasterIdLst>
-    <p:notesMasterId r:id="rId12"/>
+    <p:notesMasterId r:id="rId14"/>
   </p:notesMasterIdLst>
   <p:sldIdLst>
     <p:sldId id="256" r:id="rId2"/>
@@ -13,11 +13,13 @@
     <p:sldId id="257" r:id="rId4"/>
     <p:sldId id="265" r:id="rId5"/>
     <p:sldId id="258" r:id="rId6"/>
-    <p:sldId id="259" r:id="rId7"/>
-    <p:sldId id="262" r:id="rId8"/>
-    <p:sldId id="260" r:id="rId9"/>
-    <p:sldId id="264" r:id="rId10"/>
-    <p:sldId id="263" r:id="rId11"/>
+    <p:sldId id="267" r:id="rId7"/>
+    <p:sldId id="259" r:id="rId8"/>
+    <p:sldId id="262" r:id="rId9"/>
+    <p:sldId id="260" r:id="rId10"/>
+    <p:sldId id="264" r:id="rId11"/>
+    <p:sldId id="266" r:id="rId12"/>
+    <p:sldId id="263" r:id="rId13"/>
   </p:sldIdLst>
   <p:sldSz cx="12192000" cy="6858000"/>
   <p:notesSz cx="6858000" cy="9144000"/>
@@ -692,7 +694,7 @@
           <a:p>
             <a:fld id="{B98E28CC-C23C-194C-BD01-979D3612A888}" type="slidenum">
               <a:rPr lang="en-US" smtClean="0"/>
-              <a:t>6</a:t>
+              <a:t>7</a:t>
             </a:fld>
             <a:endParaRPr lang="en-US"/>
           </a:p>
@@ -855,7 +857,7 @@
           <a:p>
             <a:fld id="{B98E28CC-C23C-194C-BD01-979D3612A888}" type="slidenum">
               <a:rPr lang="en-US" smtClean="0"/>
-              <a:t>7</a:t>
+              <a:t>8</a:t>
             </a:fld>
             <a:endParaRPr lang="en-US"/>
           </a:p>
@@ -954,7 +956,7 @@
           <a:p>
             <a:fld id="{B98E28CC-C23C-194C-BD01-979D3612A888}" type="slidenum">
               <a:rPr lang="en-US" smtClean="0"/>
-              <a:t>8</a:t>
+              <a:t>9</a:t>
             </a:fld>
             <a:endParaRPr lang="en-US"/>
           </a:p>
@@ -1085,7 +1087,7 @@
           <a:p>
             <a:fld id="{B98E28CC-C23C-194C-BD01-979D3612A888}" type="slidenum">
               <a:rPr lang="en-US" smtClean="0"/>
-              <a:t>9</a:t>
+              <a:t>10</a:t>
             </a:fld>
             <a:endParaRPr lang="en-US"/>
           </a:p>
@@ -4436,6 +4438,214 @@
       </p:grpSpPr>
       <p:sp>
         <p:nvSpPr>
+          <p:cNvPr id="2" name="Title 1">
+            <a:extLst>
+              <a:ext uri="{FF2B5EF4-FFF2-40B4-BE49-F238E27FC236}">
+                <a16:creationId xmlns:a16="http://schemas.microsoft.com/office/drawing/2014/main" id="{BB7DC69B-8002-02A5-F653-B4CF4FCFD76B}"/>
+              </a:ext>
+            </a:extLst>
+          </p:cNvPr>
+          <p:cNvSpPr>
+            <a:spLocks noGrp="1"/>
+          </p:cNvSpPr>
+          <p:nvPr>
+            <p:ph type="title"/>
+          </p:nvPr>
+        </p:nvSpPr>
+        <p:spPr/>
+        <p:txBody>
+          <a:bodyPr/>
+          <a:lstStyle/>
+          <a:p>
+            <a:r>
+              <a:rPr lang="en-US" dirty="0" err="1"/>
+              <a:t>Anova</a:t>
+            </a:r>
+            <a:r>
+              <a:rPr lang="en-US" dirty="0"/>
+              <a:t> for Tank x Tank </a:t>
+            </a:r>
+          </a:p>
+        </p:txBody>
+      </p:sp>
+      <p:pic>
+        <p:nvPicPr>
+          <p:cNvPr id="4" name="Content Placeholder 3" descr="Graphical user interface, text, application, Teams&#10;&#10;Description automatically generated">
+            <a:extLst>
+              <a:ext uri="{FF2B5EF4-FFF2-40B4-BE49-F238E27FC236}">
+                <a16:creationId xmlns:a16="http://schemas.microsoft.com/office/drawing/2014/main" id="{81642784-6BC3-D778-EF69-A7293BD957A1}"/>
+              </a:ext>
+            </a:extLst>
+          </p:cNvPr>
+          <p:cNvPicPr>
+            <a:picLocks noGrp="1" noChangeAspect="1"/>
+          </p:cNvPicPr>
+          <p:nvPr>
+            <p:ph idx="1"/>
+          </p:nvPr>
+        </p:nvPicPr>
+        <p:blipFill>
+          <a:blip r:embed="rId3"/>
+          <a:stretch>
+            <a:fillRect/>
+          </a:stretch>
+        </p:blipFill>
+        <p:spPr>
+          <a:xfrm>
+            <a:off x="838200" y="2015452"/>
+            <a:ext cx="10515600" cy="3971683"/>
+          </a:xfrm>
+          <a:prstGeom prst="rect">
+            <a:avLst/>
+          </a:prstGeom>
+        </p:spPr>
+      </p:pic>
+    </p:spTree>
+    <p:extLst>
+      <p:ext uri="{BB962C8B-B14F-4D97-AF65-F5344CB8AC3E}">
+        <p14:creationId xmlns:p14="http://schemas.microsoft.com/office/powerpoint/2010/main" val="2202482488"/>
+      </p:ext>
+    </p:extLst>
+  </p:cSld>
+  <p:clrMapOvr>
+    <a:masterClrMapping/>
+  </p:clrMapOvr>
+</p:sld>
+</file>
+
+<file path=ppt/slides/slide11.xml><?xml version="1.0" encoding="utf-8"?>
+<p:sld xmlns:a="http://schemas.openxmlformats.org/drawingml/2006/main" xmlns:r="http://schemas.openxmlformats.org/officeDocument/2006/relationships" xmlns:p="http://schemas.openxmlformats.org/presentationml/2006/main">
+  <p:cSld>
+    <p:spTree>
+      <p:nvGrpSpPr>
+        <p:cNvPr id="1" name=""/>
+        <p:cNvGrpSpPr/>
+        <p:nvPr/>
+      </p:nvGrpSpPr>
+      <p:grpSpPr>
+        <a:xfrm>
+          <a:off x="0" y="0"/>
+          <a:ext cx="0" cy="0"/>
+          <a:chOff x="0" y="0"/>
+          <a:chExt cx="0" cy="0"/>
+        </a:xfrm>
+      </p:grpSpPr>
+      <p:sp>
+        <p:nvSpPr>
+          <p:cNvPr id="2" name="Title 1">
+            <a:extLst>
+              <a:ext uri="{FF2B5EF4-FFF2-40B4-BE49-F238E27FC236}">
+                <a16:creationId xmlns:a16="http://schemas.microsoft.com/office/drawing/2014/main" id="{6A282E4D-49D6-2C4E-A94A-5B6B87DC2C48}"/>
+              </a:ext>
+            </a:extLst>
+          </p:cNvPr>
+          <p:cNvSpPr>
+            <a:spLocks noGrp="1"/>
+          </p:cNvSpPr>
+          <p:nvPr>
+            <p:ph type="title"/>
+          </p:nvPr>
+        </p:nvSpPr>
+        <p:spPr/>
+        <p:txBody>
+          <a:bodyPr/>
+          <a:lstStyle/>
+          <a:p>
+            <a:r>
+              <a:rPr lang="en-US" dirty="0"/>
+              <a:t>Summary </a:t>
+            </a:r>
+          </a:p>
+        </p:txBody>
+      </p:sp>
+      <p:sp>
+        <p:nvSpPr>
+          <p:cNvPr id="3" name="Content Placeholder 2">
+            <a:extLst>
+              <a:ext uri="{FF2B5EF4-FFF2-40B4-BE49-F238E27FC236}">
+                <a16:creationId xmlns:a16="http://schemas.microsoft.com/office/drawing/2014/main" id="{83A32FEF-0712-8130-F338-192216F1AE17}"/>
+              </a:ext>
+            </a:extLst>
+          </p:cNvPr>
+          <p:cNvSpPr>
+            <a:spLocks noGrp="1"/>
+          </p:cNvSpPr>
+          <p:nvPr>
+            <p:ph idx="1"/>
+          </p:nvPr>
+        </p:nvSpPr>
+        <p:spPr>
+          <a:xfrm>
+            <a:off x="838200" y="1825624"/>
+            <a:ext cx="10515600" cy="5032375"/>
+          </a:xfrm>
+        </p:spPr>
+        <p:txBody>
+          <a:bodyPr>
+            <a:normAutofit/>
+          </a:bodyPr>
+          <a:lstStyle/>
+          <a:p>
+            <a:r>
+              <a:rPr lang="en-US" dirty="0"/>
+              <a:t>Correlation plot I believe provided the best understanding visually of the data </a:t>
+            </a:r>
+          </a:p>
+          <a:p>
+            <a:r>
+              <a:rPr lang="en-US" dirty="0"/>
+              <a:t>The growth plots allowed for views on growth over the season</a:t>
+            </a:r>
+          </a:p>
+          <a:p>
+            <a:r>
+              <a:rPr lang="en-US" dirty="0"/>
+              <a:t>ANOVA allowed for ease of comparison amongst the species as well as between individual comparisons of the species within the tanks</a:t>
+            </a:r>
+          </a:p>
+          <a:p>
+            <a:endParaRPr lang="en-US" dirty="0"/>
+          </a:p>
+          <a:p>
+            <a:r>
+              <a:rPr lang="en-US" dirty="0"/>
+              <a:t>What to change: organizing data differently initially, run more statistical tests to see what else is statistically significant amongst the data</a:t>
+            </a:r>
+          </a:p>
+        </p:txBody>
+      </p:sp>
+    </p:spTree>
+    <p:extLst>
+      <p:ext uri="{BB962C8B-B14F-4D97-AF65-F5344CB8AC3E}">
+        <p14:creationId xmlns:p14="http://schemas.microsoft.com/office/powerpoint/2010/main" val="964218374"/>
+      </p:ext>
+    </p:extLst>
+  </p:cSld>
+  <p:clrMapOvr>
+    <a:masterClrMapping/>
+  </p:clrMapOvr>
+</p:sld>
+</file>
+
+<file path=ppt/slides/slide12.xml><?xml version="1.0" encoding="utf-8"?>
+<p:sld xmlns:a="http://schemas.openxmlformats.org/drawingml/2006/main" xmlns:r="http://schemas.openxmlformats.org/officeDocument/2006/relationships" xmlns:p="http://schemas.openxmlformats.org/presentationml/2006/main">
+  <p:cSld>
+    <p:spTree>
+      <p:nvGrpSpPr>
+        <p:cNvPr id="1" name=""/>
+        <p:cNvGrpSpPr/>
+        <p:nvPr/>
+      </p:nvGrpSpPr>
+      <p:grpSpPr>
+        <a:xfrm>
+          <a:off x="0" y="0"/>
+          <a:ext cx="0" cy="0"/>
+          <a:chOff x="0" y="0"/>
+          <a:chExt cx="0" cy="0"/>
+        </a:xfrm>
+      </p:grpSpPr>
+      <p:sp>
+        <p:nvSpPr>
           <p:cNvPr id="5" name="Title 4">
             <a:extLst>
               <a:ext uri="{FF2B5EF4-FFF2-40B4-BE49-F238E27FC236}">
@@ -5593,6 +5803,149 @@
       </p:grpSpPr>
       <p:sp>
         <p:nvSpPr>
+          <p:cNvPr id="2" name="Title 1">
+            <a:extLst>
+              <a:ext uri="{FF2B5EF4-FFF2-40B4-BE49-F238E27FC236}">
+                <a16:creationId xmlns:a16="http://schemas.microsoft.com/office/drawing/2014/main" id="{0E073E68-8FCA-A9EA-DFBB-84187F774611}"/>
+              </a:ext>
+            </a:extLst>
+          </p:cNvPr>
+          <p:cNvSpPr>
+            <a:spLocks noGrp="1"/>
+          </p:cNvSpPr>
+          <p:nvPr>
+            <p:ph type="title"/>
+          </p:nvPr>
+        </p:nvSpPr>
+        <p:spPr/>
+        <p:txBody>
+          <a:bodyPr/>
+          <a:lstStyle/>
+          <a:p>
+            <a:r>
+              <a:rPr lang="en-US" dirty="0"/>
+              <a:t>Boxplot	</a:t>
+            </a:r>
+          </a:p>
+        </p:txBody>
+      </p:sp>
+      <p:pic>
+        <p:nvPicPr>
+          <p:cNvPr id="6" name="Content Placeholder 5" descr="Chart, box and whisker chart&#10;&#10;Description automatically generated">
+            <a:extLst>
+              <a:ext uri="{FF2B5EF4-FFF2-40B4-BE49-F238E27FC236}">
+                <a16:creationId xmlns:a16="http://schemas.microsoft.com/office/drawing/2014/main" id="{76712632-52D7-6570-CEA6-27C2FACC532D}"/>
+              </a:ext>
+            </a:extLst>
+          </p:cNvPr>
+          <p:cNvPicPr>
+            <a:picLocks noGrp="1" noChangeAspect="1"/>
+          </p:cNvPicPr>
+          <p:nvPr>
+            <p:ph idx="1"/>
+          </p:nvPr>
+        </p:nvPicPr>
+        <p:blipFill>
+          <a:blip r:embed="rId2"/>
+          <a:stretch>
+            <a:fillRect/>
+          </a:stretch>
+        </p:blipFill>
+        <p:spPr>
+          <a:xfrm>
+            <a:off x="5183188" y="1796941"/>
+            <a:ext cx="6172200" cy="3254593"/>
+          </a:xfrm>
+        </p:spPr>
+      </p:pic>
+      <p:sp>
+        <p:nvSpPr>
+          <p:cNvPr id="4" name="Text Placeholder 3">
+            <a:extLst>
+              <a:ext uri="{FF2B5EF4-FFF2-40B4-BE49-F238E27FC236}">
+                <a16:creationId xmlns:a16="http://schemas.microsoft.com/office/drawing/2014/main" id="{A1CF7224-4AA3-E4D9-9B7D-6ECA48A3D698}"/>
+              </a:ext>
+            </a:extLst>
+          </p:cNvPr>
+          <p:cNvSpPr>
+            <a:spLocks noGrp="1"/>
+          </p:cNvSpPr>
+          <p:nvPr>
+            <p:ph type="body" sz="half" idx="2"/>
+          </p:nvPr>
+        </p:nvSpPr>
+        <p:spPr/>
+        <p:txBody>
+          <a:bodyPr/>
+          <a:lstStyle/>
+          <a:p>
+            <a:r>
+              <a:rPr lang="en-US" dirty="0"/>
+              <a:t>```{r}</a:t>
+            </a:r>
+          </a:p>
+          <a:p>
+            <a:r>
+              <a:rPr lang="en-US" dirty="0"/>
+              <a:t>boxplot(</a:t>
+            </a:r>
+            <a:r>
+              <a:rPr lang="en-US" dirty="0" err="1"/>
+              <a:t>gucplant.Aseries$RootLength</a:t>
+            </a:r>
+            <a:r>
+              <a:rPr lang="en-US" dirty="0"/>
+              <a:t> ~ </a:t>
+            </a:r>
+            <a:r>
+              <a:rPr lang="en-US" dirty="0" err="1"/>
+              <a:t>gucplant.Aseries$Species</a:t>
+            </a:r>
+            <a:r>
+              <a:rPr lang="en-US" dirty="0"/>
+              <a:t>)</a:t>
+            </a:r>
+          </a:p>
+          <a:p>
+            <a:r>
+              <a:rPr lang="en-US" dirty="0"/>
+              <a:t>```</a:t>
+            </a:r>
+          </a:p>
+        </p:txBody>
+      </p:sp>
+    </p:spTree>
+    <p:extLst>
+      <p:ext uri="{BB962C8B-B14F-4D97-AF65-F5344CB8AC3E}">
+        <p14:creationId xmlns:p14="http://schemas.microsoft.com/office/powerpoint/2010/main" val="340138818"/>
+      </p:ext>
+    </p:extLst>
+  </p:cSld>
+  <p:clrMapOvr>
+    <a:masterClrMapping/>
+  </p:clrMapOvr>
+</p:sld>
+</file>
+
+<file path=ppt/slides/slide7.xml><?xml version="1.0" encoding="utf-8"?>
+<p:sld xmlns:a="http://schemas.openxmlformats.org/drawingml/2006/main" xmlns:r="http://schemas.openxmlformats.org/officeDocument/2006/relationships" xmlns:p="http://schemas.openxmlformats.org/presentationml/2006/main">
+  <p:cSld>
+    <p:spTree>
+      <p:nvGrpSpPr>
+        <p:cNvPr id="1" name=""/>
+        <p:cNvGrpSpPr/>
+        <p:nvPr/>
+      </p:nvGrpSpPr>
+      <p:grpSpPr>
+        <a:xfrm>
+          <a:off x="0" y="0"/>
+          <a:ext cx="0" cy="0"/>
+          <a:chOff x="0" y="0"/>
+          <a:chExt cx="0" cy="0"/>
+        </a:xfrm>
+      </p:grpSpPr>
+      <p:sp>
+        <p:nvSpPr>
           <p:cNvPr id="4" name="Title 3">
             <a:extLst>
               <a:ext uri="{FF2B5EF4-FFF2-40B4-BE49-F238E27FC236}">
@@ -6084,7 +6437,7 @@
 </p:sld>
 </file>
 
-<file path=ppt/slides/slide7.xml><?xml version="1.0" encoding="utf-8"?>
+<file path=ppt/slides/slide8.xml><?xml version="1.0" encoding="utf-8"?>
 <p:sld xmlns:a="http://schemas.openxmlformats.org/drawingml/2006/main" xmlns:r="http://schemas.openxmlformats.org/officeDocument/2006/relationships" xmlns:p="http://schemas.openxmlformats.org/presentationml/2006/main">
   <p:cSld>
     <p:spTree>
@@ -6552,7 +6905,7 @@
 </p:sld>
 </file>
 
-<file path=ppt/slides/slide8.xml><?xml version="1.0" encoding="utf-8"?>
+<file path=ppt/slides/slide9.xml><?xml version="1.0" encoding="utf-8"?>
 <p:sld xmlns:a="http://schemas.openxmlformats.org/drawingml/2006/main" xmlns:r="http://schemas.openxmlformats.org/officeDocument/2006/relationships" xmlns:p="http://schemas.openxmlformats.org/presentationml/2006/main">
   <p:cSld>
     <p:spTree>
@@ -6636,100 +6989,6 @@
     <p:extLst>
       <p:ext uri="{BB962C8B-B14F-4D97-AF65-F5344CB8AC3E}">
         <p14:creationId xmlns:p14="http://schemas.microsoft.com/office/powerpoint/2010/main" val="695825339"/>
-      </p:ext>
-    </p:extLst>
-  </p:cSld>
-  <p:clrMapOvr>
-    <a:masterClrMapping/>
-  </p:clrMapOvr>
-</p:sld>
-</file>
-
-<file path=ppt/slides/slide9.xml><?xml version="1.0" encoding="utf-8"?>
-<p:sld xmlns:a="http://schemas.openxmlformats.org/drawingml/2006/main" xmlns:r="http://schemas.openxmlformats.org/officeDocument/2006/relationships" xmlns:p="http://schemas.openxmlformats.org/presentationml/2006/main">
-  <p:cSld>
-    <p:spTree>
-      <p:nvGrpSpPr>
-        <p:cNvPr id="1" name=""/>
-        <p:cNvGrpSpPr/>
-        <p:nvPr/>
-      </p:nvGrpSpPr>
-      <p:grpSpPr>
-        <a:xfrm>
-          <a:off x="0" y="0"/>
-          <a:ext cx="0" cy="0"/>
-          <a:chOff x="0" y="0"/>
-          <a:chExt cx="0" cy="0"/>
-        </a:xfrm>
-      </p:grpSpPr>
-      <p:sp>
-        <p:nvSpPr>
-          <p:cNvPr id="2" name="Title 1">
-            <a:extLst>
-              <a:ext uri="{FF2B5EF4-FFF2-40B4-BE49-F238E27FC236}">
-                <a16:creationId xmlns:a16="http://schemas.microsoft.com/office/drawing/2014/main" id="{BB7DC69B-8002-02A5-F653-B4CF4FCFD76B}"/>
-              </a:ext>
-            </a:extLst>
-          </p:cNvPr>
-          <p:cNvSpPr>
-            <a:spLocks noGrp="1"/>
-          </p:cNvSpPr>
-          <p:nvPr>
-            <p:ph type="title"/>
-          </p:nvPr>
-        </p:nvSpPr>
-        <p:spPr/>
-        <p:txBody>
-          <a:bodyPr/>
-          <a:lstStyle/>
-          <a:p>
-            <a:r>
-              <a:rPr lang="en-US" dirty="0" err="1"/>
-              <a:t>Anova</a:t>
-            </a:r>
-            <a:r>
-              <a:rPr lang="en-US" dirty="0"/>
-              <a:t> for Tank x Tank </a:t>
-            </a:r>
-          </a:p>
-        </p:txBody>
-      </p:sp>
-      <p:pic>
-        <p:nvPicPr>
-          <p:cNvPr id="4" name="Content Placeholder 3" descr="Graphical user interface, text, application, Teams&#10;&#10;Description automatically generated">
-            <a:extLst>
-              <a:ext uri="{FF2B5EF4-FFF2-40B4-BE49-F238E27FC236}">
-                <a16:creationId xmlns:a16="http://schemas.microsoft.com/office/drawing/2014/main" id="{81642784-6BC3-D778-EF69-A7293BD957A1}"/>
-              </a:ext>
-            </a:extLst>
-          </p:cNvPr>
-          <p:cNvPicPr>
-            <a:picLocks noGrp="1" noChangeAspect="1"/>
-          </p:cNvPicPr>
-          <p:nvPr>
-            <p:ph idx="1"/>
-          </p:nvPr>
-        </p:nvPicPr>
-        <p:blipFill>
-          <a:blip r:embed="rId3"/>
-          <a:stretch>
-            <a:fillRect/>
-          </a:stretch>
-        </p:blipFill>
-        <p:spPr>
-          <a:xfrm>
-            <a:off x="838200" y="2015452"/>
-            <a:ext cx="10515600" cy="3971683"/>
-          </a:xfrm>
-          <a:prstGeom prst="rect">
-            <a:avLst/>
-          </a:prstGeom>
-        </p:spPr>
-      </p:pic>
-    </p:spTree>
-    <p:extLst>
-      <p:ext uri="{BB962C8B-B14F-4D97-AF65-F5344CB8AC3E}">
-        <p14:creationId xmlns:p14="http://schemas.microsoft.com/office/powerpoint/2010/main" val="2202482488"/>
       </p:ext>
     </p:extLst>
   </p:cSld>

</xml_diff>

<commit_message>
Project before presentation...convert ANOVA of tank to tank to t-test and everything else is good
</commit_message>
<xml_diff>
--- a/BIOL6220Final.pptx
+++ b/BIOL6220Final.pptx
@@ -2,24 +2,23 @@
 <file path=ppt/presentation.xml><?xml version="1.0" encoding="utf-8"?>
 <p:presentation xmlns:a="http://schemas.openxmlformats.org/drawingml/2006/main" xmlns:r="http://schemas.openxmlformats.org/officeDocument/2006/relationships" xmlns:p="http://schemas.openxmlformats.org/presentationml/2006/main" saveSubsetFonts="1" autoCompressPictures="0">
   <p:sldMasterIdLst>
-    <p:sldMasterId id="2147483648" r:id="rId1"/>
+    <p:sldMasterId id="2147483756" r:id="rId1"/>
   </p:sldMasterIdLst>
   <p:notesMasterIdLst>
-    <p:notesMasterId r:id="rId14"/>
+    <p:notesMasterId r:id="rId13"/>
   </p:notesMasterIdLst>
   <p:sldIdLst>
     <p:sldId id="256" r:id="rId2"/>
     <p:sldId id="261" r:id="rId3"/>
     <p:sldId id="257" r:id="rId4"/>
     <p:sldId id="265" r:id="rId5"/>
-    <p:sldId id="258" r:id="rId6"/>
-    <p:sldId id="267" r:id="rId7"/>
-    <p:sldId id="259" r:id="rId8"/>
-    <p:sldId id="262" r:id="rId9"/>
-    <p:sldId id="260" r:id="rId10"/>
-    <p:sldId id="264" r:id="rId11"/>
-    <p:sldId id="266" r:id="rId12"/>
-    <p:sldId id="263" r:id="rId13"/>
+    <p:sldId id="259" r:id="rId6"/>
+    <p:sldId id="262" r:id="rId7"/>
+    <p:sldId id="258" r:id="rId8"/>
+    <p:sldId id="260" r:id="rId9"/>
+    <p:sldId id="264" r:id="rId10"/>
+    <p:sldId id="266" r:id="rId11"/>
+    <p:sldId id="263" r:id="rId12"/>
   </p:sldIdLst>
   <p:sldSz cx="12192000" cy="6858000"/>
   <p:notesSz cx="6858000" cy="9144000"/>
@@ -521,39 +520,39 @@
           <a:p>
             <a:r>
               <a:rPr lang="en-US" dirty="0"/>
-              <a:t>The </a:t>
+              <a:t>Plot of roots by shoots to show association between them. One may expect the longer the roots the longer the shoots as that is an indicator of good plant growth and health. Initially where we name the different data was to associate the data based upon what shows up in the csv file. This is the point of the "which" command in where we are saying that everything that has this word or value associated, bring it over. The </a:t>
             </a:r>
             <a:r>
               <a:rPr lang="en-US" dirty="0" err="1"/>
-              <a:t>guc.Aseries</a:t>
-            </a:r>
-            <a:r>
-              <a:rPr lang="en-US" dirty="0"/>
-              <a:t> was brought in again using a pairwise test to compare homogeneity amongst the species. The </a:t>
+              <a:t>lm</a:t>
+            </a:r>
+            <a:r>
+              <a:rPr lang="en-US" dirty="0"/>
+              <a:t>() command was used to create a linear regression of the grouped data. This way we can predict future data based on what we have currently. </a:t>
             </a:r>
             <a:r>
               <a:rPr lang="en-US" dirty="0" err="1"/>
-              <a:t>xlabel</a:t>
-            </a:r>
-            <a:r>
-              <a:rPr lang="en-US" dirty="0"/>
-              <a:t> was the plant species with the y label being the shoot length for this graph and the root length for the graph below. The function </a:t>
+              <a:t>abline</a:t>
+            </a:r>
+            <a:r>
+              <a:rPr lang="en-US" dirty="0"/>
+              <a:t> was used to give a line of best fit for the data. This line of best fit estimates the straight line through the data that minimized the distance between it and all the other points within the graph. col= was used </a:t>
             </a:r>
             <a:r>
               <a:rPr lang="en-US" dirty="0" err="1"/>
-              <a:t>ggbetweenstats</a:t>
-            </a:r>
-            <a:r>
-              <a:rPr lang="en-US" dirty="0"/>
-              <a:t>() was used for its ability to create publication ready plots with </a:t>
+              <a:t>ti</a:t>
+            </a:r>
+            <a:r>
+              <a:rPr lang="en-US" dirty="0"/>
+              <a:t> associate the line with the color previously given to the data with </a:t>
             </a:r>
             <a:r>
               <a:rPr lang="en-US" dirty="0" err="1"/>
-              <a:t>relavent</a:t>
-            </a:r>
-            <a:r>
-              <a:rPr lang="en-US" dirty="0"/>
-              <a:t> statistical analysis. In this case it was used to create a violin plot, which has the advantage over a traditional box plot by giving an more accurate accurate view on the distribution of the data points. From the graph we can see that each of the species is statistically significant from one another. From the confidence interval given we can say with 95% confidence that the mean of the data set is between 0.62 and 1.00 for this specific measure of plant species against shoot length. The r value can tell us that 71% of the points along the graph can be explained and that their is a positive correlation amongst the datapoints for the graph.</a:t>
+              <a:t>lty</a:t>
+            </a:r>
+            <a:r>
+              <a:rPr lang="en-US" dirty="0"/>
+              <a:t>= being used to maximize difference between the lines as to not confuse them.</a:t>
             </a:r>
           </a:p>
         </p:txBody>
@@ -584,7 +583,7 @@
     </p:spTree>
     <p:extLst>
       <p:ext uri="{BB962C8B-B14F-4D97-AF65-F5344CB8AC3E}">
-        <p14:creationId xmlns:p14="http://schemas.microsoft.com/office/powerpoint/2010/main" val="3497279431"/>
+        <p14:creationId xmlns:p14="http://schemas.microsoft.com/office/powerpoint/2010/main" val="3576742304"/>
       </p:ext>
     </p:extLst>
   </p:cSld>
@@ -639,40 +638,84 @@
           <a:lstStyle/>
           <a:p>
             <a:r>
-              <a:rPr lang="en-US" dirty="0"/>
-              <a:t>Plot of roots by shoots to show association between them. One may expect the longer the roots the longer the shoots as that is an indicator of good plant growth and health. Initially where we name the different data was to associate the data based upon what shows up in the csv file. This is the point of the "which" command in where we are saying that everything that has this word or value associated, bring it over. The </a:t>
-            </a:r>
-            <a:r>
               <a:rPr lang="en-US" dirty="0" err="1"/>
-              <a:t>lm</a:t>
-            </a:r>
-            <a:r>
-              <a:rPr lang="en-US" dirty="0"/>
-              <a:t>() command was used to create a linear regression of the grouped data. This way we can predict future data based on what we have currently. </a:t>
+              <a:t>ggplot</a:t>
+            </a:r>
+            <a:r>
+              <a:rPr lang="en-US" dirty="0"/>
+              <a:t> was ran again for a comparison of the overall growth of the roots and the shoots of all species within each tank. For the tanks with multiple plant species the plant species were singled out for individual analysis of their performance in the tanks. </a:t>
             </a:r>
             <a:r>
               <a:rPr lang="en-US" dirty="0" err="1"/>
-              <a:t>abline</a:t>
-            </a:r>
-            <a:r>
-              <a:rPr lang="en-US" dirty="0"/>
-              <a:t> was used to give a line of best fit for the data. This line of best fit estimates the straight line through the data that minimized the distance between it and all the other points within the graph. col= was used </a:t>
+              <a:t>geom_point</a:t>
+            </a:r>
+            <a:r>
+              <a:rPr lang="en-US" dirty="0"/>
+              <a:t>() draws the points defined by the x and y variables previously defined and can give them specifics on how they are presented on the graph. Within </a:t>
             </a:r>
             <a:r>
               <a:rPr lang="en-US" dirty="0" err="1"/>
-              <a:t>ti</a:t>
-            </a:r>
-            <a:r>
-              <a:rPr lang="en-US" dirty="0"/>
-              <a:t> associate the line with the color previously given to the data with </a:t>
+              <a:t>geom</a:t>
+            </a:r>
+            <a:r>
+              <a:rPr lang="en-US" dirty="0"/>
+              <a:t> point we can give the points color (color=), tell it how big to make the points (linewidth=), </a:t>
             </a:r>
             <a:r>
               <a:rPr lang="en-US" dirty="0" err="1"/>
-              <a:t>lty</a:t>
-            </a:r>
-            <a:r>
-              <a:rPr lang="en-US" dirty="0"/>
-              <a:t>= being used to maximize difference between the lines as to not confuse them.</a:t>
+              <a:t>annd</a:t>
+            </a:r>
+            <a:r>
+              <a:rPr lang="en-US" dirty="0"/>
+              <a:t> the opacity of the points on a scale from 0-1 (alpha=). Within the </a:t>
+            </a:r>
+            <a:r>
+              <a:rPr lang="en-US" dirty="0" err="1"/>
+              <a:t>ggpubr</a:t>
+            </a:r>
+            <a:r>
+              <a:rPr lang="en-US" dirty="0"/>
+              <a:t> library we get the </a:t>
+            </a:r>
+            <a:r>
+              <a:rPr lang="en-US" dirty="0" err="1"/>
+              <a:t>ggarrange</a:t>
+            </a:r>
+            <a:r>
+              <a:rPr lang="en-US" dirty="0"/>
+              <a:t> function which allows for the graphs to be placed within a single page to be displayed at the same time. </a:t>
+            </a:r>
+            <a:r>
+              <a:rPr lang="en-US" dirty="0" err="1"/>
+              <a:t>rremove</a:t>
+            </a:r>
+            <a:r>
+              <a:rPr lang="en-US" dirty="0"/>
+              <a:t> allowed for the removal of the x labels that would have </a:t>
+            </a:r>
+            <a:r>
+              <a:rPr lang="en-US" dirty="0" err="1"/>
+              <a:t>otheriwse</a:t>
+            </a:r>
+            <a:r>
+              <a:rPr lang="en-US" dirty="0"/>
+              <a:t> been to jumbled to read. The label function gives a name to each graph (tank 1 is "a", tank 2 is "b" and tank 3 is "c") on the page while the </a:t>
+            </a:r>
+            <a:r>
+              <a:rPr lang="en-US" dirty="0" err="1"/>
+              <a:t>ncola</a:t>
+            </a:r>
+            <a:r>
+              <a:rPr lang="en-US" dirty="0"/>
+              <a:t> and </a:t>
+            </a:r>
+            <a:r>
+              <a:rPr lang="en-US" dirty="0" err="1"/>
+              <a:t>nrow</a:t>
+            </a:r>
+            <a:r>
+              <a:rPr lang="en-US" dirty="0"/>
+              <a:t> lays out the grid of how the graphs show up. In this case it is a 2x2 pattern. </a:t>
             </a:r>
           </a:p>
         </p:txBody>
@@ -694,7 +737,7 @@
           <a:p>
             <a:fld id="{B98E28CC-C23C-194C-BD01-979D3612A888}" type="slidenum">
               <a:rPr lang="en-US" smtClean="0"/>
-              <a:t>7</a:t>
+              <a:t>6</a:t>
             </a:fld>
             <a:endParaRPr lang="en-US"/>
           </a:p>
@@ -703,7 +746,7 @@
     </p:spTree>
     <p:extLst>
       <p:ext uri="{BB962C8B-B14F-4D97-AF65-F5344CB8AC3E}">
-        <p14:creationId xmlns:p14="http://schemas.microsoft.com/office/powerpoint/2010/main" val="3576742304"/>
+        <p14:creationId xmlns:p14="http://schemas.microsoft.com/office/powerpoint/2010/main" val="2838190014"/>
       </p:ext>
     </p:extLst>
   </p:cSld>
@@ -758,84 +801,40 @@
           <a:lstStyle/>
           <a:p>
             <a:r>
+              <a:rPr lang="en-US" dirty="0"/>
+              <a:t>The </a:t>
+            </a:r>
+            <a:r>
               <a:rPr lang="en-US" dirty="0" err="1"/>
-              <a:t>ggplot</a:t>
-            </a:r>
-            <a:r>
-              <a:rPr lang="en-US" dirty="0"/>
-              <a:t> was ran again for a comparison of the overall growth of the roots and the shoots of all species within each tank. For the tanks with multiple plant species the plant species were singled out for individual analysis of their performance in the tanks. </a:t>
+              <a:t>guc.Aseries</a:t>
+            </a:r>
+            <a:r>
+              <a:rPr lang="en-US" dirty="0"/>
+              <a:t> was brought in again using a pairwise test to compare homogeneity amongst the species. The </a:t>
             </a:r>
             <a:r>
               <a:rPr lang="en-US" dirty="0" err="1"/>
-              <a:t>geom_point</a:t>
-            </a:r>
-            <a:r>
-              <a:rPr lang="en-US" dirty="0"/>
-              <a:t>() draws the points defined by the x and y variables previously defined and can give them specifics on how they are presented on the graph. Within </a:t>
+              <a:t>xlabel</a:t>
+            </a:r>
+            <a:r>
+              <a:rPr lang="en-US" dirty="0"/>
+              <a:t> was the plant species with the y label being the shoot length for this graph and the root length for the graph below. The function </a:t>
             </a:r>
             <a:r>
               <a:rPr lang="en-US" dirty="0" err="1"/>
-              <a:t>geom</a:t>
-            </a:r>
-            <a:r>
-              <a:rPr lang="en-US" dirty="0"/>
-              <a:t> point we can give the points color (color=), tell it how big to make the points (linewidth=), </a:t>
+              <a:t>ggbetweenstats</a:t>
+            </a:r>
+            <a:r>
+              <a:rPr lang="en-US" dirty="0"/>
+              <a:t>() was used for its ability to create publication ready plots with </a:t>
             </a:r>
             <a:r>
               <a:rPr lang="en-US" dirty="0" err="1"/>
-              <a:t>annd</a:t>
-            </a:r>
-            <a:r>
-              <a:rPr lang="en-US" dirty="0"/>
-              <a:t> the opacity of the points on a scale from 0-1 (alpha=). Within the </a:t>
-            </a:r>
-            <a:r>
-              <a:rPr lang="en-US" dirty="0" err="1"/>
-              <a:t>ggpubr</a:t>
-            </a:r>
-            <a:r>
-              <a:rPr lang="en-US" dirty="0"/>
-              <a:t> library we get the </a:t>
-            </a:r>
-            <a:r>
-              <a:rPr lang="en-US" dirty="0" err="1"/>
-              <a:t>ggarrange</a:t>
-            </a:r>
-            <a:r>
-              <a:rPr lang="en-US" dirty="0"/>
-              <a:t> function which allows for the graphs to be placed within a single page to be displayed at the same time. </a:t>
-            </a:r>
-            <a:r>
-              <a:rPr lang="en-US" dirty="0" err="1"/>
-              <a:t>rremove</a:t>
-            </a:r>
-            <a:r>
-              <a:rPr lang="en-US" dirty="0"/>
-              <a:t> allowed for the removal of the x labels that would have </a:t>
-            </a:r>
-            <a:r>
-              <a:rPr lang="en-US" dirty="0" err="1"/>
-              <a:t>otheriwse</a:t>
-            </a:r>
-            <a:r>
-              <a:rPr lang="en-US" dirty="0"/>
-              <a:t> been to jumbled to read. The label function gives a name to each graph (tank 1 is "a", tank 2 is "b" and tank 3 is "c") on the page while the </a:t>
-            </a:r>
-            <a:r>
-              <a:rPr lang="en-US" dirty="0" err="1"/>
-              <a:t>ncola</a:t>
-            </a:r>
-            <a:r>
-              <a:rPr lang="en-US" dirty="0"/>
-              <a:t> and </a:t>
-            </a:r>
-            <a:r>
-              <a:rPr lang="en-US" dirty="0" err="1"/>
-              <a:t>nrow</a:t>
-            </a:r>
-            <a:r>
-              <a:rPr lang="en-US" dirty="0"/>
-              <a:t> lays out the grid of how the graphs show up. In this case it is a 2x2 pattern. </a:t>
+              <a:t>relavent</a:t>
+            </a:r>
+            <a:r>
+              <a:rPr lang="en-US" dirty="0"/>
+              <a:t> statistical analysis. In this case it was used to create a violin plot, which has the advantage over a traditional box plot by giving an more accurate accurate view on the distribution of the data points. From the graph we can see that each of the species is statistically significant from one another. From the confidence interval given we can say with 95% confidence that the mean of the data set is between 0.62 and 1.00 for this specific measure of plant species against shoot length. The r value can tell us that 71% of the points along the graph can be explained and that their is a positive correlation amongst the datapoints for the graph.</a:t>
             </a:r>
           </a:p>
         </p:txBody>
@@ -857,7 +856,7 @@
           <a:p>
             <a:fld id="{B98E28CC-C23C-194C-BD01-979D3612A888}" type="slidenum">
               <a:rPr lang="en-US" smtClean="0"/>
-              <a:t>8</a:t>
+              <a:t>7</a:t>
             </a:fld>
             <a:endParaRPr lang="en-US"/>
           </a:p>
@@ -866,7 +865,7 @@
     </p:spTree>
     <p:extLst>
       <p:ext uri="{BB962C8B-B14F-4D97-AF65-F5344CB8AC3E}">
-        <p14:creationId xmlns:p14="http://schemas.microsoft.com/office/powerpoint/2010/main" val="2838190014"/>
+        <p14:creationId xmlns:p14="http://schemas.microsoft.com/office/powerpoint/2010/main" val="3497279431"/>
       </p:ext>
     </p:extLst>
   </p:cSld>
@@ -956,7 +955,7 @@
           <a:p>
             <a:fld id="{B98E28CC-C23C-194C-BD01-979D3612A888}" type="slidenum">
               <a:rPr lang="en-US" smtClean="0"/>
-              <a:t>9</a:t>
+              <a:t>8</a:t>
             </a:fld>
             <a:endParaRPr lang="en-US"/>
           </a:p>
@@ -1087,7 +1086,7 @@
           <a:p>
             <a:fld id="{B98E28CC-C23C-194C-BD01-979D3612A888}" type="slidenum">
               <a:rPr lang="en-US" smtClean="0"/>
-              <a:t>10</a:t>
+              <a:t>9</a:t>
             </a:fld>
             <a:endParaRPr lang="en-US"/>
           </a:p>
@@ -1128,7 +1127,7 @@
           <p:cNvPr id="2" name="Title 1">
             <a:extLst>
               <a:ext uri="{FF2B5EF4-FFF2-40B4-BE49-F238E27FC236}">
-                <a16:creationId xmlns:a16="http://schemas.microsoft.com/office/drawing/2014/main" id="{C48FBF43-DF3D-F70E-DDD9-6EA85E14C1A5}"/>
+                <a16:creationId xmlns:a16="http://schemas.microsoft.com/office/drawing/2014/main" id="{77F0ADCF-ED3E-2C42-236C-01D05ADB23F4}"/>
               </a:ext>
             </a:extLst>
           </p:cNvPr>
@@ -1165,7 +1164,7 @@
           <p:cNvPr id="3" name="Subtitle 2">
             <a:extLst>
               <a:ext uri="{FF2B5EF4-FFF2-40B4-BE49-F238E27FC236}">
-                <a16:creationId xmlns:a16="http://schemas.microsoft.com/office/drawing/2014/main" id="{A4C5DBB0-803A-093A-DF7F-3C37C40C35E9}"/>
+                <a16:creationId xmlns:a16="http://schemas.microsoft.com/office/drawing/2014/main" id="{58029A21-77BF-EC11-474C-2B45FA315D29}"/>
               </a:ext>
             </a:extLst>
           </p:cNvPr>
@@ -1235,7 +1234,7 @@
           <p:cNvPr id="4" name="Date Placeholder 3">
             <a:extLst>
               <a:ext uri="{FF2B5EF4-FFF2-40B4-BE49-F238E27FC236}">
-                <a16:creationId xmlns:a16="http://schemas.microsoft.com/office/drawing/2014/main" id="{25DD82EC-A93B-1020-FF39-B39FC97BCD03}"/>
+                <a16:creationId xmlns:a16="http://schemas.microsoft.com/office/drawing/2014/main" id="{FB26E31C-DAA8-BA24-11DD-209238579FAF}"/>
               </a:ext>
             </a:extLst>
           </p:cNvPr>
@@ -1264,7 +1263,7 @@
           <p:cNvPr id="5" name="Footer Placeholder 4">
             <a:extLst>
               <a:ext uri="{FF2B5EF4-FFF2-40B4-BE49-F238E27FC236}">
-                <a16:creationId xmlns:a16="http://schemas.microsoft.com/office/drawing/2014/main" id="{E13E96C2-4D1A-82EC-AB03-40C5947CA58E}"/>
+                <a16:creationId xmlns:a16="http://schemas.microsoft.com/office/drawing/2014/main" id="{91BAB59C-EDDB-84B4-9198-79DF1A415BA9}"/>
               </a:ext>
             </a:extLst>
           </p:cNvPr>
@@ -1289,7 +1288,7 @@
           <p:cNvPr id="6" name="Slide Number Placeholder 5">
             <a:extLst>
               <a:ext uri="{FF2B5EF4-FFF2-40B4-BE49-F238E27FC236}">
-                <a16:creationId xmlns:a16="http://schemas.microsoft.com/office/drawing/2014/main" id="{1710F7A3-DB30-97FA-CDA2-649D9C509BF6}"/>
+                <a16:creationId xmlns:a16="http://schemas.microsoft.com/office/drawing/2014/main" id="{6D357966-BF09-0F18-F658-FC8F52C4068F}"/>
               </a:ext>
             </a:extLst>
           </p:cNvPr>
@@ -1316,7 +1315,7 @@
     </p:spTree>
     <p:extLst>
       <p:ext uri="{BB962C8B-B14F-4D97-AF65-F5344CB8AC3E}">
-        <p14:creationId xmlns:p14="http://schemas.microsoft.com/office/powerpoint/2010/main" val="2784172606"/>
+        <p14:creationId xmlns:p14="http://schemas.microsoft.com/office/powerpoint/2010/main" val="182204345"/>
       </p:ext>
     </p:extLst>
   </p:cSld>
@@ -1348,7 +1347,7 @@
           <p:cNvPr id="2" name="Title 1">
             <a:extLst>
               <a:ext uri="{FF2B5EF4-FFF2-40B4-BE49-F238E27FC236}">
-                <a16:creationId xmlns:a16="http://schemas.microsoft.com/office/drawing/2014/main" id="{66F57B35-8919-4C82-AC19-32C0B37292F6}"/>
+                <a16:creationId xmlns:a16="http://schemas.microsoft.com/office/drawing/2014/main" id="{58AC6075-E3DD-1EA1-B9A2-BF3D09F05EE9}"/>
               </a:ext>
             </a:extLst>
           </p:cNvPr>
@@ -1376,7 +1375,7 @@
           <p:cNvPr id="3" name="Vertical Text Placeholder 2">
             <a:extLst>
               <a:ext uri="{FF2B5EF4-FFF2-40B4-BE49-F238E27FC236}">
-                <a16:creationId xmlns:a16="http://schemas.microsoft.com/office/drawing/2014/main" id="{4B203C30-4A93-3B04-946D-6A1E1B13223E}"/>
+                <a16:creationId xmlns:a16="http://schemas.microsoft.com/office/drawing/2014/main" id="{132488EB-0C43-DB5F-27B3-5FE6645F5F59}"/>
               </a:ext>
             </a:extLst>
           </p:cNvPr>
@@ -1433,7 +1432,7 @@
           <p:cNvPr id="4" name="Date Placeholder 3">
             <a:extLst>
               <a:ext uri="{FF2B5EF4-FFF2-40B4-BE49-F238E27FC236}">
-                <a16:creationId xmlns:a16="http://schemas.microsoft.com/office/drawing/2014/main" id="{0F3CF8A5-EA11-4AC6-17C1-C9683B2FA027}"/>
+                <a16:creationId xmlns:a16="http://schemas.microsoft.com/office/drawing/2014/main" id="{AE090B56-FE89-6F46-DC90-E095BE784977}"/>
               </a:ext>
             </a:extLst>
           </p:cNvPr>
@@ -1462,7 +1461,7 @@
           <p:cNvPr id="5" name="Footer Placeholder 4">
             <a:extLst>
               <a:ext uri="{FF2B5EF4-FFF2-40B4-BE49-F238E27FC236}">
-                <a16:creationId xmlns:a16="http://schemas.microsoft.com/office/drawing/2014/main" id="{A1B97B21-607D-56A5-6309-30EAC57FB366}"/>
+                <a16:creationId xmlns:a16="http://schemas.microsoft.com/office/drawing/2014/main" id="{D0E460FC-75EC-5D50-473B-62F6064CEFF7}"/>
               </a:ext>
             </a:extLst>
           </p:cNvPr>
@@ -1487,7 +1486,7 @@
           <p:cNvPr id="6" name="Slide Number Placeholder 5">
             <a:extLst>
               <a:ext uri="{FF2B5EF4-FFF2-40B4-BE49-F238E27FC236}">
-                <a16:creationId xmlns:a16="http://schemas.microsoft.com/office/drawing/2014/main" id="{E3D12894-46F6-DBE0-411E-D88EF972B26F}"/>
+                <a16:creationId xmlns:a16="http://schemas.microsoft.com/office/drawing/2014/main" id="{216F5494-7A16-271A-FFD5-3776A87663EE}"/>
               </a:ext>
             </a:extLst>
           </p:cNvPr>
@@ -1514,7 +1513,7 @@
     </p:spTree>
     <p:extLst>
       <p:ext uri="{BB962C8B-B14F-4D97-AF65-F5344CB8AC3E}">
-        <p14:creationId xmlns:p14="http://schemas.microsoft.com/office/powerpoint/2010/main" val="3214298861"/>
+        <p14:creationId xmlns:p14="http://schemas.microsoft.com/office/powerpoint/2010/main" val="63202785"/>
       </p:ext>
     </p:extLst>
   </p:cSld>
@@ -1546,7 +1545,7 @@
           <p:cNvPr id="2" name="Vertical Title 1">
             <a:extLst>
               <a:ext uri="{FF2B5EF4-FFF2-40B4-BE49-F238E27FC236}">
-                <a16:creationId xmlns:a16="http://schemas.microsoft.com/office/drawing/2014/main" id="{DF69A3E4-BC58-613B-2109-1AC0CD0A3582}"/>
+                <a16:creationId xmlns:a16="http://schemas.microsoft.com/office/drawing/2014/main" id="{F3D4DA2C-BA94-CAF2-2ABD-518EC8042641}"/>
               </a:ext>
             </a:extLst>
           </p:cNvPr>
@@ -1579,7 +1578,7 @@
           <p:cNvPr id="3" name="Vertical Text Placeholder 2">
             <a:extLst>
               <a:ext uri="{FF2B5EF4-FFF2-40B4-BE49-F238E27FC236}">
-                <a16:creationId xmlns:a16="http://schemas.microsoft.com/office/drawing/2014/main" id="{E76761C4-7B79-3444-E33F-642C9F07029F}"/>
+                <a16:creationId xmlns:a16="http://schemas.microsoft.com/office/drawing/2014/main" id="{41A3EFCF-2038-E679-E599-3B76E98B4DAA}"/>
               </a:ext>
             </a:extLst>
           </p:cNvPr>
@@ -1641,7 +1640,7 @@
           <p:cNvPr id="4" name="Date Placeholder 3">
             <a:extLst>
               <a:ext uri="{FF2B5EF4-FFF2-40B4-BE49-F238E27FC236}">
-                <a16:creationId xmlns:a16="http://schemas.microsoft.com/office/drawing/2014/main" id="{3BBA9697-21E7-C73F-0FDA-F3FD40F5661C}"/>
+                <a16:creationId xmlns:a16="http://schemas.microsoft.com/office/drawing/2014/main" id="{B6069BCC-6BF3-F7EA-7375-FDBEB5824ACE}"/>
               </a:ext>
             </a:extLst>
           </p:cNvPr>
@@ -1670,7 +1669,7 @@
           <p:cNvPr id="5" name="Footer Placeholder 4">
             <a:extLst>
               <a:ext uri="{FF2B5EF4-FFF2-40B4-BE49-F238E27FC236}">
-                <a16:creationId xmlns:a16="http://schemas.microsoft.com/office/drawing/2014/main" id="{B7821461-2B0B-1B9F-B1FB-EC486EB189A9}"/>
+                <a16:creationId xmlns:a16="http://schemas.microsoft.com/office/drawing/2014/main" id="{3A03CC38-9E49-3003-6636-3ABB8EDF927A}"/>
               </a:ext>
             </a:extLst>
           </p:cNvPr>
@@ -1695,7 +1694,7 @@
           <p:cNvPr id="6" name="Slide Number Placeholder 5">
             <a:extLst>
               <a:ext uri="{FF2B5EF4-FFF2-40B4-BE49-F238E27FC236}">
-                <a16:creationId xmlns:a16="http://schemas.microsoft.com/office/drawing/2014/main" id="{0FB5D0B2-6930-513D-87FD-730FCE808BB3}"/>
+                <a16:creationId xmlns:a16="http://schemas.microsoft.com/office/drawing/2014/main" id="{9BE228C3-17ED-5B05-6262-C269211B0276}"/>
               </a:ext>
             </a:extLst>
           </p:cNvPr>
@@ -1722,7 +1721,7 @@
     </p:spTree>
     <p:extLst>
       <p:ext uri="{BB962C8B-B14F-4D97-AF65-F5344CB8AC3E}">
-        <p14:creationId xmlns:p14="http://schemas.microsoft.com/office/powerpoint/2010/main" val="2753410659"/>
+        <p14:creationId xmlns:p14="http://schemas.microsoft.com/office/powerpoint/2010/main" val="3259775377"/>
       </p:ext>
     </p:extLst>
   </p:cSld>
@@ -1754,7 +1753,7 @@
           <p:cNvPr id="2" name="Title 1">
             <a:extLst>
               <a:ext uri="{FF2B5EF4-FFF2-40B4-BE49-F238E27FC236}">
-                <a16:creationId xmlns:a16="http://schemas.microsoft.com/office/drawing/2014/main" id="{C0C51B8A-6F5B-3705-45B2-A745B68B6A5F}"/>
+                <a16:creationId xmlns:a16="http://schemas.microsoft.com/office/drawing/2014/main" id="{881ED87B-A815-CE43-5BD6-B3F243290AA7}"/>
               </a:ext>
             </a:extLst>
           </p:cNvPr>
@@ -1782,7 +1781,7 @@
           <p:cNvPr id="3" name="Content Placeholder 2">
             <a:extLst>
               <a:ext uri="{FF2B5EF4-FFF2-40B4-BE49-F238E27FC236}">
-                <a16:creationId xmlns:a16="http://schemas.microsoft.com/office/drawing/2014/main" id="{6B4A868A-047F-3B55-676A-784E00882429}"/>
+                <a16:creationId xmlns:a16="http://schemas.microsoft.com/office/drawing/2014/main" id="{0E278092-EAAD-E8E1-EBB5-CE51ADC556DE}"/>
               </a:ext>
             </a:extLst>
           </p:cNvPr>
@@ -1839,7 +1838,7 @@
           <p:cNvPr id="4" name="Date Placeholder 3">
             <a:extLst>
               <a:ext uri="{FF2B5EF4-FFF2-40B4-BE49-F238E27FC236}">
-                <a16:creationId xmlns:a16="http://schemas.microsoft.com/office/drawing/2014/main" id="{F32080B4-2E51-7710-FBF9-EB3E11D869CF}"/>
+                <a16:creationId xmlns:a16="http://schemas.microsoft.com/office/drawing/2014/main" id="{022862BD-DA4F-98FE-3D90-959B79B5C55E}"/>
               </a:ext>
             </a:extLst>
           </p:cNvPr>
@@ -1868,7 +1867,7 @@
           <p:cNvPr id="5" name="Footer Placeholder 4">
             <a:extLst>
               <a:ext uri="{FF2B5EF4-FFF2-40B4-BE49-F238E27FC236}">
-                <a16:creationId xmlns:a16="http://schemas.microsoft.com/office/drawing/2014/main" id="{21889645-6637-5C64-7917-43915D03DACC}"/>
+                <a16:creationId xmlns:a16="http://schemas.microsoft.com/office/drawing/2014/main" id="{A0D4E7CC-0737-577A-9111-81E1535063CE}"/>
               </a:ext>
             </a:extLst>
           </p:cNvPr>
@@ -1893,7 +1892,7 @@
           <p:cNvPr id="6" name="Slide Number Placeholder 5">
             <a:extLst>
               <a:ext uri="{FF2B5EF4-FFF2-40B4-BE49-F238E27FC236}">
-                <a16:creationId xmlns:a16="http://schemas.microsoft.com/office/drawing/2014/main" id="{CBB61171-D22A-543F-A5B7-11DFDF2FABB6}"/>
+                <a16:creationId xmlns:a16="http://schemas.microsoft.com/office/drawing/2014/main" id="{57B6793E-DC5D-2CE7-FEC5-F2BD833F0B88}"/>
               </a:ext>
             </a:extLst>
           </p:cNvPr>
@@ -1920,7 +1919,7 @@
     </p:spTree>
     <p:extLst>
       <p:ext uri="{BB962C8B-B14F-4D97-AF65-F5344CB8AC3E}">
-        <p14:creationId xmlns:p14="http://schemas.microsoft.com/office/powerpoint/2010/main" val="3704724379"/>
+        <p14:creationId xmlns:p14="http://schemas.microsoft.com/office/powerpoint/2010/main" val="961743358"/>
       </p:ext>
     </p:extLst>
   </p:cSld>
@@ -1952,7 +1951,7 @@
           <p:cNvPr id="2" name="Title 1">
             <a:extLst>
               <a:ext uri="{FF2B5EF4-FFF2-40B4-BE49-F238E27FC236}">
-                <a16:creationId xmlns:a16="http://schemas.microsoft.com/office/drawing/2014/main" id="{36AA896D-33BB-3F29-7B33-497D872DE11F}"/>
+                <a16:creationId xmlns:a16="http://schemas.microsoft.com/office/drawing/2014/main" id="{D701CB6D-0E62-A91B-8851-6F907D8200C5}"/>
               </a:ext>
             </a:extLst>
           </p:cNvPr>
@@ -1989,7 +1988,7 @@
           <p:cNvPr id="3" name="Text Placeholder 2">
             <a:extLst>
               <a:ext uri="{FF2B5EF4-FFF2-40B4-BE49-F238E27FC236}">
-                <a16:creationId xmlns:a16="http://schemas.microsoft.com/office/drawing/2014/main" id="{9AC6E397-289D-B5AA-13D3-D485026DF1A5}"/>
+                <a16:creationId xmlns:a16="http://schemas.microsoft.com/office/drawing/2014/main" id="{0E661BA6-75A2-0914-E140-A159FD1F0385}"/>
               </a:ext>
             </a:extLst>
           </p:cNvPr>
@@ -2114,7 +2113,7 @@
           <p:cNvPr id="4" name="Date Placeholder 3">
             <a:extLst>
               <a:ext uri="{FF2B5EF4-FFF2-40B4-BE49-F238E27FC236}">
-                <a16:creationId xmlns:a16="http://schemas.microsoft.com/office/drawing/2014/main" id="{AE0C3B97-15B6-79E0-61EF-DD8B00F19126}"/>
+                <a16:creationId xmlns:a16="http://schemas.microsoft.com/office/drawing/2014/main" id="{82E359E0-472A-30D6-E2FF-3F0B4BB1B9E0}"/>
               </a:ext>
             </a:extLst>
           </p:cNvPr>
@@ -2143,7 +2142,7 @@
           <p:cNvPr id="5" name="Footer Placeholder 4">
             <a:extLst>
               <a:ext uri="{FF2B5EF4-FFF2-40B4-BE49-F238E27FC236}">
-                <a16:creationId xmlns:a16="http://schemas.microsoft.com/office/drawing/2014/main" id="{8ACA5C77-B79B-0FA0-FF37-92A40112F2F2}"/>
+                <a16:creationId xmlns:a16="http://schemas.microsoft.com/office/drawing/2014/main" id="{A2643A10-858C-BA51-A9AA-6FE14DC93B80}"/>
               </a:ext>
             </a:extLst>
           </p:cNvPr>
@@ -2168,7 +2167,7 @@
           <p:cNvPr id="6" name="Slide Number Placeholder 5">
             <a:extLst>
               <a:ext uri="{FF2B5EF4-FFF2-40B4-BE49-F238E27FC236}">
-                <a16:creationId xmlns:a16="http://schemas.microsoft.com/office/drawing/2014/main" id="{F1532173-6678-17CB-DAE9-42A60ACBC11F}"/>
+                <a16:creationId xmlns:a16="http://schemas.microsoft.com/office/drawing/2014/main" id="{5194FAD5-CD96-0212-672B-36EA22A3F886}"/>
               </a:ext>
             </a:extLst>
           </p:cNvPr>
@@ -2195,7 +2194,7 @@
     </p:spTree>
     <p:extLst>
       <p:ext uri="{BB962C8B-B14F-4D97-AF65-F5344CB8AC3E}">
-        <p14:creationId xmlns:p14="http://schemas.microsoft.com/office/powerpoint/2010/main" val="3951529301"/>
+        <p14:creationId xmlns:p14="http://schemas.microsoft.com/office/powerpoint/2010/main" val="1152063267"/>
       </p:ext>
     </p:extLst>
   </p:cSld>
@@ -2227,7 +2226,7 @@
           <p:cNvPr id="2" name="Title 1">
             <a:extLst>
               <a:ext uri="{FF2B5EF4-FFF2-40B4-BE49-F238E27FC236}">
-                <a16:creationId xmlns:a16="http://schemas.microsoft.com/office/drawing/2014/main" id="{DF160EAF-8D31-3837-172A-DA2ED1979731}"/>
+                <a16:creationId xmlns:a16="http://schemas.microsoft.com/office/drawing/2014/main" id="{356E7EDB-6C83-52B6-6961-187B67DF80C0}"/>
               </a:ext>
             </a:extLst>
           </p:cNvPr>
@@ -2255,7 +2254,7 @@
           <p:cNvPr id="3" name="Content Placeholder 2">
             <a:extLst>
               <a:ext uri="{FF2B5EF4-FFF2-40B4-BE49-F238E27FC236}">
-                <a16:creationId xmlns:a16="http://schemas.microsoft.com/office/drawing/2014/main" id="{922ECDF5-8378-B41F-7DC4-E8B9264299E8}"/>
+                <a16:creationId xmlns:a16="http://schemas.microsoft.com/office/drawing/2014/main" id="{232A20D6-8C4F-6BB7-0E16-D8C96F44D031}"/>
               </a:ext>
             </a:extLst>
           </p:cNvPr>
@@ -2317,7 +2316,7 @@
           <p:cNvPr id="4" name="Content Placeholder 3">
             <a:extLst>
               <a:ext uri="{FF2B5EF4-FFF2-40B4-BE49-F238E27FC236}">
-                <a16:creationId xmlns:a16="http://schemas.microsoft.com/office/drawing/2014/main" id="{15F9F27F-96C6-25BB-0BD2-DC90F35B65DD}"/>
+                <a16:creationId xmlns:a16="http://schemas.microsoft.com/office/drawing/2014/main" id="{772EF1B3-06CA-BD69-D9DA-5B669F0A4B5E}"/>
               </a:ext>
             </a:extLst>
           </p:cNvPr>
@@ -2379,7 +2378,7 @@
           <p:cNvPr id="5" name="Date Placeholder 4">
             <a:extLst>
               <a:ext uri="{FF2B5EF4-FFF2-40B4-BE49-F238E27FC236}">
-                <a16:creationId xmlns:a16="http://schemas.microsoft.com/office/drawing/2014/main" id="{0668E61E-6181-2633-EC9C-A39CB251F208}"/>
+                <a16:creationId xmlns:a16="http://schemas.microsoft.com/office/drawing/2014/main" id="{EBCF7A58-7BEB-B8EE-FD88-7677A14A9E86}"/>
               </a:ext>
             </a:extLst>
           </p:cNvPr>
@@ -2408,7 +2407,7 @@
           <p:cNvPr id="6" name="Footer Placeholder 5">
             <a:extLst>
               <a:ext uri="{FF2B5EF4-FFF2-40B4-BE49-F238E27FC236}">
-                <a16:creationId xmlns:a16="http://schemas.microsoft.com/office/drawing/2014/main" id="{0A607619-1A81-2231-ED64-8856C1F86D80}"/>
+                <a16:creationId xmlns:a16="http://schemas.microsoft.com/office/drawing/2014/main" id="{C1E57F7A-0C46-C608-A874-787A3FAEDC8E}"/>
               </a:ext>
             </a:extLst>
           </p:cNvPr>
@@ -2433,7 +2432,7 @@
           <p:cNvPr id="7" name="Slide Number Placeholder 6">
             <a:extLst>
               <a:ext uri="{FF2B5EF4-FFF2-40B4-BE49-F238E27FC236}">
-                <a16:creationId xmlns:a16="http://schemas.microsoft.com/office/drawing/2014/main" id="{171974B2-EEEB-CDB7-4782-94842B983204}"/>
+                <a16:creationId xmlns:a16="http://schemas.microsoft.com/office/drawing/2014/main" id="{A80EB90E-79F2-0CEA-AEB1-D8128101C7C0}"/>
               </a:ext>
             </a:extLst>
           </p:cNvPr>
@@ -2460,7 +2459,7 @@
     </p:spTree>
     <p:extLst>
       <p:ext uri="{BB962C8B-B14F-4D97-AF65-F5344CB8AC3E}">
-        <p14:creationId xmlns:p14="http://schemas.microsoft.com/office/powerpoint/2010/main" val="667411469"/>
+        <p14:creationId xmlns:p14="http://schemas.microsoft.com/office/powerpoint/2010/main" val="2132292178"/>
       </p:ext>
     </p:extLst>
   </p:cSld>
@@ -2492,7 +2491,7 @@
           <p:cNvPr id="2" name="Title 1">
             <a:extLst>
               <a:ext uri="{FF2B5EF4-FFF2-40B4-BE49-F238E27FC236}">
-                <a16:creationId xmlns:a16="http://schemas.microsoft.com/office/drawing/2014/main" id="{800D6CE9-3D7B-6924-61E3-C02F99A530AD}"/>
+                <a16:creationId xmlns:a16="http://schemas.microsoft.com/office/drawing/2014/main" id="{E0C90785-CB52-3173-093F-F5BFB857262D}"/>
               </a:ext>
             </a:extLst>
           </p:cNvPr>
@@ -2525,7 +2524,7 @@
           <p:cNvPr id="3" name="Text Placeholder 2">
             <a:extLst>
               <a:ext uri="{FF2B5EF4-FFF2-40B4-BE49-F238E27FC236}">
-                <a16:creationId xmlns:a16="http://schemas.microsoft.com/office/drawing/2014/main" id="{F4B94EAC-A1F7-4DF6-9715-3DAB793E2EC5}"/>
+                <a16:creationId xmlns:a16="http://schemas.microsoft.com/office/drawing/2014/main" id="{39055080-955B-D64F-1F33-C3B200025682}"/>
               </a:ext>
             </a:extLst>
           </p:cNvPr>
@@ -2596,7 +2595,7 @@
           <p:cNvPr id="4" name="Content Placeholder 3">
             <a:extLst>
               <a:ext uri="{FF2B5EF4-FFF2-40B4-BE49-F238E27FC236}">
-                <a16:creationId xmlns:a16="http://schemas.microsoft.com/office/drawing/2014/main" id="{B1791C5E-1600-1EB4-F370-D2266A4B5986}"/>
+                <a16:creationId xmlns:a16="http://schemas.microsoft.com/office/drawing/2014/main" id="{FADE11DB-647F-E491-35CA-565503196A3B}"/>
               </a:ext>
             </a:extLst>
           </p:cNvPr>
@@ -2658,7 +2657,7 @@
           <p:cNvPr id="5" name="Text Placeholder 4">
             <a:extLst>
               <a:ext uri="{FF2B5EF4-FFF2-40B4-BE49-F238E27FC236}">
-                <a16:creationId xmlns:a16="http://schemas.microsoft.com/office/drawing/2014/main" id="{772CA662-DF1A-B329-E03D-7CBC3C161AE9}"/>
+                <a16:creationId xmlns:a16="http://schemas.microsoft.com/office/drawing/2014/main" id="{9DB4A0E1-1BA3-F31C-0833-5A13008831F4}"/>
               </a:ext>
             </a:extLst>
           </p:cNvPr>
@@ -2729,7 +2728,7 @@
           <p:cNvPr id="6" name="Content Placeholder 5">
             <a:extLst>
               <a:ext uri="{FF2B5EF4-FFF2-40B4-BE49-F238E27FC236}">
-                <a16:creationId xmlns:a16="http://schemas.microsoft.com/office/drawing/2014/main" id="{3E143E80-36FC-994A-4B8B-7DAEFDA3D1DD}"/>
+                <a16:creationId xmlns:a16="http://schemas.microsoft.com/office/drawing/2014/main" id="{DBC32FDF-B1D1-98BD-E0B0-3A0D53192792}"/>
               </a:ext>
             </a:extLst>
           </p:cNvPr>
@@ -2791,7 +2790,7 @@
           <p:cNvPr id="7" name="Date Placeholder 6">
             <a:extLst>
               <a:ext uri="{FF2B5EF4-FFF2-40B4-BE49-F238E27FC236}">
-                <a16:creationId xmlns:a16="http://schemas.microsoft.com/office/drawing/2014/main" id="{3AEC7E03-794C-210E-EA9C-A1F3B53D3653}"/>
+                <a16:creationId xmlns:a16="http://schemas.microsoft.com/office/drawing/2014/main" id="{1C5621FA-88A5-9272-3090-17AA1AA6F4F0}"/>
               </a:ext>
             </a:extLst>
           </p:cNvPr>
@@ -2820,7 +2819,7 @@
           <p:cNvPr id="8" name="Footer Placeholder 7">
             <a:extLst>
               <a:ext uri="{FF2B5EF4-FFF2-40B4-BE49-F238E27FC236}">
-                <a16:creationId xmlns:a16="http://schemas.microsoft.com/office/drawing/2014/main" id="{C4FEFB84-98A2-C154-75E4-35EC1B19B79D}"/>
+                <a16:creationId xmlns:a16="http://schemas.microsoft.com/office/drawing/2014/main" id="{BED8E78E-6081-BEFA-4FDC-7FECC17032D3}"/>
               </a:ext>
             </a:extLst>
           </p:cNvPr>
@@ -2845,7 +2844,7 @@
           <p:cNvPr id="9" name="Slide Number Placeholder 8">
             <a:extLst>
               <a:ext uri="{FF2B5EF4-FFF2-40B4-BE49-F238E27FC236}">
-                <a16:creationId xmlns:a16="http://schemas.microsoft.com/office/drawing/2014/main" id="{8A172834-4F02-3F3F-0186-AD66C8026E0D}"/>
+                <a16:creationId xmlns:a16="http://schemas.microsoft.com/office/drawing/2014/main" id="{C8539F5F-F8D7-5748-FF81-5C759CCD9469}"/>
               </a:ext>
             </a:extLst>
           </p:cNvPr>
@@ -2872,7 +2871,7 @@
     </p:spTree>
     <p:extLst>
       <p:ext uri="{BB962C8B-B14F-4D97-AF65-F5344CB8AC3E}">
-        <p14:creationId xmlns:p14="http://schemas.microsoft.com/office/powerpoint/2010/main" val="3872670091"/>
+        <p14:creationId xmlns:p14="http://schemas.microsoft.com/office/powerpoint/2010/main" val="3572236101"/>
       </p:ext>
     </p:extLst>
   </p:cSld>
@@ -2904,7 +2903,7 @@
           <p:cNvPr id="2" name="Title 1">
             <a:extLst>
               <a:ext uri="{FF2B5EF4-FFF2-40B4-BE49-F238E27FC236}">
-                <a16:creationId xmlns:a16="http://schemas.microsoft.com/office/drawing/2014/main" id="{5751B67F-DFC5-DDE4-7B03-65BFC7289996}"/>
+                <a16:creationId xmlns:a16="http://schemas.microsoft.com/office/drawing/2014/main" id="{82842162-1812-C8EF-7D79-9744DF6CEAB8}"/>
               </a:ext>
             </a:extLst>
           </p:cNvPr>
@@ -2932,7 +2931,7 @@
           <p:cNvPr id="3" name="Date Placeholder 2">
             <a:extLst>
               <a:ext uri="{FF2B5EF4-FFF2-40B4-BE49-F238E27FC236}">
-                <a16:creationId xmlns:a16="http://schemas.microsoft.com/office/drawing/2014/main" id="{6CF7F0B7-8818-0F62-E27A-BAD1CFFC8B85}"/>
+                <a16:creationId xmlns:a16="http://schemas.microsoft.com/office/drawing/2014/main" id="{CA0D4D52-E0B1-3349-4B98-F41796521190}"/>
               </a:ext>
             </a:extLst>
           </p:cNvPr>
@@ -2961,7 +2960,7 @@
           <p:cNvPr id="4" name="Footer Placeholder 3">
             <a:extLst>
               <a:ext uri="{FF2B5EF4-FFF2-40B4-BE49-F238E27FC236}">
-                <a16:creationId xmlns:a16="http://schemas.microsoft.com/office/drawing/2014/main" id="{524665E7-F4AE-B24E-D21C-261A9F390706}"/>
+                <a16:creationId xmlns:a16="http://schemas.microsoft.com/office/drawing/2014/main" id="{6261E76C-13E0-0802-6395-91CA99C11099}"/>
               </a:ext>
             </a:extLst>
           </p:cNvPr>
@@ -2986,7 +2985,7 @@
           <p:cNvPr id="5" name="Slide Number Placeholder 4">
             <a:extLst>
               <a:ext uri="{FF2B5EF4-FFF2-40B4-BE49-F238E27FC236}">
-                <a16:creationId xmlns:a16="http://schemas.microsoft.com/office/drawing/2014/main" id="{F9F7AF1E-EBBE-2C1E-C333-B438C3CB23D1}"/>
+                <a16:creationId xmlns:a16="http://schemas.microsoft.com/office/drawing/2014/main" id="{EDB8253E-A366-1874-DCFD-5525FDC1B628}"/>
               </a:ext>
             </a:extLst>
           </p:cNvPr>
@@ -3013,7 +3012,7 @@
     </p:spTree>
     <p:extLst>
       <p:ext uri="{BB962C8B-B14F-4D97-AF65-F5344CB8AC3E}">
-        <p14:creationId xmlns:p14="http://schemas.microsoft.com/office/powerpoint/2010/main" val="1492421165"/>
+        <p14:creationId xmlns:p14="http://schemas.microsoft.com/office/powerpoint/2010/main" val="3715909844"/>
       </p:ext>
     </p:extLst>
   </p:cSld>
@@ -3045,7 +3044,7 @@
           <p:cNvPr id="2" name="Date Placeholder 1">
             <a:extLst>
               <a:ext uri="{FF2B5EF4-FFF2-40B4-BE49-F238E27FC236}">
-                <a16:creationId xmlns:a16="http://schemas.microsoft.com/office/drawing/2014/main" id="{3CCC2069-4CAB-7421-220B-FFF812E23740}"/>
+                <a16:creationId xmlns:a16="http://schemas.microsoft.com/office/drawing/2014/main" id="{3A4857AC-C21B-3698-85D0-C3E6A3A9ACD7}"/>
               </a:ext>
             </a:extLst>
           </p:cNvPr>
@@ -3074,7 +3073,7 @@
           <p:cNvPr id="3" name="Footer Placeholder 2">
             <a:extLst>
               <a:ext uri="{FF2B5EF4-FFF2-40B4-BE49-F238E27FC236}">
-                <a16:creationId xmlns:a16="http://schemas.microsoft.com/office/drawing/2014/main" id="{651BB4D0-7BBB-EE6D-3279-4A70374EEBAE}"/>
+                <a16:creationId xmlns:a16="http://schemas.microsoft.com/office/drawing/2014/main" id="{EE4112DA-F0E6-7E4F-9E3D-E4834841862C}"/>
               </a:ext>
             </a:extLst>
           </p:cNvPr>
@@ -3099,7 +3098,7 @@
           <p:cNvPr id="4" name="Slide Number Placeholder 3">
             <a:extLst>
               <a:ext uri="{FF2B5EF4-FFF2-40B4-BE49-F238E27FC236}">
-                <a16:creationId xmlns:a16="http://schemas.microsoft.com/office/drawing/2014/main" id="{0DA1B03F-FC9F-CA93-AF84-D8EB80499BF1}"/>
+                <a16:creationId xmlns:a16="http://schemas.microsoft.com/office/drawing/2014/main" id="{D5AE8845-4237-6ED7-08F9-D2AA638E08EE}"/>
               </a:ext>
             </a:extLst>
           </p:cNvPr>
@@ -3126,7 +3125,7 @@
     </p:spTree>
     <p:extLst>
       <p:ext uri="{BB962C8B-B14F-4D97-AF65-F5344CB8AC3E}">
-        <p14:creationId xmlns:p14="http://schemas.microsoft.com/office/powerpoint/2010/main" val="2046568619"/>
+        <p14:creationId xmlns:p14="http://schemas.microsoft.com/office/powerpoint/2010/main" val="1563522280"/>
       </p:ext>
     </p:extLst>
   </p:cSld>
@@ -3158,7 +3157,7 @@
           <p:cNvPr id="2" name="Title 1">
             <a:extLst>
               <a:ext uri="{FF2B5EF4-FFF2-40B4-BE49-F238E27FC236}">
-                <a16:creationId xmlns:a16="http://schemas.microsoft.com/office/drawing/2014/main" id="{A2B10531-108B-C758-2F25-9E82D5684A71}"/>
+                <a16:creationId xmlns:a16="http://schemas.microsoft.com/office/drawing/2014/main" id="{FE47351B-AE2D-3E37-E1E9-C0C69D067CBE}"/>
               </a:ext>
             </a:extLst>
           </p:cNvPr>
@@ -3195,7 +3194,7 @@
           <p:cNvPr id="3" name="Content Placeholder 2">
             <a:extLst>
               <a:ext uri="{FF2B5EF4-FFF2-40B4-BE49-F238E27FC236}">
-                <a16:creationId xmlns:a16="http://schemas.microsoft.com/office/drawing/2014/main" id="{E6D701F0-F7DA-178D-D781-72B920C98755}"/>
+                <a16:creationId xmlns:a16="http://schemas.microsoft.com/office/drawing/2014/main" id="{C21C6D6B-CC37-A47E-83CB-DFD732F36F8A}"/>
               </a:ext>
             </a:extLst>
           </p:cNvPr>
@@ -3285,7 +3284,7 @@
           <p:cNvPr id="4" name="Text Placeholder 3">
             <a:extLst>
               <a:ext uri="{FF2B5EF4-FFF2-40B4-BE49-F238E27FC236}">
-                <a16:creationId xmlns:a16="http://schemas.microsoft.com/office/drawing/2014/main" id="{FAE594D2-0AFD-20CB-F7BB-F284FCEC1621}"/>
+                <a16:creationId xmlns:a16="http://schemas.microsoft.com/office/drawing/2014/main" id="{DDFB71F6-7EA4-187A-3348-AC3D59BA810B}"/>
               </a:ext>
             </a:extLst>
           </p:cNvPr>
@@ -3356,7 +3355,7 @@
           <p:cNvPr id="5" name="Date Placeholder 4">
             <a:extLst>
               <a:ext uri="{FF2B5EF4-FFF2-40B4-BE49-F238E27FC236}">
-                <a16:creationId xmlns:a16="http://schemas.microsoft.com/office/drawing/2014/main" id="{1D738A84-991B-CD41-5FBF-2A31A189536D}"/>
+                <a16:creationId xmlns:a16="http://schemas.microsoft.com/office/drawing/2014/main" id="{C3077E18-8F56-4107-C567-7D3FE10D4F98}"/>
               </a:ext>
             </a:extLst>
           </p:cNvPr>
@@ -3385,7 +3384,7 @@
           <p:cNvPr id="6" name="Footer Placeholder 5">
             <a:extLst>
               <a:ext uri="{FF2B5EF4-FFF2-40B4-BE49-F238E27FC236}">
-                <a16:creationId xmlns:a16="http://schemas.microsoft.com/office/drawing/2014/main" id="{64FBCE98-1FD4-34FB-12B1-FB372E2A495B}"/>
+                <a16:creationId xmlns:a16="http://schemas.microsoft.com/office/drawing/2014/main" id="{3790200D-C386-4CC8-F060-5FBACB74E45F}"/>
               </a:ext>
             </a:extLst>
           </p:cNvPr>
@@ -3410,7 +3409,7 @@
           <p:cNvPr id="7" name="Slide Number Placeholder 6">
             <a:extLst>
               <a:ext uri="{FF2B5EF4-FFF2-40B4-BE49-F238E27FC236}">
-                <a16:creationId xmlns:a16="http://schemas.microsoft.com/office/drawing/2014/main" id="{12A1190C-F3FA-C89E-FA51-49AF623C0A9B}"/>
+                <a16:creationId xmlns:a16="http://schemas.microsoft.com/office/drawing/2014/main" id="{64550914-9C54-FDEF-025A-DD1E65A574FB}"/>
               </a:ext>
             </a:extLst>
           </p:cNvPr>
@@ -3437,7 +3436,7 @@
     </p:spTree>
     <p:extLst>
       <p:ext uri="{BB962C8B-B14F-4D97-AF65-F5344CB8AC3E}">
-        <p14:creationId xmlns:p14="http://schemas.microsoft.com/office/powerpoint/2010/main" val="1792983904"/>
+        <p14:creationId xmlns:p14="http://schemas.microsoft.com/office/powerpoint/2010/main" val="2214508259"/>
       </p:ext>
     </p:extLst>
   </p:cSld>
@@ -3469,7 +3468,7 @@
           <p:cNvPr id="2" name="Title 1">
             <a:extLst>
               <a:ext uri="{FF2B5EF4-FFF2-40B4-BE49-F238E27FC236}">
-                <a16:creationId xmlns:a16="http://schemas.microsoft.com/office/drawing/2014/main" id="{964DE1BB-E36A-A6C3-DBD6-D211F7A9A2C0}"/>
+                <a16:creationId xmlns:a16="http://schemas.microsoft.com/office/drawing/2014/main" id="{FDD2DE3F-8802-4CFC-8F59-5DC57C4EB976}"/>
               </a:ext>
             </a:extLst>
           </p:cNvPr>
@@ -3506,7 +3505,7 @@
           <p:cNvPr id="3" name="Picture Placeholder 2">
             <a:extLst>
               <a:ext uri="{FF2B5EF4-FFF2-40B4-BE49-F238E27FC236}">
-                <a16:creationId xmlns:a16="http://schemas.microsoft.com/office/drawing/2014/main" id="{5DC1CBB3-23A8-05E6-39DE-0B27C8CA8354}"/>
+                <a16:creationId xmlns:a16="http://schemas.microsoft.com/office/drawing/2014/main" id="{B5D094FE-9613-1538-0497-3E60E11108E0}"/>
               </a:ext>
             </a:extLst>
           </p:cNvPr>
@@ -3573,7 +3572,7 @@
           <p:cNvPr id="4" name="Text Placeholder 3">
             <a:extLst>
               <a:ext uri="{FF2B5EF4-FFF2-40B4-BE49-F238E27FC236}">
-                <a16:creationId xmlns:a16="http://schemas.microsoft.com/office/drawing/2014/main" id="{82BDE179-0AD7-3F65-B851-8F044B0EF6BD}"/>
+                <a16:creationId xmlns:a16="http://schemas.microsoft.com/office/drawing/2014/main" id="{2E48A513-9DD1-A612-69A2-2255DC7CCA4F}"/>
               </a:ext>
             </a:extLst>
           </p:cNvPr>
@@ -3644,7 +3643,7 @@
           <p:cNvPr id="5" name="Date Placeholder 4">
             <a:extLst>
               <a:ext uri="{FF2B5EF4-FFF2-40B4-BE49-F238E27FC236}">
-                <a16:creationId xmlns:a16="http://schemas.microsoft.com/office/drawing/2014/main" id="{6AAAEF13-6FEC-ECEA-1550-81824F6EB1E5}"/>
+                <a16:creationId xmlns:a16="http://schemas.microsoft.com/office/drawing/2014/main" id="{C7BACAFA-477D-F8FB-9747-B92B811E996D}"/>
               </a:ext>
             </a:extLst>
           </p:cNvPr>
@@ -3673,7 +3672,7 @@
           <p:cNvPr id="6" name="Footer Placeholder 5">
             <a:extLst>
               <a:ext uri="{FF2B5EF4-FFF2-40B4-BE49-F238E27FC236}">
-                <a16:creationId xmlns:a16="http://schemas.microsoft.com/office/drawing/2014/main" id="{A2203284-ACCC-EED1-DC32-414FE09BBC0A}"/>
+                <a16:creationId xmlns:a16="http://schemas.microsoft.com/office/drawing/2014/main" id="{F0F63530-9DEC-F045-0424-F6529C1F39E9}"/>
               </a:ext>
             </a:extLst>
           </p:cNvPr>
@@ -3698,7 +3697,7 @@
           <p:cNvPr id="7" name="Slide Number Placeholder 6">
             <a:extLst>
               <a:ext uri="{FF2B5EF4-FFF2-40B4-BE49-F238E27FC236}">
-                <a16:creationId xmlns:a16="http://schemas.microsoft.com/office/drawing/2014/main" id="{ECF05198-FB89-EE88-AF03-B1D23FE90632}"/>
+                <a16:creationId xmlns:a16="http://schemas.microsoft.com/office/drawing/2014/main" id="{EAF81772-8D36-05D7-0535-628D49E61C17}"/>
               </a:ext>
             </a:extLst>
           </p:cNvPr>
@@ -3725,7 +3724,7 @@
     </p:spTree>
     <p:extLst>
       <p:ext uri="{BB962C8B-B14F-4D97-AF65-F5344CB8AC3E}">
-        <p14:creationId xmlns:p14="http://schemas.microsoft.com/office/powerpoint/2010/main" val="579295727"/>
+        <p14:creationId xmlns:p14="http://schemas.microsoft.com/office/powerpoint/2010/main" val="1269658078"/>
       </p:ext>
     </p:extLst>
   </p:cSld>
@@ -3762,7 +3761,7 @@
           <p:cNvPr id="2" name="Title Placeholder 1">
             <a:extLst>
               <a:ext uri="{FF2B5EF4-FFF2-40B4-BE49-F238E27FC236}">
-                <a16:creationId xmlns:a16="http://schemas.microsoft.com/office/drawing/2014/main" id="{09776ECB-E948-01F6-BA20-FAC6FEB8376E}"/>
+                <a16:creationId xmlns:a16="http://schemas.microsoft.com/office/drawing/2014/main" id="{8E97F59E-1F25-BFBE-FAFE-E8ACF3C2E811}"/>
               </a:ext>
             </a:extLst>
           </p:cNvPr>
@@ -3800,7 +3799,7 @@
           <p:cNvPr id="3" name="Text Placeholder 2">
             <a:extLst>
               <a:ext uri="{FF2B5EF4-FFF2-40B4-BE49-F238E27FC236}">
-                <a16:creationId xmlns:a16="http://schemas.microsoft.com/office/drawing/2014/main" id="{F52383BB-35B9-15B4-F747-6B8FD046BD89}"/>
+                <a16:creationId xmlns:a16="http://schemas.microsoft.com/office/drawing/2014/main" id="{88A4473D-9FB0-09A2-5CE2-1B979FB8C240}"/>
               </a:ext>
             </a:extLst>
           </p:cNvPr>
@@ -3867,7 +3866,7 @@
           <p:cNvPr id="4" name="Date Placeholder 3">
             <a:extLst>
               <a:ext uri="{FF2B5EF4-FFF2-40B4-BE49-F238E27FC236}">
-                <a16:creationId xmlns:a16="http://schemas.microsoft.com/office/drawing/2014/main" id="{6F8BD4FD-411A-990A-8843-808A4365CE55}"/>
+                <a16:creationId xmlns:a16="http://schemas.microsoft.com/office/drawing/2014/main" id="{3420578C-728E-ED45-C49F-2CE10906327A}"/>
               </a:ext>
             </a:extLst>
           </p:cNvPr>
@@ -3914,7 +3913,7 @@
           <p:cNvPr id="5" name="Footer Placeholder 4">
             <a:extLst>
               <a:ext uri="{FF2B5EF4-FFF2-40B4-BE49-F238E27FC236}">
-                <a16:creationId xmlns:a16="http://schemas.microsoft.com/office/drawing/2014/main" id="{8BDF2A93-46B5-3E90-50B1-FDB286E6E0B8}"/>
+                <a16:creationId xmlns:a16="http://schemas.microsoft.com/office/drawing/2014/main" id="{83247C44-91FF-6E74-7B87-751AF81D6FF1}"/>
               </a:ext>
             </a:extLst>
           </p:cNvPr>
@@ -3957,7 +3956,7 @@
           <p:cNvPr id="6" name="Slide Number Placeholder 5">
             <a:extLst>
               <a:ext uri="{FF2B5EF4-FFF2-40B4-BE49-F238E27FC236}">
-                <a16:creationId xmlns:a16="http://schemas.microsoft.com/office/drawing/2014/main" id="{CB3FA08E-82F4-9F82-17F9-9EDEA7B0550E}"/>
+                <a16:creationId xmlns:a16="http://schemas.microsoft.com/office/drawing/2014/main" id="{FA7E4A54-4BC0-05C2-6238-97485A116DE6}"/>
               </a:ext>
             </a:extLst>
           </p:cNvPr>
@@ -4002,23 +4001,23 @@
     </p:spTree>
     <p:extLst>
       <p:ext uri="{BB962C8B-B14F-4D97-AF65-F5344CB8AC3E}">
-        <p14:creationId xmlns:p14="http://schemas.microsoft.com/office/powerpoint/2010/main" val="1154100575"/>
+        <p14:creationId xmlns:p14="http://schemas.microsoft.com/office/powerpoint/2010/main" val="597385142"/>
       </p:ext>
     </p:extLst>
   </p:cSld>
   <p:clrMap bg1="lt1" tx1="dk1" bg2="lt2" tx2="dk2" accent1="accent1" accent2="accent2" accent3="accent3" accent4="accent4" accent5="accent5" accent6="accent6" hlink="hlink" folHlink="folHlink"/>
   <p:sldLayoutIdLst>
-    <p:sldLayoutId id="2147483649" r:id="rId1"/>
-    <p:sldLayoutId id="2147483650" r:id="rId2"/>
-    <p:sldLayoutId id="2147483651" r:id="rId3"/>
-    <p:sldLayoutId id="2147483652" r:id="rId4"/>
-    <p:sldLayoutId id="2147483653" r:id="rId5"/>
-    <p:sldLayoutId id="2147483654" r:id="rId6"/>
-    <p:sldLayoutId id="2147483655" r:id="rId7"/>
-    <p:sldLayoutId id="2147483656" r:id="rId8"/>
-    <p:sldLayoutId id="2147483657" r:id="rId9"/>
-    <p:sldLayoutId id="2147483658" r:id="rId10"/>
-    <p:sldLayoutId id="2147483659" r:id="rId11"/>
+    <p:sldLayoutId id="2147483757" r:id="rId1"/>
+    <p:sldLayoutId id="2147483758" r:id="rId2"/>
+    <p:sldLayoutId id="2147483759" r:id="rId3"/>
+    <p:sldLayoutId id="2147483760" r:id="rId4"/>
+    <p:sldLayoutId id="2147483761" r:id="rId5"/>
+    <p:sldLayoutId id="2147483762" r:id="rId6"/>
+    <p:sldLayoutId id="2147483763" r:id="rId7"/>
+    <p:sldLayoutId id="2147483764" r:id="rId8"/>
+    <p:sldLayoutId id="2147483765" r:id="rId9"/>
+    <p:sldLayoutId id="2147483766" r:id="rId10"/>
+    <p:sldLayoutId id="2147483767" r:id="rId11"/>
   </p:sldLayoutIdLst>
   <p:txStyles>
     <p:titleStyle>
@@ -4300,6 +4299,11 @@
       </a:lvl9pPr>
     </p:otherStyle>
   </p:txStyles>
+  <p:extLst>
+    <p:ext uri="{27BBF7A9-308A-43DC-89C8-2F10F3537804}">
+      <p15:sldGuideLst xmlns:p15="http://schemas.microsoft.com/office/powerpoint/2012/main"/>
+    </p:ext>
+  </p:extLst>
 </p:sldMaster>
 </file>
 
@@ -4349,9 +4353,10 @@
           <a:lstStyle/>
           <a:p>
             <a:r>
-              <a:rPr lang="en-US" sz="4400" dirty="0"/>
+              <a:rPr lang="en-US" sz="4400"/>
               <a:t>Nitrogen and Phosphorus Remediation in Mesocosm Floating Treatment Wetlands receiving Municipal and Aquacultural Wastewater</a:t>
             </a:r>
+            <a:endParaRPr lang="en-US" sz="4400" dirty="0"/>
           </a:p>
         </p:txBody>
       </p:sp>
@@ -4382,27 +4387,28 @@
           <a:lstStyle/>
           <a:p>
             <a:r>
-              <a:rPr lang="en-US" dirty="0"/>
+              <a:rPr lang="en-US"/>
               <a:t>BIOL 6220: Final Project</a:t>
             </a:r>
           </a:p>
           <a:p>
             <a:r>
-              <a:rPr lang="en-US" dirty="0"/>
+              <a:rPr lang="en-US"/>
               <a:t>Matthew Barnes </a:t>
             </a:r>
           </a:p>
           <a:p>
             <a:r>
-              <a:rPr lang="en-US" dirty="0"/>
+              <a:rPr lang="en-US"/>
               <a:t>Bell Lab </a:t>
             </a:r>
           </a:p>
           <a:p>
             <a:r>
-              <a:rPr lang="en-US" dirty="0"/>
+              <a:rPr lang="en-US"/>
               <a:t>MSB Student </a:t>
             </a:r>
+            <a:endParaRPr lang="en-US" dirty="0"/>
           </a:p>
         </p:txBody>
       </p:sp>
@@ -4441,100 +4447,6 @@
           <p:cNvPr id="2" name="Title 1">
             <a:extLst>
               <a:ext uri="{FF2B5EF4-FFF2-40B4-BE49-F238E27FC236}">
-                <a16:creationId xmlns:a16="http://schemas.microsoft.com/office/drawing/2014/main" id="{BB7DC69B-8002-02A5-F653-B4CF4FCFD76B}"/>
-              </a:ext>
-            </a:extLst>
-          </p:cNvPr>
-          <p:cNvSpPr>
-            <a:spLocks noGrp="1"/>
-          </p:cNvSpPr>
-          <p:nvPr>
-            <p:ph type="title"/>
-          </p:nvPr>
-        </p:nvSpPr>
-        <p:spPr/>
-        <p:txBody>
-          <a:bodyPr/>
-          <a:lstStyle/>
-          <a:p>
-            <a:r>
-              <a:rPr lang="en-US" dirty="0" err="1"/>
-              <a:t>Anova</a:t>
-            </a:r>
-            <a:r>
-              <a:rPr lang="en-US" dirty="0"/>
-              <a:t> for Tank x Tank </a:t>
-            </a:r>
-          </a:p>
-        </p:txBody>
-      </p:sp>
-      <p:pic>
-        <p:nvPicPr>
-          <p:cNvPr id="4" name="Content Placeholder 3" descr="Graphical user interface, text, application, Teams&#10;&#10;Description automatically generated">
-            <a:extLst>
-              <a:ext uri="{FF2B5EF4-FFF2-40B4-BE49-F238E27FC236}">
-                <a16:creationId xmlns:a16="http://schemas.microsoft.com/office/drawing/2014/main" id="{81642784-6BC3-D778-EF69-A7293BD957A1}"/>
-              </a:ext>
-            </a:extLst>
-          </p:cNvPr>
-          <p:cNvPicPr>
-            <a:picLocks noGrp="1" noChangeAspect="1"/>
-          </p:cNvPicPr>
-          <p:nvPr>
-            <p:ph idx="1"/>
-          </p:nvPr>
-        </p:nvPicPr>
-        <p:blipFill>
-          <a:blip r:embed="rId3"/>
-          <a:stretch>
-            <a:fillRect/>
-          </a:stretch>
-        </p:blipFill>
-        <p:spPr>
-          <a:xfrm>
-            <a:off x="838200" y="2015452"/>
-            <a:ext cx="10515600" cy="3971683"/>
-          </a:xfrm>
-          <a:prstGeom prst="rect">
-            <a:avLst/>
-          </a:prstGeom>
-        </p:spPr>
-      </p:pic>
-    </p:spTree>
-    <p:extLst>
-      <p:ext uri="{BB962C8B-B14F-4D97-AF65-F5344CB8AC3E}">
-        <p14:creationId xmlns:p14="http://schemas.microsoft.com/office/powerpoint/2010/main" val="2202482488"/>
-      </p:ext>
-    </p:extLst>
-  </p:cSld>
-  <p:clrMapOvr>
-    <a:masterClrMapping/>
-  </p:clrMapOvr>
-</p:sld>
-</file>
-
-<file path=ppt/slides/slide11.xml><?xml version="1.0" encoding="utf-8"?>
-<p:sld xmlns:a="http://schemas.openxmlformats.org/drawingml/2006/main" xmlns:r="http://schemas.openxmlformats.org/officeDocument/2006/relationships" xmlns:p="http://schemas.openxmlformats.org/presentationml/2006/main">
-  <p:cSld>
-    <p:spTree>
-      <p:nvGrpSpPr>
-        <p:cNvPr id="1" name=""/>
-        <p:cNvGrpSpPr/>
-        <p:nvPr/>
-      </p:nvGrpSpPr>
-      <p:grpSpPr>
-        <a:xfrm>
-          <a:off x="0" y="0"/>
-          <a:ext cx="0" cy="0"/>
-          <a:chOff x="0" y="0"/>
-          <a:chExt cx="0" cy="0"/>
-        </a:xfrm>
-      </p:grpSpPr>
-      <p:sp>
-        <p:nvSpPr>
-          <p:cNvPr id="2" name="Title 1">
-            <a:extLst>
-              <a:ext uri="{FF2B5EF4-FFF2-40B4-BE49-F238E27FC236}">
                 <a16:creationId xmlns:a16="http://schemas.microsoft.com/office/drawing/2014/main" id="{6A282E4D-49D6-2C4E-A94A-5B6B87DC2C48}"/>
               </a:ext>
             </a:extLst>
@@ -4582,25 +4494,19 @@
         </p:spPr>
         <p:txBody>
           <a:bodyPr>
-            <a:normAutofit/>
+            <a:normAutofit lnSpcReduction="10000"/>
           </a:bodyPr>
           <a:lstStyle/>
           <a:p>
             <a:r>
               <a:rPr lang="en-US" dirty="0"/>
-              <a:t>Correlation plot I believe provided the best understanding visually of the data </a:t>
-            </a:r>
-          </a:p>
-          <a:p>
-            <a:r>
-              <a:rPr lang="en-US" dirty="0"/>
-              <a:t>The growth plots allowed for views on growth over the season</a:t>
-            </a:r>
-          </a:p>
-          <a:p>
-            <a:r>
-              <a:rPr lang="en-US" dirty="0"/>
-              <a:t>ANOVA allowed for ease of comparison amongst the species as well as between individual comparisons of the species within the tanks</a:t>
+              <a:t>Panicum virgatum had the tallest overall growth of the species present and juncus had the longest sustained growth period, largest root diameter, and longest roots of the three species</a:t>
+            </a:r>
+          </a:p>
+          <a:p>
+            <a:r>
+              <a:rPr lang="en-US" dirty="0"/>
+              <a:t>Pontederia cordata died off early in the growth season so its hard to make comparisons on how it should’ve/could’ve performed</a:t>
             </a:r>
           </a:p>
           <a:p>
@@ -4609,7 +4515,16 @@
           <a:p>
             <a:r>
               <a:rPr lang="en-US" dirty="0"/>
-              <a:t>What to change: organizing data differently initially, run more statistical tests to see what else is statistically significant amongst the data</a:t>
+              <a:t>What to look forward too: seeing how plant growth relates to nutrient removal from the water column and where the nutrients were stored within the plant</a:t>
+            </a:r>
+          </a:p>
+          <a:p>
+            <a:endParaRPr lang="en-US" dirty="0"/>
+          </a:p>
+          <a:p>
+            <a:r>
+              <a:rPr lang="en-US" dirty="0"/>
+              <a:t>What to change: organizing data differently initially, work on naming system so that they don’t end up super long </a:t>
             </a:r>
           </a:p>
         </p:txBody>
@@ -4627,7 +4542,7 @@
 </p:sld>
 </file>
 
-<file path=ppt/slides/slide12.xml><?xml version="1.0" encoding="utf-8"?>
+<file path=ppt/slides/slide11.xml><?xml version="1.0" encoding="utf-8"?>
 <p:sld xmlns:a="http://schemas.openxmlformats.org/drawingml/2006/main" xmlns:r="http://schemas.openxmlformats.org/officeDocument/2006/relationships" xmlns:p="http://schemas.openxmlformats.org/presentationml/2006/main">
   <p:cSld>
     <p:spTree>
@@ -4764,9 +4679,10 @@
           <a:lstStyle/>
           <a:p>
             <a:r>
-              <a:rPr lang="en-US" dirty="0"/>
+              <a:rPr lang="en-US"/>
               <a:t>Background Project Information</a:t>
             </a:r>
+            <a:endParaRPr lang="en-US" dirty="0"/>
           </a:p>
         </p:txBody>
       </p:sp>
@@ -4806,7 +4722,7 @@
           <a:p>
             <a:r>
               <a:rPr lang="en-US" dirty="0"/>
-              <a:t>Three species in total with treatments of 1,2,3 species per tank plus control</a:t>
+              <a:t>Three species in total with treatments of 1,2,or 3 species per tank plus control</a:t>
             </a:r>
           </a:p>
           <a:p>
@@ -5032,34 +4948,6 @@
       </p:pic>
       <p:sp>
         <p:nvSpPr>
-          <p:cNvPr id="2" name="Title 1">
-            <a:extLst>
-              <a:ext uri="{FF2B5EF4-FFF2-40B4-BE49-F238E27FC236}">
-                <a16:creationId xmlns:a16="http://schemas.microsoft.com/office/drawing/2014/main" id="{B11575F0-4634-FDEB-124B-A028EF8CEF76}"/>
-              </a:ext>
-            </a:extLst>
-          </p:cNvPr>
-          <p:cNvSpPr>
-            <a:spLocks noGrp="1"/>
-          </p:cNvSpPr>
-          <p:nvPr>
-            <p:ph type="title"/>
-          </p:nvPr>
-        </p:nvSpPr>
-        <p:spPr/>
-        <p:txBody>
-          <a:bodyPr/>
-          <a:lstStyle/>
-          <a:p>
-            <a:r>
-              <a:rPr lang="en-US" dirty="0"/>
-              <a:t>How We Got Here</a:t>
-            </a:r>
-          </a:p>
-        </p:txBody>
-      </p:sp>
-      <p:sp>
-        <p:nvSpPr>
           <p:cNvPr id="4" name="TextBox 3">
             <a:extLst>
               <a:ext uri="{FF2B5EF4-FFF2-40B4-BE49-F238E27FC236}">
@@ -5089,7 +4977,7 @@
             <a:pPr algn="ctr"/>
             <a:r>
               <a:rPr lang="en-US" dirty="0"/>
-              <a:t>Data Preparation</a:t>
+              <a:t>Experimental Setup</a:t>
             </a:r>
           </a:p>
         </p:txBody>
@@ -5330,7 +5218,7 @@
         </p:blipFill>
         <p:spPr bwMode="auto">
           <a:xfrm>
-            <a:off x="3604957" y="3529414"/>
+            <a:off x="3749676" y="3529414"/>
             <a:ext cx="2227262" cy="1590901"/>
           </a:xfrm>
           <a:prstGeom prst="rect">
@@ -5495,7 +5383,7 @@
           <a:p>
             <a:r>
               <a:rPr lang="en-US" dirty="0"/>
-              <a:t>The Data</a:t>
+              <a:t>Data Organization</a:t>
             </a:r>
           </a:p>
         </p:txBody>
@@ -5531,10 +5419,10 @@
       </p:pic>
       <p:pic>
         <p:nvPicPr>
-          <p:cNvPr id="7" name="Picture 6" descr="Table&#10;&#10;Description automatically generated">
-            <a:extLst>
-              <a:ext uri="{FF2B5EF4-FFF2-40B4-BE49-F238E27FC236}">
-                <a16:creationId xmlns:a16="http://schemas.microsoft.com/office/drawing/2014/main" id="{3942310C-0E25-EFEF-D8EC-D458EAB310F3}"/>
+          <p:cNvPr id="4" name="Picture 3" descr="Table&#10;&#10;Description automatically generated">
+            <a:extLst>
+              <a:ext uri="{FF2B5EF4-FFF2-40B4-BE49-F238E27FC236}">
+                <a16:creationId xmlns:a16="http://schemas.microsoft.com/office/drawing/2014/main" id="{1BD1F284-0A00-8972-5064-BF79BC458212}"/>
               </a:ext>
             </a:extLst>
           </p:cNvPr>
@@ -5551,8 +5439,8 @@
         </p:blipFill>
         <p:spPr>
           <a:xfrm>
-            <a:off x="6096000" y="1825625"/>
-            <a:ext cx="6096000" cy="4341813"/>
+            <a:off x="6096000" y="1825626"/>
+            <a:ext cx="6096000" cy="4351337"/>
           </a:xfrm>
           <a:prstGeom prst="rect">
             <a:avLst/>
@@ -5594,6 +5482,831 @@
           <p:cNvPr id="4" name="Title 3">
             <a:extLst>
               <a:ext uri="{FF2B5EF4-FFF2-40B4-BE49-F238E27FC236}">
+                <a16:creationId xmlns:a16="http://schemas.microsoft.com/office/drawing/2014/main" id="{EBD84F58-2EB5-F063-A6BB-21B4B1A17311}"/>
+              </a:ext>
+            </a:extLst>
+          </p:cNvPr>
+          <p:cNvSpPr>
+            <a:spLocks noGrp="1"/>
+          </p:cNvSpPr>
+          <p:nvPr>
+            <p:ph type="title"/>
+          </p:nvPr>
+        </p:nvSpPr>
+        <p:spPr/>
+        <p:txBody>
+          <a:bodyPr/>
+          <a:lstStyle/>
+          <a:p>
+            <a:r>
+              <a:rPr lang="en-US"/>
+              <a:t>Correlation Plot</a:t>
+            </a:r>
+            <a:endParaRPr lang="en-US" dirty="0"/>
+          </a:p>
+        </p:txBody>
+      </p:sp>
+      <p:sp>
+        <p:nvSpPr>
+          <p:cNvPr id="6" name="Text Placeholder 5">
+            <a:extLst>
+              <a:ext uri="{FF2B5EF4-FFF2-40B4-BE49-F238E27FC236}">
+                <a16:creationId xmlns:a16="http://schemas.microsoft.com/office/drawing/2014/main" id="{8DDE415E-DD19-8ABE-FF9F-AC47CDF84E0C}"/>
+              </a:ext>
+            </a:extLst>
+          </p:cNvPr>
+          <p:cNvSpPr>
+            <a:spLocks noGrp="1"/>
+          </p:cNvSpPr>
+          <p:nvPr>
+            <p:ph type="body" sz="half" idx="2"/>
+          </p:nvPr>
+        </p:nvSpPr>
+        <p:spPr>
+          <a:xfrm>
+            <a:off x="0" y="2057400"/>
+            <a:ext cx="4929188" cy="4800600"/>
+          </a:xfrm>
+        </p:spPr>
+        <p:txBody>
+          <a:bodyPr>
+            <a:normAutofit fontScale="77500" lnSpcReduction="20000"/>
+          </a:bodyPr>
+          <a:lstStyle/>
+          <a:p>
+            <a:r>
+              <a:rPr lang="en-US" dirty="0"/>
+              <a:t>```{r}</a:t>
+            </a:r>
+          </a:p>
+          <a:p>
+            <a:r>
+              <a:rPr lang="en-US" dirty="0"/>
+              <a:t>plot(</a:t>
+            </a:r>
+            <a:r>
+              <a:rPr lang="en-US" dirty="0" err="1"/>
+              <a:t>gucplant.Aseries$RootLength</a:t>
+            </a:r>
+            <a:r>
+              <a:rPr lang="en-US" dirty="0"/>
+              <a:t> ~ </a:t>
+            </a:r>
+            <a:r>
+              <a:rPr lang="en-US" dirty="0" err="1"/>
+              <a:t>gucplant.Aseries$ShootLength</a:t>
+            </a:r>
+            <a:r>
+              <a:rPr lang="en-US" dirty="0"/>
+              <a:t>, col=factor(</a:t>
+            </a:r>
+            <a:r>
+              <a:rPr lang="en-US" dirty="0" err="1"/>
+              <a:t>gucplant.Aseries$Species</a:t>
+            </a:r>
+            <a:r>
+              <a:rPr lang="en-US" dirty="0"/>
+              <a:t>))</a:t>
+            </a:r>
+          </a:p>
+          <a:p>
+            <a:endParaRPr lang="en-US" dirty="0"/>
+          </a:p>
+          <a:p>
+            <a:r>
+              <a:rPr lang="en-US" dirty="0"/>
+              <a:t>Juncus &lt;- </a:t>
+            </a:r>
+            <a:r>
+              <a:rPr lang="en-US" dirty="0" err="1"/>
+              <a:t>gucplant.Aseries</a:t>
+            </a:r>
+            <a:r>
+              <a:rPr lang="en-US" dirty="0"/>
+              <a:t>[ which(</a:t>
+            </a:r>
+            <a:r>
+              <a:rPr lang="en-US" dirty="0" err="1"/>
+              <a:t>gucplant.Aseries$Species</a:t>
+            </a:r>
+            <a:r>
+              <a:rPr lang="en-US" dirty="0"/>
+              <a:t> == </a:t>
+            </a:r>
+            <a:r>
+              <a:rPr lang="en-US" dirty="0">
+                <a:solidFill>
+                  <a:srgbClr val="00B050"/>
+                </a:solidFill>
+              </a:rPr>
+              <a:t>"Juncus"</a:t>
+            </a:r>
+            <a:r>
+              <a:rPr lang="en-US" dirty="0"/>
+              <a:t>), ]</a:t>
+            </a:r>
+          </a:p>
+          <a:p>
+            <a:r>
+              <a:rPr lang="en-US" dirty="0"/>
+              <a:t>Panicum &lt;- </a:t>
+            </a:r>
+            <a:r>
+              <a:rPr lang="en-US" dirty="0" err="1"/>
+              <a:t>gucplant.Aseries</a:t>
+            </a:r>
+            <a:r>
+              <a:rPr lang="en-US" dirty="0"/>
+              <a:t>[ which(</a:t>
+            </a:r>
+            <a:r>
+              <a:rPr lang="en-US" dirty="0" err="1"/>
+              <a:t>gucplant.Aseries$Species</a:t>
+            </a:r>
+            <a:r>
+              <a:rPr lang="en-US" dirty="0"/>
+              <a:t> == </a:t>
+            </a:r>
+            <a:r>
+              <a:rPr lang="en-US" dirty="0">
+                <a:solidFill>
+                  <a:srgbClr val="00B050"/>
+                </a:solidFill>
+              </a:rPr>
+              <a:t>"Panicum"</a:t>
+            </a:r>
+            <a:r>
+              <a:rPr lang="en-US" dirty="0"/>
+              <a:t>), ]</a:t>
+            </a:r>
+          </a:p>
+          <a:p>
+            <a:r>
+              <a:rPr lang="en-US" dirty="0"/>
+              <a:t>Pontederia &lt;- </a:t>
+            </a:r>
+            <a:r>
+              <a:rPr lang="en-US" dirty="0" err="1"/>
+              <a:t>gucplant.Aseries</a:t>
+            </a:r>
+            <a:r>
+              <a:rPr lang="en-US" dirty="0"/>
+              <a:t>[ which(</a:t>
+            </a:r>
+            <a:r>
+              <a:rPr lang="en-US" dirty="0" err="1"/>
+              <a:t>gucplant.Aseries$Species</a:t>
+            </a:r>
+            <a:r>
+              <a:rPr lang="en-US" dirty="0"/>
+              <a:t> == </a:t>
+            </a:r>
+            <a:r>
+              <a:rPr lang="en-US" dirty="0">
+                <a:solidFill>
+                  <a:srgbClr val="00B050"/>
+                </a:solidFill>
+              </a:rPr>
+              <a:t>"Pontederia"</a:t>
+            </a:r>
+            <a:r>
+              <a:rPr lang="en-US" dirty="0"/>
+              <a:t>), ]</a:t>
+            </a:r>
+          </a:p>
+          <a:p>
+            <a:endParaRPr lang="en-US" dirty="0"/>
+          </a:p>
+          <a:p>
+            <a:r>
+              <a:rPr lang="en-US" dirty="0" err="1"/>
+              <a:t>Juncus.reg</a:t>
+            </a:r>
+            <a:r>
+              <a:rPr lang="en-US" dirty="0"/>
+              <a:t> &lt;- </a:t>
+            </a:r>
+            <a:r>
+              <a:rPr lang="en-US" dirty="0" err="1"/>
+              <a:t>lm</a:t>
+            </a:r>
+            <a:r>
+              <a:rPr lang="en-US" dirty="0"/>
+              <a:t>(</a:t>
+            </a:r>
+            <a:r>
+              <a:rPr lang="en-US" dirty="0" err="1"/>
+              <a:t>Juncus$RootLength</a:t>
+            </a:r>
+            <a:r>
+              <a:rPr lang="en-US" dirty="0"/>
+              <a:t> ~ </a:t>
+            </a:r>
+            <a:r>
+              <a:rPr lang="en-US" dirty="0" err="1"/>
+              <a:t>Juncus$ShootLength</a:t>
+            </a:r>
+            <a:r>
+              <a:rPr lang="en-US" dirty="0"/>
+              <a:t>)</a:t>
+            </a:r>
+          </a:p>
+          <a:p>
+            <a:r>
+              <a:rPr lang="en-US" dirty="0" err="1"/>
+              <a:t>Panicum.reg</a:t>
+            </a:r>
+            <a:r>
+              <a:rPr lang="en-US" dirty="0"/>
+              <a:t> &lt;- </a:t>
+            </a:r>
+            <a:r>
+              <a:rPr lang="en-US" dirty="0" err="1"/>
+              <a:t>lm</a:t>
+            </a:r>
+            <a:r>
+              <a:rPr lang="en-US" dirty="0"/>
+              <a:t>(</a:t>
+            </a:r>
+            <a:r>
+              <a:rPr lang="en-US" dirty="0" err="1"/>
+              <a:t>Panicum$RootLength</a:t>
+            </a:r>
+            <a:r>
+              <a:rPr lang="en-US" dirty="0"/>
+              <a:t> ~ </a:t>
+            </a:r>
+            <a:r>
+              <a:rPr lang="en-US" dirty="0" err="1"/>
+              <a:t>Panicum$ShootLength</a:t>
+            </a:r>
+            <a:r>
+              <a:rPr lang="en-US" dirty="0"/>
+              <a:t>)</a:t>
+            </a:r>
+          </a:p>
+          <a:p>
+            <a:r>
+              <a:rPr lang="en-US" dirty="0" err="1"/>
+              <a:t>Pontederia.reg</a:t>
+            </a:r>
+            <a:r>
+              <a:rPr lang="en-US" dirty="0"/>
+              <a:t> &lt;- </a:t>
+            </a:r>
+            <a:r>
+              <a:rPr lang="en-US" dirty="0" err="1"/>
+              <a:t>lm</a:t>
+            </a:r>
+            <a:r>
+              <a:rPr lang="en-US" dirty="0"/>
+              <a:t>(</a:t>
+            </a:r>
+            <a:r>
+              <a:rPr lang="en-US" dirty="0" err="1"/>
+              <a:t>Pontederia$RootLength</a:t>
+            </a:r>
+            <a:r>
+              <a:rPr lang="en-US" dirty="0"/>
+              <a:t> ~ </a:t>
+            </a:r>
+            <a:r>
+              <a:rPr lang="en-US" dirty="0" err="1"/>
+              <a:t>Pontederia$ShootLength</a:t>
+            </a:r>
+            <a:r>
+              <a:rPr lang="en-US" dirty="0"/>
+              <a:t>)</a:t>
+            </a:r>
+          </a:p>
+          <a:p>
+            <a:endParaRPr lang="en-US" dirty="0"/>
+          </a:p>
+          <a:p>
+            <a:r>
+              <a:rPr lang="en-US" dirty="0" err="1"/>
+              <a:t>abline</a:t>
+            </a:r>
+            <a:r>
+              <a:rPr lang="en-US" dirty="0"/>
+              <a:t>(</a:t>
+            </a:r>
+            <a:r>
+              <a:rPr lang="en-US" dirty="0" err="1"/>
+              <a:t>Juncus.reg</a:t>
+            </a:r>
+            <a:r>
+              <a:rPr lang="en-US" dirty="0"/>
+              <a:t>, col=</a:t>
+            </a:r>
+            <a:r>
+              <a:rPr lang="en-US" dirty="0">
+                <a:solidFill>
+                  <a:srgbClr val="00B050"/>
+                </a:solidFill>
+              </a:rPr>
+              <a:t>"black"</a:t>
+            </a:r>
+            <a:r>
+              <a:rPr lang="en-US" dirty="0"/>
+              <a:t>)</a:t>
+            </a:r>
+          </a:p>
+          <a:p>
+            <a:r>
+              <a:rPr lang="en-US" dirty="0" err="1"/>
+              <a:t>abline</a:t>
+            </a:r>
+            <a:r>
+              <a:rPr lang="en-US" dirty="0"/>
+              <a:t>(</a:t>
+            </a:r>
+            <a:r>
+              <a:rPr lang="en-US" dirty="0" err="1"/>
+              <a:t>Panicum.reg</a:t>
+            </a:r>
+            <a:r>
+              <a:rPr lang="en-US" dirty="0"/>
+              <a:t>, col=</a:t>
+            </a:r>
+            <a:r>
+              <a:rPr lang="en-US" dirty="0">
+                <a:solidFill>
+                  <a:srgbClr val="00B050"/>
+                </a:solidFill>
+              </a:rPr>
+              <a:t>"red"</a:t>
+            </a:r>
+            <a:r>
+              <a:rPr lang="en-US" dirty="0"/>
+              <a:t>,</a:t>
+            </a:r>
+            <a:r>
+              <a:rPr lang="en-US" dirty="0">
+                <a:solidFill>
+                  <a:srgbClr val="00B050"/>
+                </a:solidFill>
+              </a:rPr>
+              <a:t> </a:t>
+            </a:r>
+            <a:r>
+              <a:rPr lang="en-US" dirty="0" err="1"/>
+              <a:t>lty</a:t>
+            </a:r>
+            <a:r>
+              <a:rPr lang="en-US" dirty="0"/>
+              <a:t>=</a:t>
+            </a:r>
+            <a:r>
+              <a:rPr lang="en-US" dirty="0">
+                <a:solidFill>
+                  <a:srgbClr val="0070C0"/>
+                </a:solidFill>
+              </a:rPr>
+              <a:t>2</a:t>
+            </a:r>
+            <a:r>
+              <a:rPr lang="en-US" dirty="0"/>
+              <a:t>)</a:t>
+            </a:r>
+          </a:p>
+          <a:p>
+            <a:r>
+              <a:rPr lang="en-US" dirty="0" err="1"/>
+              <a:t>abline</a:t>
+            </a:r>
+            <a:r>
+              <a:rPr lang="en-US" dirty="0"/>
+              <a:t>(</a:t>
+            </a:r>
+            <a:r>
+              <a:rPr lang="en-US" dirty="0" err="1"/>
+              <a:t>Pontederia.reg</a:t>
+            </a:r>
+            <a:r>
+              <a:rPr lang="en-US" dirty="0"/>
+              <a:t>, col=</a:t>
+            </a:r>
+            <a:r>
+              <a:rPr lang="en-US" dirty="0">
+                <a:solidFill>
+                  <a:srgbClr val="00B050"/>
+                </a:solidFill>
+              </a:rPr>
+              <a:t>"green"</a:t>
+            </a:r>
+            <a:r>
+              <a:rPr lang="en-US" dirty="0"/>
+              <a:t>, </a:t>
+            </a:r>
+            <a:r>
+              <a:rPr lang="en-US" dirty="0" err="1"/>
+              <a:t>lty</a:t>
+            </a:r>
+            <a:r>
+              <a:rPr lang="en-US" dirty="0"/>
+              <a:t>=</a:t>
+            </a:r>
+            <a:r>
+              <a:rPr lang="en-US" dirty="0">
+                <a:solidFill>
+                  <a:srgbClr val="0070C0"/>
+                </a:solidFill>
+              </a:rPr>
+              <a:t>3</a:t>
+            </a:r>
+            <a:r>
+              <a:rPr lang="en-US" dirty="0"/>
+              <a:t>)</a:t>
+            </a:r>
+          </a:p>
+          <a:p>
+            <a:r>
+              <a:rPr lang="en-US" dirty="0"/>
+              <a:t>```</a:t>
+            </a:r>
+          </a:p>
+        </p:txBody>
+      </p:sp>
+      <p:pic>
+        <p:nvPicPr>
+          <p:cNvPr id="8" name="Picture 7" descr="Chart, scatter chart&#10;&#10;Description automatically generated">
+            <a:extLst>
+              <a:ext uri="{FF2B5EF4-FFF2-40B4-BE49-F238E27FC236}">
+                <a16:creationId xmlns:a16="http://schemas.microsoft.com/office/drawing/2014/main" id="{68A0ED39-C6DF-DDA5-F3A9-7A14EA34B16F}"/>
+              </a:ext>
+            </a:extLst>
+          </p:cNvPr>
+          <p:cNvPicPr>
+            <a:picLocks noChangeAspect="1"/>
+          </p:cNvPicPr>
+          <p:nvPr/>
+        </p:nvPicPr>
+        <p:blipFill>
+          <a:blip r:embed="rId3"/>
+          <a:stretch>
+            <a:fillRect/>
+          </a:stretch>
+        </p:blipFill>
+        <p:spPr>
+          <a:xfrm>
+            <a:off x="4929188" y="1659082"/>
+            <a:ext cx="7257218" cy="4486275"/>
+          </a:xfrm>
+          <a:prstGeom prst="rect">
+            <a:avLst/>
+          </a:prstGeom>
+        </p:spPr>
+      </p:pic>
+    </p:spTree>
+    <p:extLst>
+      <p:ext uri="{BB962C8B-B14F-4D97-AF65-F5344CB8AC3E}">
+        <p14:creationId xmlns:p14="http://schemas.microsoft.com/office/powerpoint/2010/main" val="1606497839"/>
+      </p:ext>
+    </p:extLst>
+  </p:cSld>
+  <p:clrMapOvr>
+    <a:masterClrMapping/>
+  </p:clrMapOvr>
+</p:sld>
+</file>
+
+<file path=ppt/slides/slide6.xml><?xml version="1.0" encoding="utf-8"?>
+<p:sld xmlns:a="http://schemas.openxmlformats.org/drawingml/2006/main" xmlns:r="http://schemas.openxmlformats.org/officeDocument/2006/relationships" xmlns:p="http://schemas.openxmlformats.org/presentationml/2006/main">
+  <p:cSld>
+    <p:spTree>
+      <p:nvGrpSpPr>
+        <p:cNvPr id="1" name=""/>
+        <p:cNvGrpSpPr/>
+        <p:nvPr/>
+      </p:nvGrpSpPr>
+      <p:grpSpPr>
+        <a:xfrm>
+          <a:off x="0" y="0"/>
+          <a:ext cx="0" cy="0"/>
+          <a:chOff x="0" y="0"/>
+          <a:chExt cx="0" cy="0"/>
+        </a:xfrm>
+      </p:grpSpPr>
+      <p:sp>
+        <p:nvSpPr>
+          <p:cNvPr id="2" name="Title 1">
+            <a:extLst>
+              <a:ext uri="{FF2B5EF4-FFF2-40B4-BE49-F238E27FC236}">
+                <a16:creationId xmlns:a16="http://schemas.microsoft.com/office/drawing/2014/main" id="{4D25DB46-E488-22F3-F7B1-0FB9057210B9}"/>
+              </a:ext>
+            </a:extLst>
+          </p:cNvPr>
+          <p:cNvSpPr>
+            <a:spLocks noGrp="1"/>
+          </p:cNvSpPr>
+          <p:nvPr>
+            <p:ph type="title"/>
+          </p:nvPr>
+        </p:nvSpPr>
+        <p:spPr/>
+        <p:txBody>
+          <a:bodyPr/>
+          <a:lstStyle/>
+          <a:p>
+            <a:r>
+              <a:rPr lang="en-US"/>
+              <a:t>Plotting Growth </a:t>
+            </a:r>
+            <a:endParaRPr lang="en-US" dirty="0"/>
+          </a:p>
+        </p:txBody>
+      </p:sp>
+      <p:sp>
+        <p:nvSpPr>
+          <p:cNvPr id="4" name="Text Placeholder 3">
+            <a:extLst>
+              <a:ext uri="{FF2B5EF4-FFF2-40B4-BE49-F238E27FC236}">
+                <a16:creationId xmlns:a16="http://schemas.microsoft.com/office/drawing/2014/main" id="{BAE119FA-4D3D-BB65-5D4B-4C6511191BB9}"/>
+              </a:ext>
+            </a:extLst>
+          </p:cNvPr>
+          <p:cNvSpPr>
+            <a:spLocks noGrp="1"/>
+          </p:cNvSpPr>
+          <p:nvPr>
+            <p:ph type="body" sz="half" idx="2"/>
+          </p:nvPr>
+        </p:nvSpPr>
+        <p:spPr>
+          <a:xfrm>
+            <a:off x="0" y="2057400"/>
+            <a:ext cx="4772025" cy="4343400"/>
+          </a:xfrm>
+        </p:spPr>
+        <p:txBody>
+          <a:bodyPr>
+            <a:normAutofit lnSpcReduction="10000"/>
+          </a:bodyPr>
+          <a:lstStyle/>
+          <a:p>
+            <a:r>
+              <a:rPr lang="en-US"/>
+              <a:t>```{r}</a:t>
+            </a:r>
+          </a:p>
+          <a:p>
+            <a:r>
+              <a:rPr lang="en-US"/>
+              <a:t>gucplantbytankB1r &lt;- ggplot(data = gucplant, aes(x=gucplant$Date, y=gucplant$B1.r)) +</a:t>
+            </a:r>
+          </a:p>
+          <a:p>
+            <a:r>
+              <a:rPr lang="en-US"/>
+              <a:t>  geom_point(color=</a:t>
+            </a:r>
+            <a:r>
+              <a:rPr lang="en-US">
+                <a:solidFill>
+                  <a:srgbClr val="00B050"/>
+                </a:solidFill>
+              </a:rPr>
+              <a:t>"Blue", </a:t>
+            </a:r>
+            <a:r>
+              <a:rPr lang="en-US"/>
+              <a:t>linewidth=</a:t>
+            </a:r>
+            <a:r>
+              <a:rPr lang="en-US">
+                <a:solidFill>
+                  <a:schemeClr val="accent1"/>
+                </a:solidFill>
+              </a:rPr>
+              <a:t>2</a:t>
+            </a:r>
+            <a:r>
+              <a:rPr lang="en-US"/>
+              <a:t>, alpha=</a:t>
+            </a:r>
+            <a:r>
+              <a:rPr lang="en-US">
+                <a:solidFill>
+                  <a:schemeClr val="accent1"/>
+                </a:solidFill>
+              </a:rPr>
+              <a:t>0.9</a:t>
+            </a:r>
+            <a:r>
+              <a:rPr lang="en-US"/>
+              <a:t>) +</a:t>
+            </a:r>
+          </a:p>
+          <a:p>
+            <a:r>
+              <a:rPr lang="en-US"/>
+              <a:t>  theme_ipsum() +</a:t>
+            </a:r>
+          </a:p>
+          <a:p>
+            <a:r>
+              <a:rPr lang="en-US"/>
+              <a:t>  theme(axis.text.x = element_text(size = </a:t>
+            </a:r>
+            <a:r>
+              <a:rPr lang="en-US">
+                <a:solidFill>
+                  <a:schemeClr val="accent1"/>
+                </a:solidFill>
+              </a:rPr>
+              <a:t>8</a:t>
+            </a:r>
+            <a:r>
+              <a:rPr lang="en-US"/>
+              <a:t>))</a:t>
+            </a:r>
+          </a:p>
+          <a:p>
+            <a:r>
+              <a:rPr lang="en-US"/>
+              <a:t>gucplantbytankB1r</a:t>
+            </a:r>
+          </a:p>
+          <a:p>
+            <a:endParaRPr lang="en-US"/>
+          </a:p>
+          <a:p>
+            <a:r>
+              <a:rPr lang="en-US"/>
+              <a:t>ggarrange(gucplantbytankB1r + rremove(</a:t>
+            </a:r>
+            <a:r>
+              <a:rPr lang="en-US">
+                <a:solidFill>
+                  <a:srgbClr val="00B050"/>
+                </a:solidFill>
+              </a:rPr>
+              <a:t>"x.text"</a:t>
+            </a:r>
+            <a:r>
+              <a:rPr lang="en-US"/>
+              <a:t>), gucplantbytankB2r + rremove(</a:t>
+            </a:r>
+            <a:r>
+              <a:rPr lang="en-US">
+                <a:solidFill>
+                  <a:srgbClr val="00B050"/>
+                </a:solidFill>
+              </a:rPr>
+              <a:t>"x.text"</a:t>
+            </a:r>
+            <a:r>
+              <a:rPr lang="en-US"/>
+              <a:t>),</a:t>
+            </a:r>
+            <a:r>
+              <a:rPr lang="en-US">
+                <a:solidFill>
+                  <a:srgbClr val="00B050"/>
+                </a:solidFill>
+              </a:rPr>
+              <a:t> </a:t>
+            </a:r>
+            <a:r>
+              <a:rPr lang="en-US"/>
+              <a:t>gucplantbytankB3r + rremove(</a:t>
+            </a:r>
+            <a:r>
+              <a:rPr lang="en-US">
+                <a:solidFill>
+                  <a:schemeClr val="accent6"/>
+                </a:solidFill>
+              </a:rPr>
+              <a:t>"x.text"</a:t>
+            </a:r>
+            <a:r>
+              <a:rPr lang="en-US"/>
+              <a:t>),</a:t>
+            </a:r>
+          </a:p>
+          <a:p>
+            <a:r>
+              <a:rPr lang="en-US"/>
+              <a:t>          labels = c(</a:t>
+            </a:r>
+            <a:r>
+              <a:rPr lang="en-US">
+                <a:solidFill>
+                  <a:srgbClr val="00B050"/>
+                </a:solidFill>
+              </a:rPr>
+              <a:t>"A", "B", "C"</a:t>
+            </a:r>
+            <a:r>
+              <a:rPr lang="en-US"/>
+              <a:t>), </a:t>
+            </a:r>
+          </a:p>
+          <a:p>
+            <a:r>
+              <a:rPr lang="en-US"/>
+              <a:t>          ncol =</a:t>
+            </a:r>
+            <a:r>
+              <a:rPr lang="en-US">
+                <a:solidFill>
+                  <a:schemeClr val="accent1"/>
+                </a:solidFill>
+              </a:rPr>
+              <a:t>2</a:t>
+            </a:r>
+            <a:r>
+              <a:rPr lang="en-US"/>
+              <a:t>, nrow =</a:t>
+            </a:r>
+            <a:r>
+              <a:rPr lang="en-US">
+                <a:solidFill>
+                  <a:schemeClr val="accent1"/>
+                </a:solidFill>
+              </a:rPr>
+              <a:t>2</a:t>
+            </a:r>
+            <a:r>
+              <a:rPr lang="en-US"/>
+              <a:t>)</a:t>
+            </a:r>
+          </a:p>
+          <a:p>
+            <a:r>
+              <a:rPr lang="en-US"/>
+              <a:t>```</a:t>
+            </a:r>
+            <a:endParaRPr lang="en-US" dirty="0"/>
+          </a:p>
+        </p:txBody>
+      </p:sp>
+      <p:pic>
+        <p:nvPicPr>
+          <p:cNvPr id="6" name="Picture 5" descr="Chart&#10;&#10;Description automatically generated">
+            <a:extLst>
+              <a:ext uri="{FF2B5EF4-FFF2-40B4-BE49-F238E27FC236}">
+                <a16:creationId xmlns:a16="http://schemas.microsoft.com/office/drawing/2014/main" id="{A925C973-46E0-CE9C-507E-4201E27B24A4}"/>
+              </a:ext>
+            </a:extLst>
+          </p:cNvPr>
+          <p:cNvPicPr>
+            <a:picLocks noChangeAspect="1"/>
+          </p:cNvPicPr>
+          <p:nvPr/>
+        </p:nvPicPr>
+        <p:blipFill>
+          <a:blip r:embed="rId3"/>
+          <a:stretch>
+            <a:fillRect/>
+          </a:stretch>
+        </p:blipFill>
+        <p:spPr>
+          <a:xfrm>
+            <a:off x="4595813" y="2369695"/>
+            <a:ext cx="7462837" cy="4313960"/>
+          </a:xfrm>
+          <a:prstGeom prst="rect">
+            <a:avLst/>
+          </a:prstGeom>
+        </p:spPr>
+      </p:pic>
+    </p:spTree>
+    <p:extLst>
+      <p:ext uri="{BB962C8B-B14F-4D97-AF65-F5344CB8AC3E}">
+        <p14:creationId xmlns:p14="http://schemas.microsoft.com/office/powerpoint/2010/main" val="3791209850"/>
+      </p:ext>
+    </p:extLst>
+  </p:cSld>
+  <p:clrMapOvr>
+    <a:masterClrMapping/>
+  </p:clrMapOvr>
+</p:sld>
+</file>
+
+<file path=ppt/slides/slide7.xml><?xml version="1.0" encoding="utf-8"?>
+<p:sld xmlns:a="http://schemas.openxmlformats.org/drawingml/2006/main" xmlns:r="http://schemas.openxmlformats.org/officeDocument/2006/relationships" xmlns:p="http://schemas.openxmlformats.org/presentationml/2006/main">
+  <p:cSld>
+    <p:spTree>
+      <p:nvGrpSpPr>
+        <p:cNvPr id="1" name=""/>
+        <p:cNvGrpSpPr/>
+        <p:nvPr/>
+      </p:nvGrpSpPr>
+      <p:grpSpPr>
+        <a:xfrm>
+          <a:off x="0" y="0"/>
+          <a:ext cx="0" cy="0"/>
+          <a:chOff x="0" y="0"/>
+          <a:chExt cx="0" cy="0"/>
+        </a:xfrm>
+      </p:grpSpPr>
+      <p:sp>
+        <p:nvSpPr>
+          <p:cNvPr id="4" name="Title 3">
+            <a:extLst>
+              <a:ext uri="{FF2B5EF4-FFF2-40B4-BE49-F238E27FC236}">
                 <a16:creationId xmlns:a16="http://schemas.microsoft.com/office/drawing/2014/main" id="{C97D8A2F-177D-7D6C-D465-BBCA6F185627}"/>
               </a:ext>
             </a:extLst>
@@ -5611,9 +6324,10 @@
           <a:lstStyle/>
           <a:p>
             <a:r>
-              <a:rPr lang="en-US" dirty="0"/>
+              <a:rPr lang="en-US"/>
               <a:t>Pairwise Testing</a:t>
             </a:r>
+            <a:endParaRPr lang="en-US" dirty="0"/>
           </a:p>
         </p:txBody>
       </p:sp>
@@ -5644,73 +6358,41 @@
           <a:lstStyle/>
           <a:p>
             <a:r>
-              <a:rPr lang="en-US" dirty="0"/>
+              <a:rPr lang="en-US"/>
               <a:t>```{r}</a:t>
             </a:r>
           </a:p>
           <a:p>
             <a:r>
-              <a:rPr lang="en-US" dirty="0"/>
-              <a:t>plt2 &lt;- </a:t>
-            </a:r>
-            <a:r>
-              <a:rPr lang="en-US" dirty="0" err="1"/>
-              <a:t>ggbetweenstats</a:t>
-            </a:r>
-            <a:r>
-              <a:rPr lang="en-US" dirty="0"/>
-              <a:t>(</a:t>
-            </a:r>
-          </a:p>
-          <a:p>
-            <a:r>
-              <a:rPr lang="en-US" dirty="0"/>
-              <a:t>  data = </a:t>
-            </a:r>
-            <a:r>
-              <a:rPr lang="en-US" dirty="0" err="1"/>
-              <a:t>gucplant.Aseries</a:t>
-            </a:r>
-            <a:r>
-              <a:rPr lang="en-US" dirty="0"/>
-              <a:t>,</a:t>
-            </a:r>
-          </a:p>
-          <a:p>
-            <a:r>
-              <a:rPr lang="en-US" dirty="0"/>
+              <a:rPr lang="en-US"/>
+              <a:t>plt2 &lt;- ggbetweenstats(</a:t>
+            </a:r>
+          </a:p>
+          <a:p>
+            <a:r>
+              <a:rPr lang="en-US"/>
+              <a:t>  data = gucplant.Aseries,</a:t>
+            </a:r>
+          </a:p>
+          <a:p>
+            <a:r>
+              <a:rPr lang="en-US"/>
               <a:t>  x = Species,</a:t>
             </a:r>
           </a:p>
           <a:p>
             <a:r>
-              <a:rPr lang="en-US" dirty="0"/>
-              <a:t>  y = </a:t>
-            </a:r>
-            <a:r>
-              <a:rPr lang="en-US" dirty="0" err="1"/>
-              <a:t>ShootLength</a:t>
-            </a:r>
-            <a:r>
-              <a:rPr lang="en-US" dirty="0"/>
-              <a:t>, </a:t>
-            </a:r>
-          </a:p>
-          <a:p>
-            <a:r>
-              <a:rPr lang="en-US" dirty="0"/>
-              <a:t>  </a:t>
-            </a:r>
-            <a:r>
-              <a:rPr lang="en-US" dirty="0" err="1"/>
-              <a:t>ylab</a:t>
-            </a:r>
-            <a:r>
-              <a:rPr lang="en-US" dirty="0"/>
-              <a:t>=</a:t>
-            </a:r>
-            <a:r>
-              <a:rPr lang="en-US" dirty="0">
+              <a:rPr lang="en-US"/>
+              <a:t>  y = ShootLength, </a:t>
+            </a:r>
+          </a:p>
+          <a:p>
+            <a:r>
+              <a:rPr lang="en-US"/>
+              <a:t>  ylab=</a:t>
+            </a:r>
+            <a:r>
+              <a:rPr lang="en-US">
                 <a:solidFill>
                   <a:srgbClr val="00B050"/>
                 </a:solidFill>
@@ -5720,24 +6402,25 @@
           </a:p>
           <a:p>
             <a:r>
-              <a:rPr lang="en-US" dirty="0"/>
+              <a:rPr lang="en-US"/>
               <a:t>)</a:t>
             </a:r>
           </a:p>
           <a:p>
+            <a:endParaRPr lang="en-US"/>
+          </a:p>
+          <a:p>
+            <a:r>
+              <a:rPr lang="en-US"/>
+              <a:t>plt2</a:t>
+            </a:r>
+          </a:p>
+          <a:p>
+            <a:r>
+              <a:rPr lang="en-US"/>
+              <a:t>```</a:t>
+            </a:r>
             <a:endParaRPr lang="en-US" dirty="0"/>
-          </a:p>
-          <a:p>
-            <a:r>
-              <a:rPr lang="en-US" dirty="0"/>
-              <a:t>plt2</a:t>
-            </a:r>
-          </a:p>
-          <a:p>
-            <a:r>
-              <a:rPr lang="en-US" dirty="0"/>
-              <a:t>```</a:t>
-            </a:r>
           </a:p>
         </p:txBody>
       </p:sp>
@@ -5784,659 +6467,6 @@
 </p:sld>
 </file>
 
-<file path=ppt/slides/slide6.xml><?xml version="1.0" encoding="utf-8"?>
-<p:sld xmlns:a="http://schemas.openxmlformats.org/drawingml/2006/main" xmlns:r="http://schemas.openxmlformats.org/officeDocument/2006/relationships" xmlns:p="http://schemas.openxmlformats.org/presentationml/2006/main">
-  <p:cSld>
-    <p:spTree>
-      <p:nvGrpSpPr>
-        <p:cNvPr id="1" name=""/>
-        <p:cNvGrpSpPr/>
-        <p:nvPr/>
-      </p:nvGrpSpPr>
-      <p:grpSpPr>
-        <a:xfrm>
-          <a:off x="0" y="0"/>
-          <a:ext cx="0" cy="0"/>
-          <a:chOff x="0" y="0"/>
-          <a:chExt cx="0" cy="0"/>
-        </a:xfrm>
-      </p:grpSpPr>
-      <p:sp>
-        <p:nvSpPr>
-          <p:cNvPr id="2" name="Title 1">
-            <a:extLst>
-              <a:ext uri="{FF2B5EF4-FFF2-40B4-BE49-F238E27FC236}">
-                <a16:creationId xmlns:a16="http://schemas.microsoft.com/office/drawing/2014/main" id="{0E073E68-8FCA-A9EA-DFBB-84187F774611}"/>
-              </a:ext>
-            </a:extLst>
-          </p:cNvPr>
-          <p:cNvSpPr>
-            <a:spLocks noGrp="1"/>
-          </p:cNvSpPr>
-          <p:nvPr>
-            <p:ph type="title"/>
-          </p:nvPr>
-        </p:nvSpPr>
-        <p:spPr/>
-        <p:txBody>
-          <a:bodyPr/>
-          <a:lstStyle/>
-          <a:p>
-            <a:r>
-              <a:rPr lang="en-US" dirty="0"/>
-              <a:t>Boxplot	</a:t>
-            </a:r>
-          </a:p>
-        </p:txBody>
-      </p:sp>
-      <p:pic>
-        <p:nvPicPr>
-          <p:cNvPr id="6" name="Content Placeholder 5" descr="Chart, box and whisker chart&#10;&#10;Description automatically generated">
-            <a:extLst>
-              <a:ext uri="{FF2B5EF4-FFF2-40B4-BE49-F238E27FC236}">
-                <a16:creationId xmlns:a16="http://schemas.microsoft.com/office/drawing/2014/main" id="{76712632-52D7-6570-CEA6-27C2FACC532D}"/>
-              </a:ext>
-            </a:extLst>
-          </p:cNvPr>
-          <p:cNvPicPr>
-            <a:picLocks noGrp="1" noChangeAspect="1"/>
-          </p:cNvPicPr>
-          <p:nvPr>
-            <p:ph idx="1"/>
-          </p:nvPr>
-        </p:nvPicPr>
-        <p:blipFill>
-          <a:blip r:embed="rId2"/>
-          <a:stretch>
-            <a:fillRect/>
-          </a:stretch>
-        </p:blipFill>
-        <p:spPr>
-          <a:xfrm>
-            <a:off x="5183188" y="1796941"/>
-            <a:ext cx="6172200" cy="3254593"/>
-          </a:xfrm>
-        </p:spPr>
-      </p:pic>
-      <p:sp>
-        <p:nvSpPr>
-          <p:cNvPr id="4" name="Text Placeholder 3">
-            <a:extLst>
-              <a:ext uri="{FF2B5EF4-FFF2-40B4-BE49-F238E27FC236}">
-                <a16:creationId xmlns:a16="http://schemas.microsoft.com/office/drawing/2014/main" id="{A1CF7224-4AA3-E4D9-9B7D-6ECA48A3D698}"/>
-              </a:ext>
-            </a:extLst>
-          </p:cNvPr>
-          <p:cNvSpPr>
-            <a:spLocks noGrp="1"/>
-          </p:cNvSpPr>
-          <p:nvPr>
-            <p:ph type="body" sz="half" idx="2"/>
-          </p:nvPr>
-        </p:nvSpPr>
-        <p:spPr/>
-        <p:txBody>
-          <a:bodyPr/>
-          <a:lstStyle/>
-          <a:p>
-            <a:r>
-              <a:rPr lang="en-US" dirty="0"/>
-              <a:t>```{r}</a:t>
-            </a:r>
-          </a:p>
-          <a:p>
-            <a:r>
-              <a:rPr lang="en-US" dirty="0"/>
-              <a:t>boxplot(</a:t>
-            </a:r>
-            <a:r>
-              <a:rPr lang="en-US" dirty="0" err="1"/>
-              <a:t>gucplant.Aseries$RootLength</a:t>
-            </a:r>
-            <a:r>
-              <a:rPr lang="en-US" dirty="0"/>
-              <a:t> ~ </a:t>
-            </a:r>
-            <a:r>
-              <a:rPr lang="en-US" dirty="0" err="1"/>
-              <a:t>gucplant.Aseries$Species</a:t>
-            </a:r>
-            <a:r>
-              <a:rPr lang="en-US" dirty="0"/>
-              <a:t>)</a:t>
-            </a:r>
-          </a:p>
-          <a:p>
-            <a:r>
-              <a:rPr lang="en-US" dirty="0"/>
-              <a:t>```</a:t>
-            </a:r>
-          </a:p>
-        </p:txBody>
-      </p:sp>
-    </p:spTree>
-    <p:extLst>
-      <p:ext uri="{BB962C8B-B14F-4D97-AF65-F5344CB8AC3E}">
-        <p14:creationId xmlns:p14="http://schemas.microsoft.com/office/powerpoint/2010/main" val="340138818"/>
-      </p:ext>
-    </p:extLst>
-  </p:cSld>
-  <p:clrMapOvr>
-    <a:masterClrMapping/>
-  </p:clrMapOvr>
-</p:sld>
-</file>
-
-<file path=ppt/slides/slide7.xml><?xml version="1.0" encoding="utf-8"?>
-<p:sld xmlns:a="http://schemas.openxmlformats.org/drawingml/2006/main" xmlns:r="http://schemas.openxmlformats.org/officeDocument/2006/relationships" xmlns:p="http://schemas.openxmlformats.org/presentationml/2006/main">
-  <p:cSld>
-    <p:spTree>
-      <p:nvGrpSpPr>
-        <p:cNvPr id="1" name=""/>
-        <p:cNvGrpSpPr/>
-        <p:nvPr/>
-      </p:nvGrpSpPr>
-      <p:grpSpPr>
-        <a:xfrm>
-          <a:off x="0" y="0"/>
-          <a:ext cx="0" cy="0"/>
-          <a:chOff x="0" y="0"/>
-          <a:chExt cx="0" cy="0"/>
-        </a:xfrm>
-      </p:grpSpPr>
-      <p:sp>
-        <p:nvSpPr>
-          <p:cNvPr id="4" name="Title 3">
-            <a:extLst>
-              <a:ext uri="{FF2B5EF4-FFF2-40B4-BE49-F238E27FC236}">
-                <a16:creationId xmlns:a16="http://schemas.microsoft.com/office/drawing/2014/main" id="{EBD84F58-2EB5-F063-A6BB-21B4B1A17311}"/>
-              </a:ext>
-            </a:extLst>
-          </p:cNvPr>
-          <p:cNvSpPr>
-            <a:spLocks noGrp="1"/>
-          </p:cNvSpPr>
-          <p:nvPr>
-            <p:ph type="title"/>
-          </p:nvPr>
-        </p:nvSpPr>
-        <p:spPr/>
-        <p:txBody>
-          <a:bodyPr/>
-          <a:lstStyle/>
-          <a:p>
-            <a:r>
-              <a:rPr lang="en-US" dirty="0"/>
-              <a:t>Correlation Plot</a:t>
-            </a:r>
-          </a:p>
-        </p:txBody>
-      </p:sp>
-      <p:sp>
-        <p:nvSpPr>
-          <p:cNvPr id="6" name="Text Placeholder 5">
-            <a:extLst>
-              <a:ext uri="{FF2B5EF4-FFF2-40B4-BE49-F238E27FC236}">
-                <a16:creationId xmlns:a16="http://schemas.microsoft.com/office/drawing/2014/main" id="{8DDE415E-DD19-8ABE-FF9F-AC47CDF84E0C}"/>
-              </a:ext>
-            </a:extLst>
-          </p:cNvPr>
-          <p:cNvSpPr>
-            <a:spLocks noGrp="1"/>
-          </p:cNvSpPr>
-          <p:nvPr>
-            <p:ph type="body" sz="half" idx="2"/>
-          </p:nvPr>
-        </p:nvSpPr>
-        <p:spPr>
-          <a:xfrm>
-            <a:off x="0" y="2057400"/>
-            <a:ext cx="4929188" cy="3811588"/>
-          </a:xfrm>
-        </p:spPr>
-        <p:txBody>
-          <a:bodyPr>
-            <a:normAutofit fontScale="70000" lnSpcReduction="20000"/>
-          </a:bodyPr>
-          <a:lstStyle/>
-          <a:p>
-            <a:r>
-              <a:rPr lang="en-US" dirty="0"/>
-              <a:t>```{r}</a:t>
-            </a:r>
-          </a:p>
-          <a:p>
-            <a:r>
-              <a:rPr lang="en-US" dirty="0"/>
-              <a:t>plot(</a:t>
-            </a:r>
-            <a:r>
-              <a:rPr lang="en-US" dirty="0" err="1"/>
-              <a:t>gucplant.Aseries$RootLength</a:t>
-            </a:r>
-            <a:r>
-              <a:rPr lang="en-US" dirty="0"/>
-              <a:t> ~ </a:t>
-            </a:r>
-            <a:r>
-              <a:rPr lang="en-US" dirty="0" err="1"/>
-              <a:t>gucplant.Aseries$ShootLength</a:t>
-            </a:r>
-            <a:r>
-              <a:rPr lang="en-US" dirty="0"/>
-              <a:t>, col=factor(</a:t>
-            </a:r>
-            <a:r>
-              <a:rPr lang="en-US" dirty="0" err="1"/>
-              <a:t>gucplant.Aseries$Species</a:t>
-            </a:r>
-            <a:r>
-              <a:rPr lang="en-US" dirty="0"/>
-              <a:t>))</a:t>
-            </a:r>
-          </a:p>
-          <a:p>
-            <a:endParaRPr lang="en-US" dirty="0"/>
-          </a:p>
-          <a:p>
-            <a:r>
-              <a:rPr lang="en-US" dirty="0"/>
-              <a:t>Juncus &lt;- </a:t>
-            </a:r>
-            <a:r>
-              <a:rPr lang="en-US" dirty="0" err="1"/>
-              <a:t>gucplant.Aseries</a:t>
-            </a:r>
-            <a:r>
-              <a:rPr lang="en-US" dirty="0"/>
-              <a:t>[ which(</a:t>
-            </a:r>
-            <a:r>
-              <a:rPr lang="en-US" dirty="0" err="1"/>
-              <a:t>gucplant.Aseries$Species</a:t>
-            </a:r>
-            <a:r>
-              <a:rPr lang="en-US" dirty="0"/>
-              <a:t> == </a:t>
-            </a:r>
-            <a:r>
-              <a:rPr lang="en-US" dirty="0">
-                <a:solidFill>
-                  <a:srgbClr val="00B050"/>
-                </a:solidFill>
-              </a:rPr>
-              <a:t>"Juncus"</a:t>
-            </a:r>
-            <a:r>
-              <a:rPr lang="en-US" dirty="0"/>
-              <a:t>), ]</a:t>
-            </a:r>
-          </a:p>
-          <a:p>
-            <a:r>
-              <a:rPr lang="en-US" dirty="0"/>
-              <a:t>Panicum &lt;- </a:t>
-            </a:r>
-            <a:r>
-              <a:rPr lang="en-US" dirty="0" err="1"/>
-              <a:t>gucplant.Aseries</a:t>
-            </a:r>
-            <a:r>
-              <a:rPr lang="en-US" dirty="0"/>
-              <a:t>[ which(</a:t>
-            </a:r>
-            <a:r>
-              <a:rPr lang="en-US" dirty="0" err="1"/>
-              <a:t>gucplant.Aseries$Species</a:t>
-            </a:r>
-            <a:r>
-              <a:rPr lang="en-US" dirty="0"/>
-              <a:t> == </a:t>
-            </a:r>
-            <a:r>
-              <a:rPr lang="en-US" dirty="0">
-                <a:solidFill>
-                  <a:srgbClr val="00B050"/>
-                </a:solidFill>
-              </a:rPr>
-              <a:t>"Panicum"</a:t>
-            </a:r>
-            <a:r>
-              <a:rPr lang="en-US" dirty="0"/>
-              <a:t>), ]</a:t>
-            </a:r>
-          </a:p>
-          <a:p>
-            <a:r>
-              <a:rPr lang="en-US" dirty="0"/>
-              <a:t>Pontederia &lt;- </a:t>
-            </a:r>
-            <a:r>
-              <a:rPr lang="en-US" dirty="0" err="1"/>
-              <a:t>gucplant.Aseries</a:t>
-            </a:r>
-            <a:r>
-              <a:rPr lang="en-US" dirty="0"/>
-              <a:t>[ which(</a:t>
-            </a:r>
-            <a:r>
-              <a:rPr lang="en-US" dirty="0" err="1"/>
-              <a:t>gucplant.Aseries$Species</a:t>
-            </a:r>
-            <a:r>
-              <a:rPr lang="en-US" dirty="0"/>
-              <a:t> == </a:t>
-            </a:r>
-            <a:r>
-              <a:rPr lang="en-US" dirty="0">
-                <a:solidFill>
-                  <a:srgbClr val="00B050"/>
-                </a:solidFill>
-              </a:rPr>
-              <a:t>"Pontederia"</a:t>
-            </a:r>
-            <a:r>
-              <a:rPr lang="en-US" dirty="0"/>
-              <a:t>), ]</a:t>
-            </a:r>
-          </a:p>
-          <a:p>
-            <a:endParaRPr lang="en-US" dirty="0"/>
-          </a:p>
-          <a:p>
-            <a:r>
-              <a:rPr lang="en-US" dirty="0" err="1"/>
-              <a:t>Juncus.reg</a:t>
-            </a:r>
-            <a:r>
-              <a:rPr lang="en-US" dirty="0"/>
-              <a:t> &lt;- </a:t>
-            </a:r>
-            <a:r>
-              <a:rPr lang="en-US" dirty="0" err="1"/>
-              <a:t>lm</a:t>
-            </a:r>
-            <a:r>
-              <a:rPr lang="en-US" dirty="0"/>
-              <a:t>(</a:t>
-            </a:r>
-            <a:r>
-              <a:rPr lang="en-US" dirty="0" err="1"/>
-              <a:t>Juncus$RootLength</a:t>
-            </a:r>
-            <a:r>
-              <a:rPr lang="en-US" dirty="0"/>
-              <a:t> ~ </a:t>
-            </a:r>
-            <a:r>
-              <a:rPr lang="en-US" dirty="0" err="1"/>
-              <a:t>Juncus$ShootLength</a:t>
-            </a:r>
-            <a:r>
-              <a:rPr lang="en-US" dirty="0"/>
-              <a:t>)</a:t>
-            </a:r>
-          </a:p>
-          <a:p>
-            <a:r>
-              <a:rPr lang="en-US" dirty="0" err="1"/>
-              <a:t>Panicum.reg</a:t>
-            </a:r>
-            <a:r>
-              <a:rPr lang="en-US" dirty="0"/>
-              <a:t> &lt;- </a:t>
-            </a:r>
-            <a:r>
-              <a:rPr lang="en-US" dirty="0" err="1"/>
-              <a:t>lm</a:t>
-            </a:r>
-            <a:r>
-              <a:rPr lang="en-US" dirty="0"/>
-              <a:t>(</a:t>
-            </a:r>
-            <a:r>
-              <a:rPr lang="en-US" dirty="0" err="1"/>
-              <a:t>Panicum$RootLength</a:t>
-            </a:r>
-            <a:r>
-              <a:rPr lang="en-US" dirty="0"/>
-              <a:t> ~ </a:t>
-            </a:r>
-            <a:r>
-              <a:rPr lang="en-US" dirty="0" err="1"/>
-              <a:t>Panicum$ShootLength</a:t>
-            </a:r>
-            <a:r>
-              <a:rPr lang="en-US" dirty="0"/>
-              <a:t>)</a:t>
-            </a:r>
-          </a:p>
-          <a:p>
-            <a:r>
-              <a:rPr lang="en-US" dirty="0" err="1"/>
-              <a:t>Pontederia.reg</a:t>
-            </a:r>
-            <a:r>
-              <a:rPr lang="en-US" dirty="0"/>
-              <a:t> &lt;- </a:t>
-            </a:r>
-            <a:r>
-              <a:rPr lang="en-US" dirty="0" err="1"/>
-              <a:t>lm</a:t>
-            </a:r>
-            <a:r>
-              <a:rPr lang="en-US" dirty="0"/>
-              <a:t>(</a:t>
-            </a:r>
-            <a:r>
-              <a:rPr lang="en-US" dirty="0" err="1"/>
-              <a:t>Pontederia$RootLength</a:t>
-            </a:r>
-            <a:r>
-              <a:rPr lang="en-US" dirty="0"/>
-              <a:t> ~ </a:t>
-            </a:r>
-            <a:r>
-              <a:rPr lang="en-US" dirty="0" err="1"/>
-              <a:t>Pontederia$ShootLength</a:t>
-            </a:r>
-            <a:r>
-              <a:rPr lang="en-US" dirty="0"/>
-              <a:t>)</a:t>
-            </a:r>
-          </a:p>
-          <a:p>
-            <a:endParaRPr lang="en-US" dirty="0"/>
-          </a:p>
-          <a:p>
-            <a:r>
-              <a:rPr lang="en-US" dirty="0" err="1"/>
-              <a:t>abline</a:t>
-            </a:r>
-            <a:r>
-              <a:rPr lang="en-US" dirty="0"/>
-              <a:t>(</a:t>
-            </a:r>
-            <a:r>
-              <a:rPr lang="en-US" dirty="0" err="1"/>
-              <a:t>Juncus.reg</a:t>
-            </a:r>
-            <a:r>
-              <a:rPr lang="en-US" dirty="0"/>
-              <a:t>, col=</a:t>
-            </a:r>
-            <a:r>
-              <a:rPr lang="en-US" dirty="0">
-                <a:solidFill>
-                  <a:srgbClr val="00B050"/>
-                </a:solidFill>
-              </a:rPr>
-              <a:t>"black"</a:t>
-            </a:r>
-            <a:r>
-              <a:rPr lang="en-US" dirty="0"/>
-              <a:t>)</a:t>
-            </a:r>
-          </a:p>
-          <a:p>
-            <a:r>
-              <a:rPr lang="en-US" dirty="0" err="1"/>
-              <a:t>abline</a:t>
-            </a:r>
-            <a:r>
-              <a:rPr lang="en-US" dirty="0"/>
-              <a:t>(</a:t>
-            </a:r>
-            <a:r>
-              <a:rPr lang="en-US" dirty="0" err="1"/>
-              <a:t>Panicum.reg</a:t>
-            </a:r>
-            <a:r>
-              <a:rPr lang="en-US" dirty="0"/>
-              <a:t>, col=</a:t>
-            </a:r>
-            <a:r>
-              <a:rPr lang="en-US" dirty="0">
-                <a:solidFill>
-                  <a:srgbClr val="00B050"/>
-                </a:solidFill>
-              </a:rPr>
-              <a:t>"red"</a:t>
-            </a:r>
-            <a:r>
-              <a:rPr lang="en-US" dirty="0"/>
-              <a:t>,</a:t>
-            </a:r>
-            <a:r>
-              <a:rPr lang="en-US" dirty="0">
-                <a:solidFill>
-                  <a:srgbClr val="00B050"/>
-                </a:solidFill>
-              </a:rPr>
-              <a:t> </a:t>
-            </a:r>
-            <a:r>
-              <a:rPr lang="en-US" dirty="0" err="1"/>
-              <a:t>lty</a:t>
-            </a:r>
-            <a:r>
-              <a:rPr lang="en-US" dirty="0"/>
-              <a:t>=</a:t>
-            </a:r>
-            <a:r>
-              <a:rPr lang="en-US" dirty="0">
-                <a:solidFill>
-                  <a:srgbClr val="0070C0"/>
-                </a:solidFill>
-              </a:rPr>
-              <a:t>2</a:t>
-            </a:r>
-            <a:r>
-              <a:rPr lang="en-US" dirty="0"/>
-              <a:t>)</a:t>
-            </a:r>
-          </a:p>
-          <a:p>
-            <a:r>
-              <a:rPr lang="en-US" dirty="0" err="1"/>
-              <a:t>abline</a:t>
-            </a:r>
-            <a:r>
-              <a:rPr lang="en-US" dirty="0"/>
-              <a:t>(</a:t>
-            </a:r>
-            <a:r>
-              <a:rPr lang="en-US" dirty="0" err="1"/>
-              <a:t>Pontederia.reg</a:t>
-            </a:r>
-            <a:r>
-              <a:rPr lang="en-US" dirty="0"/>
-              <a:t>, col=</a:t>
-            </a:r>
-            <a:r>
-              <a:rPr lang="en-US" dirty="0">
-                <a:solidFill>
-                  <a:srgbClr val="00B050"/>
-                </a:solidFill>
-              </a:rPr>
-              <a:t>"green"</a:t>
-            </a:r>
-            <a:r>
-              <a:rPr lang="en-US" dirty="0"/>
-              <a:t>, </a:t>
-            </a:r>
-            <a:r>
-              <a:rPr lang="en-US" dirty="0" err="1"/>
-              <a:t>lty</a:t>
-            </a:r>
-            <a:r>
-              <a:rPr lang="en-US" dirty="0"/>
-              <a:t>=</a:t>
-            </a:r>
-            <a:r>
-              <a:rPr lang="en-US" dirty="0">
-                <a:solidFill>
-                  <a:srgbClr val="0070C0"/>
-                </a:solidFill>
-              </a:rPr>
-              <a:t>3</a:t>
-            </a:r>
-            <a:r>
-              <a:rPr lang="en-US" dirty="0"/>
-              <a:t>)</a:t>
-            </a:r>
-          </a:p>
-          <a:p>
-            <a:r>
-              <a:rPr lang="en-US" dirty="0"/>
-              <a:t>```</a:t>
-            </a:r>
-          </a:p>
-        </p:txBody>
-      </p:sp>
-      <p:pic>
-        <p:nvPicPr>
-          <p:cNvPr id="8" name="Picture 7" descr="Chart, scatter chart&#10;&#10;Description automatically generated">
-            <a:extLst>
-              <a:ext uri="{FF2B5EF4-FFF2-40B4-BE49-F238E27FC236}">
-                <a16:creationId xmlns:a16="http://schemas.microsoft.com/office/drawing/2014/main" id="{68A0ED39-C6DF-DDA5-F3A9-7A14EA34B16F}"/>
-              </a:ext>
-            </a:extLst>
-          </p:cNvPr>
-          <p:cNvPicPr>
-            <a:picLocks noChangeAspect="1"/>
-          </p:cNvPicPr>
-          <p:nvPr/>
-        </p:nvPicPr>
-        <p:blipFill>
-          <a:blip r:embed="rId3"/>
-          <a:stretch>
-            <a:fillRect/>
-          </a:stretch>
-        </p:blipFill>
-        <p:spPr>
-          <a:xfrm>
-            <a:off x="4929188" y="1257300"/>
-            <a:ext cx="7257218" cy="4486275"/>
-          </a:xfrm>
-          <a:prstGeom prst="rect">
-            <a:avLst/>
-          </a:prstGeom>
-        </p:spPr>
-      </p:pic>
-    </p:spTree>
-    <p:extLst>
-      <p:ext uri="{BB962C8B-B14F-4D97-AF65-F5344CB8AC3E}">
-        <p14:creationId xmlns:p14="http://schemas.microsoft.com/office/powerpoint/2010/main" val="1606497839"/>
-      </p:ext>
-    </p:extLst>
-  </p:cSld>
-  <p:clrMapOvr>
-    <a:masterClrMapping/>
-  </p:clrMapOvr>
-</p:sld>
-</file>
-
 <file path=ppt/slides/slide8.xml><?xml version="1.0" encoding="utf-8"?>
 <p:sld xmlns:a="http://schemas.openxmlformats.org/drawingml/2006/main" xmlns:r="http://schemas.openxmlformats.org/officeDocument/2006/relationships" xmlns:p="http://schemas.openxmlformats.org/presentationml/2006/main">
   <p:cSld>
@@ -6459,7 +6489,7 @@
           <p:cNvPr id="2" name="Title 1">
             <a:extLst>
               <a:ext uri="{FF2B5EF4-FFF2-40B4-BE49-F238E27FC236}">
-                <a16:creationId xmlns:a16="http://schemas.microsoft.com/office/drawing/2014/main" id="{4D25DB46-E488-22F3-F7B1-0FB9057210B9}"/>
+                <a16:creationId xmlns:a16="http://schemas.microsoft.com/office/drawing/2014/main" id="{CA908265-E2AB-83B1-1AF1-324598CF695B}"/>
               </a:ext>
             </a:extLst>
           </p:cNvPr>
@@ -6468,406 +6498,31 @@
           </p:cNvSpPr>
           <p:nvPr>
             <p:ph type="title"/>
-          </p:nvPr>
-        </p:nvSpPr>
-        <p:spPr/>
-        <p:txBody>
-          <a:bodyPr/>
-          <a:lstStyle/>
-          <a:p>
-            <a:r>
-              <a:rPr lang="en-US" dirty="0"/>
-              <a:t>Plotting Growth </a:t>
-            </a:r>
-          </a:p>
-        </p:txBody>
-      </p:sp>
-      <p:sp>
-        <p:nvSpPr>
-          <p:cNvPr id="4" name="Text Placeholder 3">
-            <a:extLst>
-              <a:ext uri="{FF2B5EF4-FFF2-40B4-BE49-F238E27FC236}">
-                <a16:creationId xmlns:a16="http://schemas.microsoft.com/office/drawing/2014/main" id="{BAE119FA-4D3D-BB65-5D4B-4C6511191BB9}"/>
-              </a:ext>
-            </a:extLst>
-          </p:cNvPr>
-          <p:cNvSpPr>
-            <a:spLocks noGrp="1"/>
-          </p:cNvSpPr>
-          <p:nvPr>
-            <p:ph type="body" sz="half" idx="2"/>
           </p:nvPr>
         </p:nvSpPr>
         <p:spPr>
           <a:xfrm>
-            <a:off x="0" y="2057400"/>
-            <a:ext cx="4772025" cy="4343400"/>
+            <a:off x="838199" y="114906"/>
+            <a:ext cx="10515600" cy="1325563"/>
           </a:xfrm>
         </p:spPr>
         <p:txBody>
-          <a:bodyPr>
-            <a:normAutofit lnSpcReduction="10000"/>
-          </a:bodyPr>
-          <a:lstStyle/>
-          <a:p>
-            <a:r>
-              <a:rPr lang="en-US" dirty="0"/>
-              <a:t>```{r}</a:t>
-            </a:r>
-          </a:p>
-          <a:p>
-            <a:r>
-              <a:rPr lang="en-US" dirty="0"/>
-              <a:t>gucplantbytankB1r &lt;- </a:t>
-            </a:r>
-            <a:r>
-              <a:rPr lang="en-US" dirty="0" err="1"/>
-              <a:t>ggplot</a:t>
-            </a:r>
-            <a:r>
-              <a:rPr lang="en-US" dirty="0"/>
-              <a:t>(data = </a:t>
-            </a:r>
-            <a:r>
-              <a:rPr lang="en-US" dirty="0" err="1"/>
-              <a:t>gucplant</a:t>
-            </a:r>
-            <a:r>
-              <a:rPr lang="en-US" dirty="0"/>
-              <a:t>, </a:t>
-            </a:r>
-            <a:r>
-              <a:rPr lang="en-US" dirty="0" err="1"/>
-              <a:t>aes</a:t>
-            </a:r>
-            <a:r>
-              <a:rPr lang="en-US" dirty="0"/>
-              <a:t>(x=</a:t>
-            </a:r>
-            <a:r>
-              <a:rPr lang="en-US" dirty="0" err="1"/>
-              <a:t>gucplant$Date</a:t>
-            </a:r>
-            <a:r>
-              <a:rPr lang="en-US" dirty="0"/>
-              <a:t>, y=gucplant$B1.r)) +</a:t>
-            </a:r>
-          </a:p>
-          <a:p>
-            <a:r>
-              <a:rPr lang="en-US" dirty="0"/>
-              <a:t>  </a:t>
-            </a:r>
-            <a:r>
-              <a:rPr lang="en-US" dirty="0" err="1"/>
-              <a:t>geom_point</a:t>
-            </a:r>
-            <a:r>
-              <a:rPr lang="en-US" dirty="0"/>
-              <a:t>(color=</a:t>
-            </a:r>
-            <a:r>
-              <a:rPr lang="en-US" dirty="0">
-                <a:solidFill>
-                  <a:srgbClr val="00B050"/>
-                </a:solidFill>
-              </a:rPr>
-              <a:t>"Blue", </a:t>
-            </a:r>
-            <a:r>
-              <a:rPr lang="en-US" dirty="0"/>
-              <a:t>linewidth=</a:t>
-            </a:r>
-            <a:r>
-              <a:rPr lang="en-US" dirty="0">
-                <a:solidFill>
-                  <a:schemeClr val="accent1"/>
-                </a:solidFill>
-              </a:rPr>
-              <a:t>2</a:t>
-            </a:r>
-            <a:r>
-              <a:rPr lang="en-US" dirty="0"/>
-              <a:t>, alpha=</a:t>
-            </a:r>
-            <a:r>
-              <a:rPr lang="en-US" dirty="0">
-                <a:solidFill>
-                  <a:schemeClr val="accent1"/>
-                </a:solidFill>
-              </a:rPr>
-              <a:t>0.9</a:t>
-            </a:r>
-            <a:r>
-              <a:rPr lang="en-US" dirty="0"/>
-              <a:t>) +</a:t>
-            </a:r>
-          </a:p>
-          <a:p>
-            <a:r>
-              <a:rPr lang="en-US" dirty="0"/>
-              <a:t>  </a:t>
-            </a:r>
-            <a:r>
-              <a:rPr lang="en-US" dirty="0" err="1"/>
-              <a:t>theme_ipsum</a:t>
-            </a:r>
-            <a:r>
-              <a:rPr lang="en-US" dirty="0"/>
-              <a:t>() +</a:t>
-            </a:r>
-          </a:p>
-          <a:p>
-            <a:r>
-              <a:rPr lang="en-US" dirty="0"/>
-              <a:t>  theme(</a:t>
-            </a:r>
-            <a:r>
-              <a:rPr lang="en-US" dirty="0" err="1"/>
-              <a:t>axis.text.x</a:t>
-            </a:r>
-            <a:r>
-              <a:rPr lang="en-US" dirty="0"/>
-              <a:t> = </a:t>
-            </a:r>
-            <a:r>
-              <a:rPr lang="en-US" dirty="0" err="1"/>
-              <a:t>element_text</a:t>
-            </a:r>
-            <a:r>
-              <a:rPr lang="en-US" dirty="0"/>
-              <a:t>(size = </a:t>
-            </a:r>
-            <a:r>
-              <a:rPr lang="en-US" dirty="0">
-                <a:solidFill>
-                  <a:schemeClr val="accent1"/>
-                </a:solidFill>
-              </a:rPr>
-              <a:t>8</a:t>
-            </a:r>
-            <a:r>
-              <a:rPr lang="en-US" dirty="0"/>
-              <a:t>))</a:t>
-            </a:r>
-          </a:p>
-          <a:p>
-            <a:r>
-              <a:rPr lang="en-US" dirty="0"/>
-              <a:t>gucplantbytankB1r</a:t>
-            </a:r>
-          </a:p>
-          <a:p>
-            <a:endParaRPr lang="en-US" dirty="0"/>
-          </a:p>
-          <a:p>
-            <a:r>
-              <a:rPr lang="en-US" dirty="0" err="1"/>
-              <a:t>ggarrange</a:t>
-            </a:r>
-            <a:r>
-              <a:rPr lang="en-US" dirty="0"/>
-              <a:t>(gucplantbytankB1r + </a:t>
-            </a:r>
-            <a:r>
-              <a:rPr lang="en-US" dirty="0" err="1"/>
-              <a:t>rremove</a:t>
-            </a:r>
-            <a:r>
-              <a:rPr lang="en-US" dirty="0"/>
-              <a:t>(</a:t>
-            </a:r>
-            <a:r>
-              <a:rPr lang="en-US" dirty="0">
-                <a:solidFill>
-                  <a:srgbClr val="00B050"/>
-                </a:solidFill>
-              </a:rPr>
-              <a:t>"</a:t>
-            </a:r>
-            <a:r>
-              <a:rPr lang="en-US" dirty="0" err="1">
-                <a:solidFill>
-                  <a:srgbClr val="00B050"/>
-                </a:solidFill>
-              </a:rPr>
-              <a:t>x.text</a:t>
-            </a:r>
-            <a:r>
-              <a:rPr lang="en-US" dirty="0">
-                <a:solidFill>
-                  <a:srgbClr val="00B050"/>
-                </a:solidFill>
-              </a:rPr>
-              <a:t>"</a:t>
-            </a:r>
-            <a:r>
-              <a:rPr lang="en-US" dirty="0"/>
-              <a:t>), gucplantbytankB2r + </a:t>
-            </a:r>
-            <a:r>
-              <a:rPr lang="en-US" dirty="0" err="1"/>
-              <a:t>rremove</a:t>
-            </a:r>
-            <a:r>
-              <a:rPr lang="en-US" dirty="0"/>
-              <a:t>(</a:t>
-            </a:r>
-            <a:r>
-              <a:rPr lang="en-US" dirty="0">
-                <a:solidFill>
-                  <a:srgbClr val="00B050"/>
-                </a:solidFill>
-              </a:rPr>
-              <a:t>"</a:t>
-            </a:r>
-            <a:r>
-              <a:rPr lang="en-US" dirty="0" err="1">
-                <a:solidFill>
-                  <a:srgbClr val="00B050"/>
-                </a:solidFill>
-              </a:rPr>
-              <a:t>x.text</a:t>
-            </a:r>
-            <a:r>
-              <a:rPr lang="en-US" dirty="0">
-                <a:solidFill>
-                  <a:srgbClr val="00B050"/>
-                </a:solidFill>
-              </a:rPr>
-              <a:t>"</a:t>
-            </a:r>
-            <a:r>
-              <a:rPr lang="en-US" dirty="0"/>
-              <a:t>),</a:t>
-            </a:r>
-            <a:r>
-              <a:rPr lang="en-US" dirty="0">
-                <a:solidFill>
-                  <a:srgbClr val="00B050"/>
-                </a:solidFill>
-              </a:rPr>
-              <a:t> </a:t>
-            </a:r>
-            <a:r>
-              <a:rPr lang="en-US" dirty="0"/>
-              <a:t>gucplantbytankB3r + </a:t>
-            </a:r>
-            <a:r>
-              <a:rPr lang="en-US" dirty="0" err="1"/>
-              <a:t>rremove</a:t>
-            </a:r>
-            <a:r>
-              <a:rPr lang="en-US" dirty="0"/>
-              <a:t>(</a:t>
-            </a:r>
-            <a:r>
-              <a:rPr lang="en-US" dirty="0">
-                <a:solidFill>
-                  <a:schemeClr val="accent6"/>
-                </a:solidFill>
-              </a:rPr>
-              <a:t>"</a:t>
-            </a:r>
-            <a:r>
-              <a:rPr lang="en-US" dirty="0" err="1">
-                <a:solidFill>
-                  <a:schemeClr val="accent6"/>
-                </a:solidFill>
-              </a:rPr>
-              <a:t>x.text</a:t>
-            </a:r>
-            <a:r>
-              <a:rPr lang="en-US" dirty="0">
-                <a:solidFill>
-                  <a:schemeClr val="accent6"/>
-                </a:solidFill>
-              </a:rPr>
-              <a:t>"</a:t>
-            </a:r>
-            <a:r>
-              <a:rPr lang="en-US" dirty="0"/>
-              <a:t>),</a:t>
-            </a:r>
-          </a:p>
-          <a:p>
-            <a:r>
-              <a:rPr lang="en-US" dirty="0"/>
-              <a:t>          labels = c(</a:t>
-            </a:r>
-            <a:r>
-              <a:rPr lang="en-US" dirty="0">
-                <a:solidFill>
-                  <a:srgbClr val="00B050"/>
-                </a:solidFill>
-              </a:rPr>
-              <a:t>"A", "B", "C"</a:t>
-            </a:r>
-            <a:r>
-              <a:rPr lang="en-US" dirty="0"/>
-              <a:t>), </a:t>
-            </a:r>
-          </a:p>
-          <a:p>
-            <a:r>
-              <a:rPr lang="en-US" dirty="0"/>
-              <a:t>          </a:t>
-            </a:r>
-            <a:r>
-              <a:rPr lang="en-US" dirty="0" err="1"/>
-              <a:t>ncol</a:t>
-            </a:r>
-            <a:r>
-              <a:rPr lang="en-US" dirty="0"/>
-              <a:t> =</a:t>
-            </a:r>
-            <a:r>
-              <a:rPr lang="en-US" dirty="0">
-                <a:solidFill>
-                  <a:schemeClr val="accent1"/>
-                </a:solidFill>
-              </a:rPr>
-              <a:t>2</a:t>
-            </a:r>
-            <a:r>
-              <a:rPr lang="en-US" dirty="0"/>
-              <a:t>, </a:t>
-            </a:r>
-            <a:r>
-              <a:rPr lang="en-US" dirty="0" err="1"/>
-              <a:t>nrow</a:t>
-            </a:r>
-            <a:r>
-              <a:rPr lang="en-US" dirty="0"/>
-              <a:t> =</a:t>
-            </a:r>
-            <a:r>
-              <a:rPr lang="en-US" dirty="0">
-                <a:solidFill>
-                  <a:schemeClr val="accent1"/>
-                </a:solidFill>
-              </a:rPr>
-              <a:t>2</a:t>
-            </a:r>
-            <a:r>
-              <a:rPr lang="en-US" dirty="0"/>
-              <a:t>)</a:t>
-            </a:r>
-          </a:p>
-          <a:p>
-            <a:r>
-              <a:rPr lang="en-US" dirty="0"/>
-              <a:t>```</a:t>
+          <a:bodyPr/>
+          <a:lstStyle/>
+          <a:p>
+            <a:r>
+              <a:rPr lang="en-US" dirty="0"/>
+              <a:t>ANOVA and Tukey for Species x Species</a:t>
             </a:r>
           </a:p>
         </p:txBody>
       </p:sp>
       <p:pic>
         <p:nvPicPr>
-          <p:cNvPr id="6" name="Picture 5" descr="Chart&#10;&#10;Description automatically generated">
-            <a:extLst>
-              <a:ext uri="{FF2B5EF4-FFF2-40B4-BE49-F238E27FC236}">
-                <a16:creationId xmlns:a16="http://schemas.microsoft.com/office/drawing/2014/main" id="{A925C973-46E0-CE9C-507E-4201E27B24A4}"/>
+          <p:cNvPr id="5" name="Picture 4" descr="Graphical user interface, text, application, Teams&#10;&#10;Description automatically generated">
+            <a:extLst>
+              <a:ext uri="{FF2B5EF4-FFF2-40B4-BE49-F238E27FC236}">
+                <a16:creationId xmlns:a16="http://schemas.microsoft.com/office/drawing/2014/main" id="{A0875081-B961-4E7F-920D-52EA408F2422}"/>
               </a:ext>
             </a:extLst>
           </p:cNvPr>
@@ -6884,8 +6539,8 @@
         </p:blipFill>
         <p:spPr>
           <a:xfrm>
-            <a:off x="4595813" y="2369695"/>
-            <a:ext cx="7462837" cy="4313960"/>
+            <a:off x="366712" y="1440469"/>
+            <a:ext cx="11458575" cy="4641676"/>
           </a:xfrm>
           <a:prstGeom prst="rect">
             <a:avLst/>
@@ -6895,7 +6550,7 @@
     </p:spTree>
     <p:extLst>
       <p:ext uri="{BB962C8B-B14F-4D97-AF65-F5344CB8AC3E}">
-        <p14:creationId xmlns:p14="http://schemas.microsoft.com/office/powerpoint/2010/main" val="3791209850"/>
+        <p14:creationId xmlns:p14="http://schemas.microsoft.com/office/powerpoint/2010/main" val="695825339"/>
       </p:ext>
     </p:extLst>
   </p:cSld>
@@ -6927,7 +6582,7 @@
           <p:cNvPr id="2" name="Title 1">
             <a:extLst>
               <a:ext uri="{FF2B5EF4-FFF2-40B4-BE49-F238E27FC236}">
-                <a16:creationId xmlns:a16="http://schemas.microsoft.com/office/drawing/2014/main" id="{CA908265-E2AB-83B1-1AF1-324598CF695B}"/>
+                <a16:creationId xmlns:a16="http://schemas.microsoft.com/office/drawing/2014/main" id="{BB7DC69B-8002-02A5-F653-B4CF4FCFD76B}"/>
               </a:ext>
             </a:extLst>
           </p:cNvPr>
@@ -6938,36 +6593,34 @@
             <p:ph type="title"/>
           </p:nvPr>
         </p:nvSpPr>
-        <p:spPr>
-          <a:xfrm>
-            <a:off x="838199" y="114906"/>
-            <a:ext cx="10515600" cy="1325563"/>
-          </a:xfrm>
-        </p:spPr>
+        <p:spPr/>
         <p:txBody>
           <a:bodyPr/>
           <a:lstStyle/>
           <a:p>
             <a:r>
-              <a:rPr lang="en-US" dirty="0"/>
-              <a:t>ANOVA and Tukey for Species x Species</a:t>
-            </a:r>
+              <a:rPr lang="en-US"/>
+              <a:t>Anova for Tank x Tank </a:t>
+            </a:r>
+            <a:endParaRPr lang="en-US" dirty="0"/>
           </a:p>
         </p:txBody>
       </p:sp>
       <p:pic>
         <p:nvPicPr>
-          <p:cNvPr id="5" name="Picture 4" descr="Graphical user interface, text, application, Teams&#10;&#10;Description automatically generated">
-            <a:extLst>
-              <a:ext uri="{FF2B5EF4-FFF2-40B4-BE49-F238E27FC236}">
-                <a16:creationId xmlns:a16="http://schemas.microsoft.com/office/drawing/2014/main" id="{A0875081-B961-4E7F-920D-52EA408F2422}"/>
+          <p:cNvPr id="4" name="Content Placeholder 3" descr="Graphical user interface, text, application, Teams&#10;&#10;Description automatically generated">
+            <a:extLst>
+              <a:ext uri="{FF2B5EF4-FFF2-40B4-BE49-F238E27FC236}">
+                <a16:creationId xmlns:a16="http://schemas.microsoft.com/office/drawing/2014/main" id="{81642784-6BC3-D778-EF69-A7293BD957A1}"/>
               </a:ext>
             </a:extLst>
           </p:cNvPr>
           <p:cNvPicPr>
-            <a:picLocks noChangeAspect="1"/>
+            <a:picLocks noGrp="1" noChangeAspect="1"/>
           </p:cNvPicPr>
-          <p:nvPr/>
+          <p:nvPr>
+            <p:ph idx="1"/>
+          </p:nvPr>
         </p:nvPicPr>
         <p:blipFill>
           <a:blip r:embed="rId3"/>
@@ -6977,8 +6630,8 @@
         </p:blipFill>
         <p:spPr>
           <a:xfrm>
-            <a:off x="366712" y="1440469"/>
-            <a:ext cx="11458575" cy="2785541"/>
+            <a:off x="838200" y="2015452"/>
+            <a:ext cx="10515600" cy="3971683"/>
           </a:xfrm>
           <a:prstGeom prst="rect">
             <a:avLst/>
@@ -6988,7 +6641,7 @@
     </p:spTree>
     <p:extLst>
       <p:ext uri="{BB962C8B-B14F-4D97-AF65-F5344CB8AC3E}">
-        <p14:creationId xmlns:p14="http://schemas.microsoft.com/office/powerpoint/2010/main" val="695825339"/>
+        <p14:creationId xmlns:p14="http://schemas.microsoft.com/office/powerpoint/2010/main" val="2202482488"/>
       </p:ext>
     </p:extLst>
   </p:cSld>

</xml_diff>